<commit_message>
Command pattern / PPT start
</commit_message>
<xml_diff>
--- a/01-Powerpoint-presentation/PowerpointPresentation.pptx
+++ b/01-Powerpoint-presentation/PowerpointPresentation.pptx
@@ -7,33 +7,36 @@
     <p:sldMasterId id="2147483753" r:id="rId3"/>
   </p:sldMasterIdLst>
   <p:notesMasterIdLst>
-    <p:notesMasterId r:id="rId25"/>
+    <p:notesMasterId r:id="rId28"/>
   </p:notesMasterIdLst>
   <p:handoutMasterIdLst>
-    <p:handoutMasterId r:id="rId26"/>
+    <p:handoutMasterId r:id="rId29"/>
   </p:handoutMasterIdLst>
   <p:sldIdLst>
     <p:sldId id="866" r:id="rId4"/>
     <p:sldId id="868" r:id="rId5"/>
     <p:sldId id="870" r:id="rId6"/>
     <p:sldId id="867" r:id="rId7"/>
-    <p:sldId id="892" r:id="rId8"/>
-    <p:sldId id="895" r:id="rId9"/>
-    <p:sldId id="896" r:id="rId10"/>
-    <p:sldId id="897" r:id="rId11"/>
-    <p:sldId id="898" r:id="rId12"/>
-    <p:sldId id="811" r:id="rId13"/>
-    <p:sldId id="877" r:id="rId14"/>
-    <p:sldId id="879" r:id="rId15"/>
-    <p:sldId id="881" r:id="rId16"/>
-    <p:sldId id="882" r:id="rId17"/>
-    <p:sldId id="883" r:id="rId18"/>
-    <p:sldId id="884" r:id="rId19"/>
-    <p:sldId id="885" r:id="rId20"/>
-    <p:sldId id="886" r:id="rId21"/>
-    <p:sldId id="887" r:id="rId22"/>
-    <p:sldId id="889" r:id="rId23"/>
-    <p:sldId id="894" r:id="rId24"/>
+    <p:sldId id="811" r:id="rId8"/>
+    <p:sldId id="901" r:id="rId9"/>
+    <p:sldId id="900" r:id="rId10"/>
+    <p:sldId id="892" r:id="rId11"/>
+    <p:sldId id="895" r:id="rId12"/>
+    <p:sldId id="896" r:id="rId13"/>
+    <p:sldId id="897" r:id="rId14"/>
+    <p:sldId id="898" r:id="rId15"/>
+    <p:sldId id="899" r:id="rId16"/>
+    <p:sldId id="877" r:id="rId17"/>
+    <p:sldId id="879" r:id="rId18"/>
+    <p:sldId id="881" r:id="rId19"/>
+    <p:sldId id="882" r:id="rId20"/>
+    <p:sldId id="883" r:id="rId21"/>
+    <p:sldId id="884" r:id="rId22"/>
+    <p:sldId id="885" r:id="rId23"/>
+    <p:sldId id="886" r:id="rId24"/>
+    <p:sldId id="887" r:id="rId25"/>
+    <p:sldId id="889" r:id="rId26"/>
+    <p:sldId id="894" r:id="rId27"/>
   </p:sldIdLst>
   <p:sldSz cx="12192000" cy="6858000"/>
   <p:notesSz cx="6858000" cy="9144000"/>
@@ -141,12 +144,15 @@
             <p14:sldId id="868"/>
             <p14:sldId id="870"/>
             <p14:sldId id="867"/>
+            <p14:sldId id="811"/>
+            <p14:sldId id="901"/>
+            <p14:sldId id="900"/>
             <p14:sldId id="892"/>
             <p14:sldId id="895"/>
             <p14:sldId id="896"/>
             <p14:sldId id="897"/>
             <p14:sldId id="898"/>
-            <p14:sldId id="811"/>
+            <p14:sldId id="899"/>
             <p14:sldId id="877"/>
             <p14:sldId id="879"/>
             <p14:sldId id="881"/>
@@ -6343,14 +6349,9 @@
           <a:lstStyle/>
           <a:p>
             <a:r>
-              <a:rPr lang="en-US" sz="1200">
-                <a:solidFill>
-                  <a:prstClr val="black"/>
-                </a:solidFill>
-              </a:rPr>
-              <a:t>© Copyright Showeet.com – Creative &amp; Free PowerPoint Templates</a:t>
+              <a:rPr lang="fr-FR" noProof="0" dirty="0"/>
+              <a:t>Page d’accueil</a:t>
             </a:r>
-            <a:endParaRPr lang="en-US"/>
           </a:p>
         </p:txBody>
       </p:sp>
@@ -6474,7 +6475,7 @@
     </p:spTree>
     <p:extLst>
       <p:ext uri="{BB962C8B-B14F-4D97-AF65-F5344CB8AC3E}">
-        <p14:creationId xmlns:p14="http://schemas.microsoft.com/office/powerpoint/2010/main" val="117351488"/>
+        <p14:creationId xmlns:p14="http://schemas.microsoft.com/office/powerpoint/2010/main" val="3584205330"/>
       </p:ext>
     </p:extLst>
   </p:cSld>
@@ -6528,23 +6529,6 @@
           <a:bodyPr/>
           <a:lstStyle/>
           <a:p>
-            <a:pPr marL="0" marR="0" lvl="0" indent="0" algn="l" defTabSz="914354" rtl="0" eaLnBrk="1" fontAlgn="auto" latinLnBrk="0" hangingPunct="1">
-              <a:lnSpc>
-                <a:spcPct val="100000"/>
-              </a:lnSpc>
-              <a:spcBef>
-                <a:spcPts val="0"/>
-              </a:spcBef>
-              <a:spcAft>
-                <a:spcPts val="0"/>
-              </a:spcAft>
-              <a:buClrTx/>
-              <a:buSzTx/>
-              <a:buFontTx/>
-              <a:buNone/>
-              <a:tabLst/>
-              <a:defRPr/>
-            </a:pPr>
             <a:r>
               <a:rPr lang="en-US" sz="1200">
                 <a:solidFill>
@@ -6553,6 +6537,7 @@
               </a:rPr>
               <a:t>© Copyright Showeet.com – Creative &amp; Free PowerPoint Templates</a:t>
             </a:r>
+            <a:endParaRPr lang="en-US"/>
           </a:p>
         </p:txBody>
       </p:sp>
@@ -6583,7 +6568,7 @@
     </p:spTree>
     <p:extLst>
       <p:ext uri="{BB962C8B-B14F-4D97-AF65-F5344CB8AC3E}">
-        <p14:creationId xmlns:p14="http://schemas.microsoft.com/office/powerpoint/2010/main" val="3712232617"/>
+        <p14:creationId xmlns:p14="http://schemas.microsoft.com/office/powerpoint/2010/main" val="3552511973"/>
       </p:ext>
     </p:extLst>
   </p:cSld>
@@ -6676,7 +6661,7 @@
     </p:spTree>
     <p:extLst>
       <p:ext uri="{BB962C8B-B14F-4D97-AF65-F5344CB8AC3E}">
-        <p14:creationId xmlns:p14="http://schemas.microsoft.com/office/powerpoint/2010/main" val="768886820"/>
+        <p14:creationId xmlns:p14="http://schemas.microsoft.com/office/powerpoint/2010/main" val="372831945"/>
       </p:ext>
     </p:extLst>
   </p:cSld>
@@ -6769,7 +6754,7 @@
     </p:spTree>
     <p:extLst>
       <p:ext uri="{BB962C8B-B14F-4D97-AF65-F5344CB8AC3E}">
-        <p14:creationId xmlns:p14="http://schemas.microsoft.com/office/powerpoint/2010/main" val="3574797035"/>
+        <p14:creationId xmlns:p14="http://schemas.microsoft.com/office/powerpoint/2010/main" val="324157143"/>
       </p:ext>
     </p:extLst>
   </p:cSld>
@@ -6823,6 +6808,23 @@
           <a:bodyPr/>
           <a:lstStyle/>
           <a:p>
+            <a:pPr marL="0" marR="0" lvl="0" indent="0" algn="l" defTabSz="914354" rtl="0" eaLnBrk="1" fontAlgn="auto" latinLnBrk="0" hangingPunct="1">
+              <a:lnSpc>
+                <a:spcPct val="100000"/>
+              </a:lnSpc>
+              <a:spcBef>
+                <a:spcPts val="0"/>
+              </a:spcBef>
+              <a:spcAft>
+                <a:spcPts val="0"/>
+              </a:spcAft>
+              <a:buClrTx/>
+              <a:buSzTx/>
+              <a:buFontTx/>
+              <a:buNone/>
+              <a:tabLst/>
+              <a:defRPr/>
+            </a:pPr>
             <a:r>
               <a:rPr lang="en-US" sz="1200">
                 <a:solidFill>
@@ -6831,7 +6833,6 @@
               </a:rPr>
               <a:t>© Copyright Showeet.com – Creative &amp; Free PowerPoint Templates</a:t>
             </a:r>
-            <a:endParaRPr lang="en-US"/>
           </a:p>
         </p:txBody>
       </p:sp>
@@ -6862,7 +6863,7 @@
     </p:spTree>
     <p:extLst>
       <p:ext uri="{BB962C8B-B14F-4D97-AF65-F5344CB8AC3E}">
-        <p14:creationId xmlns:p14="http://schemas.microsoft.com/office/powerpoint/2010/main" val="2069290823"/>
+        <p14:creationId xmlns:p14="http://schemas.microsoft.com/office/powerpoint/2010/main" val="3712232617"/>
       </p:ext>
     </p:extLst>
   </p:cSld>
@@ -6955,7 +6956,7 @@
     </p:spTree>
     <p:extLst>
       <p:ext uri="{BB962C8B-B14F-4D97-AF65-F5344CB8AC3E}">
-        <p14:creationId xmlns:p14="http://schemas.microsoft.com/office/powerpoint/2010/main" val="3206035147"/>
+        <p14:creationId xmlns:p14="http://schemas.microsoft.com/office/powerpoint/2010/main" val="768886820"/>
       </p:ext>
     </p:extLst>
   </p:cSld>
@@ -7048,7 +7049,7 @@
     </p:spTree>
     <p:extLst>
       <p:ext uri="{BB962C8B-B14F-4D97-AF65-F5344CB8AC3E}">
-        <p14:creationId xmlns:p14="http://schemas.microsoft.com/office/powerpoint/2010/main" val="3828291125"/>
+        <p14:creationId xmlns:p14="http://schemas.microsoft.com/office/powerpoint/2010/main" val="3574797035"/>
       </p:ext>
     </p:extLst>
   </p:cSld>
@@ -7102,23 +7103,6 @@
           <a:bodyPr/>
           <a:lstStyle/>
           <a:p>
-            <a:pPr marL="0" marR="0" lvl="0" indent="0" algn="l" defTabSz="914400" rtl="0" eaLnBrk="1" fontAlgn="auto" latinLnBrk="0" hangingPunct="1">
-              <a:lnSpc>
-                <a:spcPct val="100000"/>
-              </a:lnSpc>
-              <a:spcBef>
-                <a:spcPts val="0"/>
-              </a:spcBef>
-              <a:spcAft>
-                <a:spcPts val="0"/>
-              </a:spcAft>
-              <a:buClrTx/>
-              <a:buSzTx/>
-              <a:buFontTx/>
-              <a:buNone/>
-              <a:tabLst/>
-              <a:defRPr/>
-            </a:pPr>
             <a:r>
               <a:rPr lang="en-US" sz="1200">
                 <a:solidFill>
@@ -7127,6 +7111,7 @@
               </a:rPr>
               <a:t>© Copyright Showeet.com – Creative &amp; Free PowerPoint Templates</a:t>
             </a:r>
+            <a:endParaRPr lang="en-US"/>
           </a:p>
         </p:txBody>
       </p:sp>
@@ -7145,78 +7130,19 @@
           <a:bodyPr/>
           <a:lstStyle/>
           <a:p>
-            <a:pPr marL="0" marR="0" lvl="0" indent="0" algn="r" defTabSz="914400" rtl="0" eaLnBrk="1" fontAlgn="auto" latinLnBrk="0" hangingPunct="1">
-              <a:lnSpc>
-                <a:spcPct val="100000"/>
-              </a:lnSpc>
-              <a:spcBef>
-                <a:spcPts val="0"/>
-              </a:spcBef>
-              <a:spcAft>
-                <a:spcPts val="0"/>
-              </a:spcAft>
-              <a:buClrTx/>
-              <a:buSzTx/>
-              <a:buFontTx/>
-              <a:buNone/>
-              <a:tabLst/>
-              <a:defRPr/>
-            </a:pPr>
-            <a:fld id="{06BEB3AE-8E34-4534-922B-E380FB565A43}" type="slidenum">
-              <a:rPr kumimoji="0" lang="en-US" sz="1200" b="0" i="0" u="none" strike="noStrike" kern="1200" cap="none" spc="0" normalizeH="0" baseline="0" noProof="0" smtClean="0">
-                <a:ln>
-                  <a:noFill/>
-                </a:ln>
-                <a:solidFill>
-                  <a:prstClr val="black"/>
-                </a:solidFill>
-                <a:effectLst/>
-                <a:uLnTx/>
-                <a:uFillTx/>
-                <a:latin typeface="Calibri" panose="020F0502020204030204"/>
-                <a:ea typeface="+mn-ea"/>
-                <a:cs typeface="+mn-cs"/>
-              </a:rPr>
-              <a:pPr marL="0" marR="0" lvl="0" indent="0" algn="r" defTabSz="914400" rtl="0" eaLnBrk="1" fontAlgn="auto" latinLnBrk="0" hangingPunct="1">
-                <a:lnSpc>
-                  <a:spcPct val="100000"/>
-                </a:lnSpc>
-                <a:spcBef>
-                  <a:spcPts val="0"/>
-                </a:spcBef>
-                <a:spcAft>
-                  <a:spcPts val="0"/>
-                </a:spcAft>
-                <a:buClrTx/>
-                <a:buSzTx/>
-                <a:buFontTx/>
-                <a:buNone/>
-                <a:tabLst/>
-                <a:defRPr/>
-              </a:pPr>
+            <a:fld id="{2CA3AB2B-189A-4C92-A457-C6A3833631A7}" type="slidenum">
+              <a:rPr lang="en-US" smtClean="0"/>
+              <a:pPr/>
               <a:t>17</a:t>
             </a:fld>
-            <a:endParaRPr kumimoji="0" lang="en-US" sz="1200" b="0" i="0" u="none" strike="noStrike" kern="1200" cap="none" spc="0" normalizeH="0" baseline="0" noProof="0">
-              <a:ln>
-                <a:noFill/>
-              </a:ln>
-              <a:solidFill>
-                <a:prstClr val="black"/>
-              </a:solidFill>
-              <a:effectLst/>
-              <a:uLnTx/>
-              <a:uFillTx/>
-              <a:latin typeface="Calibri" panose="020F0502020204030204"/>
-              <a:ea typeface="+mn-ea"/>
-              <a:cs typeface="+mn-cs"/>
-            </a:endParaRPr>
+            <a:endParaRPr lang="en-US"/>
           </a:p>
         </p:txBody>
       </p:sp>
     </p:spTree>
     <p:extLst>
       <p:ext uri="{BB962C8B-B14F-4D97-AF65-F5344CB8AC3E}">
-        <p14:creationId xmlns:p14="http://schemas.microsoft.com/office/powerpoint/2010/main" val="3325128512"/>
+        <p14:creationId xmlns:p14="http://schemas.microsoft.com/office/powerpoint/2010/main" val="2069290823"/>
       </p:ext>
     </p:extLst>
   </p:cSld>
@@ -7270,23 +7196,6 @@
           <a:bodyPr/>
           <a:lstStyle/>
           <a:p>
-            <a:pPr marL="0" marR="0" lvl="0" indent="0" algn="l" defTabSz="914400" rtl="0" eaLnBrk="1" fontAlgn="auto" latinLnBrk="0" hangingPunct="1">
-              <a:lnSpc>
-                <a:spcPct val="100000"/>
-              </a:lnSpc>
-              <a:spcBef>
-                <a:spcPts val="0"/>
-              </a:spcBef>
-              <a:spcAft>
-                <a:spcPts val="0"/>
-              </a:spcAft>
-              <a:buClrTx/>
-              <a:buSzTx/>
-              <a:buFontTx/>
-              <a:buNone/>
-              <a:tabLst/>
-              <a:defRPr/>
-            </a:pPr>
             <a:r>
               <a:rPr lang="en-US" sz="1200">
                 <a:solidFill>
@@ -7295,6 +7204,7 @@
               </a:rPr>
               <a:t>© Copyright Showeet.com – Creative &amp; Free PowerPoint Templates</a:t>
             </a:r>
+            <a:endParaRPr lang="en-US"/>
           </a:p>
         </p:txBody>
       </p:sp>
@@ -7313,78 +7223,19 @@
           <a:bodyPr/>
           <a:lstStyle/>
           <a:p>
-            <a:pPr marL="0" marR="0" lvl="0" indent="0" algn="r" defTabSz="914400" rtl="0" eaLnBrk="1" fontAlgn="auto" latinLnBrk="0" hangingPunct="1">
-              <a:lnSpc>
-                <a:spcPct val="100000"/>
-              </a:lnSpc>
-              <a:spcBef>
-                <a:spcPts val="0"/>
-              </a:spcBef>
-              <a:spcAft>
-                <a:spcPts val="0"/>
-              </a:spcAft>
-              <a:buClrTx/>
-              <a:buSzTx/>
-              <a:buFontTx/>
-              <a:buNone/>
-              <a:tabLst/>
-              <a:defRPr/>
-            </a:pPr>
-            <a:fld id="{06BEB3AE-8E34-4534-922B-E380FB565A43}" type="slidenum">
-              <a:rPr kumimoji="0" lang="en-US" sz="1200" b="0" i="0" u="none" strike="noStrike" kern="1200" cap="none" spc="0" normalizeH="0" baseline="0" noProof="0" smtClean="0">
-                <a:ln>
-                  <a:noFill/>
-                </a:ln>
-                <a:solidFill>
-                  <a:prstClr val="black"/>
-                </a:solidFill>
-                <a:effectLst/>
-                <a:uLnTx/>
-                <a:uFillTx/>
-                <a:latin typeface="Calibri" panose="020F0502020204030204"/>
-                <a:ea typeface="+mn-ea"/>
-                <a:cs typeface="+mn-cs"/>
-              </a:rPr>
-              <a:pPr marL="0" marR="0" lvl="0" indent="0" algn="r" defTabSz="914400" rtl="0" eaLnBrk="1" fontAlgn="auto" latinLnBrk="0" hangingPunct="1">
-                <a:lnSpc>
-                  <a:spcPct val="100000"/>
-                </a:lnSpc>
-                <a:spcBef>
-                  <a:spcPts val="0"/>
-                </a:spcBef>
-                <a:spcAft>
-                  <a:spcPts val="0"/>
-                </a:spcAft>
-                <a:buClrTx/>
-                <a:buSzTx/>
-                <a:buFontTx/>
-                <a:buNone/>
-                <a:tabLst/>
-                <a:defRPr/>
-              </a:pPr>
+            <a:fld id="{2CA3AB2B-189A-4C92-A457-C6A3833631A7}" type="slidenum">
+              <a:rPr lang="en-US" smtClean="0"/>
+              <a:pPr/>
               <a:t>18</a:t>
             </a:fld>
-            <a:endParaRPr kumimoji="0" lang="en-US" sz="1200" b="0" i="0" u="none" strike="noStrike" kern="1200" cap="none" spc="0" normalizeH="0" baseline="0" noProof="0">
-              <a:ln>
-                <a:noFill/>
-              </a:ln>
-              <a:solidFill>
-                <a:prstClr val="black"/>
-              </a:solidFill>
-              <a:effectLst/>
-              <a:uLnTx/>
-              <a:uFillTx/>
-              <a:latin typeface="Calibri" panose="020F0502020204030204"/>
-              <a:ea typeface="+mn-ea"/>
-              <a:cs typeface="+mn-cs"/>
-            </a:endParaRPr>
+            <a:endParaRPr lang="en-US"/>
           </a:p>
         </p:txBody>
       </p:sp>
     </p:spTree>
     <p:extLst>
       <p:ext uri="{BB962C8B-B14F-4D97-AF65-F5344CB8AC3E}">
-        <p14:creationId xmlns:p14="http://schemas.microsoft.com/office/powerpoint/2010/main" val="1862392583"/>
+        <p14:creationId xmlns:p14="http://schemas.microsoft.com/office/powerpoint/2010/main" val="3206035147"/>
       </p:ext>
     </p:extLst>
   </p:cSld>
@@ -7438,23 +7289,6 @@
           <a:bodyPr/>
           <a:lstStyle/>
           <a:p>
-            <a:pPr marL="0" marR="0" lvl="0" indent="0" algn="l" defTabSz="914400" rtl="0" eaLnBrk="1" fontAlgn="auto" latinLnBrk="0" hangingPunct="1">
-              <a:lnSpc>
-                <a:spcPct val="100000"/>
-              </a:lnSpc>
-              <a:spcBef>
-                <a:spcPts val="0"/>
-              </a:spcBef>
-              <a:spcAft>
-                <a:spcPts val="0"/>
-              </a:spcAft>
-              <a:buClrTx/>
-              <a:buSzTx/>
-              <a:buFontTx/>
-              <a:buNone/>
-              <a:tabLst/>
-              <a:defRPr/>
-            </a:pPr>
             <a:r>
               <a:rPr lang="en-US" sz="1200">
                 <a:solidFill>
@@ -7463,6 +7297,7 @@
               </a:rPr>
               <a:t>© Copyright Showeet.com – Creative &amp; Free PowerPoint Templates</a:t>
             </a:r>
+            <a:endParaRPr lang="en-US"/>
           </a:p>
         </p:txBody>
       </p:sp>
@@ -7481,78 +7316,19 @@
           <a:bodyPr/>
           <a:lstStyle/>
           <a:p>
-            <a:pPr marL="0" marR="0" lvl="0" indent="0" algn="r" defTabSz="914400" rtl="0" eaLnBrk="1" fontAlgn="auto" latinLnBrk="0" hangingPunct="1">
-              <a:lnSpc>
-                <a:spcPct val="100000"/>
-              </a:lnSpc>
-              <a:spcBef>
-                <a:spcPts val="0"/>
-              </a:spcBef>
-              <a:spcAft>
-                <a:spcPts val="0"/>
-              </a:spcAft>
-              <a:buClrTx/>
-              <a:buSzTx/>
-              <a:buFontTx/>
-              <a:buNone/>
-              <a:tabLst/>
-              <a:defRPr/>
-            </a:pPr>
-            <a:fld id="{06BEB3AE-8E34-4534-922B-E380FB565A43}" type="slidenum">
-              <a:rPr kumimoji="0" lang="en-US" sz="1200" b="0" i="0" u="none" strike="noStrike" kern="1200" cap="none" spc="0" normalizeH="0" baseline="0" noProof="0" smtClean="0">
-                <a:ln>
-                  <a:noFill/>
-                </a:ln>
-                <a:solidFill>
-                  <a:prstClr val="black"/>
-                </a:solidFill>
-                <a:effectLst/>
-                <a:uLnTx/>
-                <a:uFillTx/>
-                <a:latin typeface="Calibri" panose="020F0502020204030204"/>
-                <a:ea typeface="+mn-ea"/>
-                <a:cs typeface="+mn-cs"/>
-              </a:rPr>
-              <a:pPr marL="0" marR="0" lvl="0" indent="0" algn="r" defTabSz="914400" rtl="0" eaLnBrk="1" fontAlgn="auto" latinLnBrk="0" hangingPunct="1">
-                <a:lnSpc>
-                  <a:spcPct val="100000"/>
-                </a:lnSpc>
-                <a:spcBef>
-                  <a:spcPts val="0"/>
-                </a:spcBef>
-                <a:spcAft>
-                  <a:spcPts val="0"/>
-                </a:spcAft>
-                <a:buClrTx/>
-                <a:buSzTx/>
-                <a:buFontTx/>
-                <a:buNone/>
-                <a:tabLst/>
-                <a:defRPr/>
-              </a:pPr>
+            <a:fld id="{2CA3AB2B-189A-4C92-A457-C6A3833631A7}" type="slidenum">
+              <a:rPr lang="en-US" smtClean="0"/>
+              <a:pPr/>
               <a:t>19</a:t>
             </a:fld>
-            <a:endParaRPr kumimoji="0" lang="en-US" sz="1200" b="0" i="0" u="none" strike="noStrike" kern="1200" cap="none" spc="0" normalizeH="0" baseline="0" noProof="0">
-              <a:ln>
-                <a:noFill/>
-              </a:ln>
-              <a:solidFill>
-                <a:prstClr val="black"/>
-              </a:solidFill>
-              <a:effectLst/>
-              <a:uLnTx/>
-              <a:uFillTx/>
-              <a:latin typeface="Calibri" panose="020F0502020204030204"/>
-              <a:ea typeface="+mn-ea"/>
-              <a:cs typeface="+mn-cs"/>
-            </a:endParaRPr>
+            <a:endParaRPr lang="en-US"/>
           </a:p>
         </p:txBody>
       </p:sp>
     </p:spTree>
     <p:extLst>
       <p:ext uri="{BB962C8B-B14F-4D97-AF65-F5344CB8AC3E}">
-        <p14:creationId xmlns:p14="http://schemas.microsoft.com/office/powerpoint/2010/main" val="1457261396"/>
+        <p14:creationId xmlns:p14="http://schemas.microsoft.com/office/powerpoint/2010/main" val="3828291125"/>
       </p:ext>
     </p:extLst>
   </p:cSld>
@@ -7607,14 +7383,14 @@
           <a:lstStyle/>
           <a:p>
             <a:r>
-              <a:rPr lang="en-US" sz="1200">
+              <a:rPr lang="fr-FR" sz="1200" noProof="0" dirty="0">
                 <a:solidFill>
                   <a:prstClr val="black"/>
                 </a:solidFill>
               </a:rPr>
-              <a:t>© Copyright Showeet.com – Creative &amp; Free PowerPoint Templates</a:t>
+              <a:t>Page de bienvenue </a:t>
             </a:r>
-            <a:endParaRPr lang="en-US"/>
+            <a:endParaRPr lang="fr-FR" noProof="0" dirty="0"/>
           </a:p>
         </p:txBody>
       </p:sp>
@@ -7813,6 +7589,510 @@
     </p:spTree>
     <p:extLst>
       <p:ext uri="{BB962C8B-B14F-4D97-AF65-F5344CB8AC3E}">
+        <p14:creationId xmlns:p14="http://schemas.microsoft.com/office/powerpoint/2010/main" val="3325128512"/>
+      </p:ext>
+    </p:extLst>
+  </p:cSld>
+  <p:clrMapOvr>
+    <a:masterClrMapping/>
+  </p:clrMapOvr>
+</p:notes>
+</file>
+
+<file path=ppt/notesSlides/notesSlide21.xml><?xml version="1.0" encoding="utf-8"?>
+<p:notes xmlns:a="http://schemas.openxmlformats.org/drawingml/2006/main" xmlns:r="http://schemas.openxmlformats.org/officeDocument/2006/relationships" xmlns:p="http://schemas.openxmlformats.org/presentationml/2006/main">
+  <p:cSld>
+    <p:spTree>
+      <p:nvGrpSpPr>
+        <p:cNvPr id="1" name=""/>
+        <p:cNvGrpSpPr/>
+        <p:nvPr/>
+      </p:nvGrpSpPr>
+      <p:grpSpPr>
+        <a:xfrm>
+          <a:off x="0" y="0"/>
+          <a:ext cx="0" cy="0"/>
+          <a:chOff x="0" y="0"/>
+          <a:chExt cx="0" cy="0"/>
+        </a:xfrm>
+      </p:grpSpPr>
+      <p:sp>
+        <p:nvSpPr>
+          <p:cNvPr id="2" name="Slide Image Placeholder 1"/>
+          <p:cNvSpPr>
+            <a:spLocks noGrp="1" noRot="1" noChangeAspect="1"/>
+          </p:cNvSpPr>
+          <p:nvPr>
+            <p:ph type="sldImg"/>
+          </p:nvPr>
+        </p:nvSpPr>
+        <p:spPr/>
+      </p:sp>
+      <p:sp>
+        <p:nvSpPr>
+          <p:cNvPr id="3" name="Notes Placeholder 2"/>
+          <p:cNvSpPr>
+            <a:spLocks noGrp="1"/>
+          </p:cNvSpPr>
+          <p:nvPr>
+            <p:ph type="body" idx="1"/>
+          </p:nvPr>
+        </p:nvSpPr>
+        <p:spPr/>
+        <p:txBody>
+          <a:bodyPr/>
+          <a:lstStyle/>
+          <a:p>
+            <a:pPr marL="0" marR="0" lvl="0" indent="0" algn="l" defTabSz="914400" rtl="0" eaLnBrk="1" fontAlgn="auto" latinLnBrk="0" hangingPunct="1">
+              <a:lnSpc>
+                <a:spcPct val="100000"/>
+              </a:lnSpc>
+              <a:spcBef>
+                <a:spcPts val="0"/>
+              </a:spcBef>
+              <a:spcAft>
+                <a:spcPts val="0"/>
+              </a:spcAft>
+              <a:buClrTx/>
+              <a:buSzTx/>
+              <a:buFontTx/>
+              <a:buNone/>
+              <a:tabLst/>
+              <a:defRPr/>
+            </a:pPr>
+            <a:r>
+              <a:rPr lang="en-US" sz="1200">
+                <a:solidFill>
+                  <a:prstClr val="black"/>
+                </a:solidFill>
+              </a:rPr>
+              <a:t>© Copyright Showeet.com – Creative &amp; Free PowerPoint Templates</a:t>
+            </a:r>
+          </a:p>
+        </p:txBody>
+      </p:sp>
+      <p:sp>
+        <p:nvSpPr>
+          <p:cNvPr id="4" name="Slide Number Placeholder 3"/>
+          <p:cNvSpPr>
+            <a:spLocks noGrp="1"/>
+          </p:cNvSpPr>
+          <p:nvPr>
+            <p:ph type="sldNum" sz="quarter" idx="10"/>
+          </p:nvPr>
+        </p:nvSpPr>
+        <p:spPr/>
+        <p:txBody>
+          <a:bodyPr/>
+          <a:lstStyle/>
+          <a:p>
+            <a:pPr marL="0" marR="0" lvl="0" indent="0" algn="r" defTabSz="914400" rtl="0" eaLnBrk="1" fontAlgn="auto" latinLnBrk="0" hangingPunct="1">
+              <a:lnSpc>
+                <a:spcPct val="100000"/>
+              </a:lnSpc>
+              <a:spcBef>
+                <a:spcPts val="0"/>
+              </a:spcBef>
+              <a:spcAft>
+                <a:spcPts val="0"/>
+              </a:spcAft>
+              <a:buClrTx/>
+              <a:buSzTx/>
+              <a:buFontTx/>
+              <a:buNone/>
+              <a:tabLst/>
+              <a:defRPr/>
+            </a:pPr>
+            <a:fld id="{06BEB3AE-8E34-4534-922B-E380FB565A43}" type="slidenum">
+              <a:rPr kumimoji="0" lang="en-US" sz="1200" b="0" i="0" u="none" strike="noStrike" kern="1200" cap="none" spc="0" normalizeH="0" baseline="0" noProof="0" smtClean="0">
+                <a:ln>
+                  <a:noFill/>
+                </a:ln>
+                <a:solidFill>
+                  <a:prstClr val="black"/>
+                </a:solidFill>
+                <a:effectLst/>
+                <a:uLnTx/>
+                <a:uFillTx/>
+                <a:latin typeface="Calibri" panose="020F0502020204030204"/>
+                <a:ea typeface="+mn-ea"/>
+                <a:cs typeface="+mn-cs"/>
+              </a:rPr>
+              <a:pPr marL="0" marR="0" lvl="0" indent="0" algn="r" defTabSz="914400" rtl="0" eaLnBrk="1" fontAlgn="auto" latinLnBrk="0" hangingPunct="1">
+                <a:lnSpc>
+                  <a:spcPct val="100000"/>
+                </a:lnSpc>
+                <a:spcBef>
+                  <a:spcPts val="0"/>
+                </a:spcBef>
+                <a:spcAft>
+                  <a:spcPts val="0"/>
+                </a:spcAft>
+                <a:buClrTx/>
+                <a:buSzTx/>
+                <a:buFontTx/>
+                <a:buNone/>
+                <a:tabLst/>
+                <a:defRPr/>
+              </a:pPr>
+              <a:t>21</a:t>
+            </a:fld>
+            <a:endParaRPr kumimoji="0" lang="en-US" sz="1200" b="0" i="0" u="none" strike="noStrike" kern="1200" cap="none" spc="0" normalizeH="0" baseline="0" noProof="0">
+              <a:ln>
+                <a:noFill/>
+              </a:ln>
+              <a:solidFill>
+                <a:prstClr val="black"/>
+              </a:solidFill>
+              <a:effectLst/>
+              <a:uLnTx/>
+              <a:uFillTx/>
+              <a:latin typeface="Calibri" panose="020F0502020204030204"/>
+              <a:ea typeface="+mn-ea"/>
+              <a:cs typeface="+mn-cs"/>
+            </a:endParaRPr>
+          </a:p>
+        </p:txBody>
+      </p:sp>
+    </p:spTree>
+    <p:extLst>
+      <p:ext uri="{BB962C8B-B14F-4D97-AF65-F5344CB8AC3E}">
+        <p14:creationId xmlns:p14="http://schemas.microsoft.com/office/powerpoint/2010/main" val="1862392583"/>
+      </p:ext>
+    </p:extLst>
+  </p:cSld>
+  <p:clrMapOvr>
+    <a:masterClrMapping/>
+  </p:clrMapOvr>
+</p:notes>
+</file>
+
+<file path=ppt/notesSlides/notesSlide22.xml><?xml version="1.0" encoding="utf-8"?>
+<p:notes xmlns:a="http://schemas.openxmlformats.org/drawingml/2006/main" xmlns:r="http://schemas.openxmlformats.org/officeDocument/2006/relationships" xmlns:p="http://schemas.openxmlformats.org/presentationml/2006/main">
+  <p:cSld>
+    <p:spTree>
+      <p:nvGrpSpPr>
+        <p:cNvPr id="1" name=""/>
+        <p:cNvGrpSpPr/>
+        <p:nvPr/>
+      </p:nvGrpSpPr>
+      <p:grpSpPr>
+        <a:xfrm>
+          <a:off x="0" y="0"/>
+          <a:ext cx="0" cy="0"/>
+          <a:chOff x="0" y="0"/>
+          <a:chExt cx="0" cy="0"/>
+        </a:xfrm>
+      </p:grpSpPr>
+      <p:sp>
+        <p:nvSpPr>
+          <p:cNvPr id="2" name="Slide Image Placeholder 1"/>
+          <p:cNvSpPr>
+            <a:spLocks noGrp="1" noRot="1" noChangeAspect="1"/>
+          </p:cNvSpPr>
+          <p:nvPr>
+            <p:ph type="sldImg"/>
+          </p:nvPr>
+        </p:nvSpPr>
+        <p:spPr/>
+      </p:sp>
+      <p:sp>
+        <p:nvSpPr>
+          <p:cNvPr id="3" name="Notes Placeholder 2"/>
+          <p:cNvSpPr>
+            <a:spLocks noGrp="1"/>
+          </p:cNvSpPr>
+          <p:nvPr>
+            <p:ph type="body" idx="1"/>
+          </p:nvPr>
+        </p:nvSpPr>
+        <p:spPr/>
+        <p:txBody>
+          <a:bodyPr/>
+          <a:lstStyle/>
+          <a:p>
+            <a:pPr marL="0" marR="0" lvl="0" indent="0" algn="l" defTabSz="914400" rtl="0" eaLnBrk="1" fontAlgn="auto" latinLnBrk="0" hangingPunct="1">
+              <a:lnSpc>
+                <a:spcPct val="100000"/>
+              </a:lnSpc>
+              <a:spcBef>
+                <a:spcPts val="0"/>
+              </a:spcBef>
+              <a:spcAft>
+                <a:spcPts val="0"/>
+              </a:spcAft>
+              <a:buClrTx/>
+              <a:buSzTx/>
+              <a:buFontTx/>
+              <a:buNone/>
+              <a:tabLst/>
+              <a:defRPr/>
+            </a:pPr>
+            <a:r>
+              <a:rPr lang="en-US" sz="1200">
+                <a:solidFill>
+                  <a:prstClr val="black"/>
+                </a:solidFill>
+              </a:rPr>
+              <a:t>© Copyright Showeet.com – Creative &amp; Free PowerPoint Templates</a:t>
+            </a:r>
+          </a:p>
+        </p:txBody>
+      </p:sp>
+      <p:sp>
+        <p:nvSpPr>
+          <p:cNvPr id="4" name="Slide Number Placeholder 3"/>
+          <p:cNvSpPr>
+            <a:spLocks noGrp="1"/>
+          </p:cNvSpPr>
+          <p:nvPr>
+            <p:ph type="sldNum" sz="quarter" idx="10"/>
+          </p:nvPr>
+        </p:nvSpPr>
+        <p:spPr/>
+        <p:txBody>
+          <a:bodyPr/>
+          <a:lstStyle/>
+          <a:p>
+            <a:pPr marL="0" marR="0" lvl="0" indent="0" algn="r" defTabSz="914400" rtl="0" eaLnBrk="1" fontAlgn="auto" latinLnBrk="0" hangingPunct="1">
+              <a:lnSpc>
+                <a:spcPct val="100000"/>
+              </a:lnSpc>
+              <a:spcBef>
+                <a:spcPts val="0"/>
+              </a:spcBef>
+              <a:spcAft>
+                <a:spcPts val="0"/>
+              </a:spcAft>
+              <a:buClrTx/>
+              <a:buSzTx/>
+              <a:buFontTx/>
+              <a:buNone/>
+              <a:tabLst/>
+              <a:defRPr/>
+            </a:pPr>
+            <a:fld id="{06BEB3AE-8E34-4534-922B-E380FB565A43}" type="slidenum">
+              <a:rPr kumimoji="0" lang="en-US" sz="1200" b="0" i="0" u="none" strike="noStrike" kern="1200" cap="none" spc="0" normalizeH="0" baseline="0" noProof="0" smtClean="0">
+                <a:ln>
+                  <a:noFill/>
+                </a:ln>
+                <a:solidFill>
+                  <a:prstClr val="black"/>
+                </a:solidFill>
+                <a:effectLst/>
+                <a:uLnTx/>
+                <a:uFillTx/>
+                <a:latin typeface="Calibri" panose="020F0502020204030204"/>
+                <a:ea typeface="+mn-ea"/>
+                <a:cs typeface="+mn-cs"/>
+              </a:rPr>
+              <a:pPr marL="0" marR="0" lvl="0" indent="0" algn="r" defTabSz="914400" rtl="0" eaLnBrk="1" fontAlgn="auto" latinLnBrk="0" hangingPunct="1">
+                <a:lnSpc>
+                  <a:spcPct val="100000"/>
+                </a:lnSpc>
+                <a:spcBef>
+                  <a:spcPts val="0"/>
+                </a:spcBef>
+                <a:spcAft>
+                  <a:spcPts val="0"/>
+                </a:spcAft>
+                <a:buClrTx/>
+                <a:buSzTx/>
+                <a:buFontTx/>
+                <a:buNone/>
+                <a:tabLst/>
+                <a:defRPr/>
+              </a:pPr>
+              <a:t>22</a:t>
+            </a:fld>
+            <a:endParaRPr kumimoji="0" lang="en-US" sz="1200" b="0" i="0" u="none" strike="noStrike" kern="1200" cap="none" spc="0" normalizeH="0" baseline="0" noProof="0">
+              <a:ln>
+                <a:noFill/>
+              </a:ln>
+              <a:solidFill>
+                <a:prstClr val="black"/>
+              </a:solidFill>
+              <a:effectLst/>
+              <a:uLnTx/>
+              <a:uFillTx/>
+              <a:latin typeface="Calibri" panose="020F0502020204030204"/>
+              <a:ea typeface="+mn-ea"/>
+              <a:cs typeface="+mn-cs"/>
+            </a:endParaRPr>
+          </a:p>
+        </p:txBody>
+      </p:sp>
+    </p:spTree>
+    <p:extLst>
+      <p:ext uri="{BB962C8B-B14F-4D97-AF65-F5344CB8AC3E}">
+        <p14:creationId xmlns:p14="http://schemas.microsoft.com/office/powerpoint/2010/main" val="1457261396"/>
+      </p:ext>
+    </p:extLst>
+  </p:cSld>
+  <p:clrMapOvr>
+    <a:masterClrMapping/>
+  </p:clrMapOvr>
+</p:notes>
+</file>
+
+<file path=ppt/notesSlides/notesSlide23.xml><?xml version="1.0" encoding="utf-8"?>
+<p:notes xmlns:a="http://schemas.openxmlformats.org/drawingml/2006/main" xmlns:r="http://schemas.openxmlformats.org/officeDocument/2006/relationships" xmlns:p="http://schemas.openxmlformats.org/presentationml/2006/main">
+  <p:cSld>
+    <p:spTree>
+      <p:nvGrpSpPr>
+        <p:cNvPr id="1" name=""/>
+        <p:cNvGrpSpPr/>
+        <p:nvPr/>
+      </p:nvGrpSpPr>
+      <p:grpSpPr>
+        <a:xfrm>
+          <a:off x="0" y="0"/>
+          <a:ext cx="0" cy="0"/>
+          <a:chOff x="0" y="0"/>
+          <a:chExt cx="0" cy="0"/>
+        </a:xfrm>
+      </p:grpSpPr>
+      <p:sp>
+        <p:nvSpPr>
+          <p:cNvPr id="2" name="Slide Image Placeholder 1"/>
+          <p:cNvSpPr>
+            <a:spLocks noGrp="1" noRot="1" noChangeAspect="1"/>
+          </p:cNvSpPr>
+          <p:nvPr>
+            <p:ph type="sldImg"/>
+          </p:nvPr>
+        </p:nvSpPr>
+        <p:spPr/>
+      </p:sp>
+      <p:sp>
+        <p:nvSpPr>
+          <p:cNvPr id="3" name="Notes Placeholder 2"/>
+          <p:cNvSpPr>
+            <a:spLocks noGrp="1"/>
+          </p:cNvSpPr>
+          <p:nvPr>
+            <p:ph type="body" idx="1"/>
+          </p:nvPr>
+        </p:nvSpPr>
+        <p:spPr/>
+        <p:txBody>
+          <a:bodyPr/>
+          <a:lstStyle/>
+          <a:p>
+            <a:pPr marL="0" marR="0" lvl="0" indent="0" algn="l" defTabSz="914400" rtl="0" eaLnBrk="1" fontAlgn="auto" latinLnBrk="0" hangingPunct="1">
+              <a:lnSpc>
+                <a:spcPct val="100000"/>
+              </a:lnSpc>
+              <a:spcBef>
+                <a:spcPts val="0"/>
+              </a:spcBef>
+              <a:spcAft>
+                <a:spcPts val="0"/>
+              </a:spcAft>
+              <a:buClrTx/>
+              <a:buSzTx/>
+              <a:buFontTx/>
+              <a:buNone/>
+              <a:tabLst/>
+              <a:defRPr/>
+            </a:pPr>
+            <a:r>
+              <a:rPr lang="en-US" sz="1200">
+                <a:solidFill>
+                  <a:prstClr val="black"/>
+                </a:solidFill>
+              </a:rPr>
+              <a:t>© Copyright Showeet.com – Creative &amp; Free PowerPoint Templates</a:t>
+            </a:r>
+          </a:p>
+        </p:txBody>
+      </p:sp>
+      <p:sp>
+        <p:nvSpPr>
+          <p:cNvPr id="4" name="Slide Number Placeholder 3"/>
+          <p:cNvSpPr>
+            <a:spLocks noGrp="1"/>
+          </p:cNvSpPr>
+          <p:nvPr>
+            <p:ph type="sldNum" sz="quarter" idx="10"/>
+          </p:nvPr>
+        </p:nvSpPr>
+        <p:spPr/>
+        <p:txBody>
+          <a:bodyPr/>
+          <a:lstStyle/>
+          <a:p>
+            <a:pPr marL="0" marR="0" lvl="0" indent="0" algn="r" defTabSz="914400" rtl="0" eaLnBrk="1" fontAlgn="auto" latinLnBrk="0" hangingPunct="1">
+              <a:lnSpc>
+                <a:spcPct val="100000"/>
+              </a:lnSpc>
+              <a:spcBef>
+                <a:spcPts val="0"/>
+              </a:spcBef>
+              <a:spcAft>
+                <a:spcPts val="0"/>
+              </a:spcAft>
+              <a:buClrTx/>
+              <a:buSzTx/>
+              <a:buFontTx/>
+              <a:buNone/>
+              <a:tabLst/>
+              <a:defRPr/>
+            </a:pPr>
+            <a:fld id="{06BEB3AE-8E34-4534-922B-E380FB565A43}" type="slidenum">
+              <a:rPr kumimoji="0" lang="en-US" sz="1200" b="0" i="0" u="none" strike="noStrike" kern="1200" cap="none" spc="0" normalizeH="0" baseline="0" noProof="0" smtClean="0">
+                <a:ln>
+                  <a:noFill/>
+                </a:ln>
+                <a:solidFill>
+                  <a:prstClr val="black"/>
+                </a:solidFill>
+                <a:effectLst/>
+                <a:uLnTx/>
+                <a:uFillTx/>
+                <a:latin typeface="Calibri" panose="020F0502020204030204"/>
+                <a:ea typeface="+mn-ea"/>
+                <a:cs typeface="+mn-cs"/>
+              </a:rPr>
+              <a:pPr marL="0" marR="0" lvl="0" indent="0" algn="r" defTabSz="914400" rtl="0" eaLnBrk="1" fontAlgn="auto" latinLnBrk="0" hangingPunct="1">
+                <a:lnSpc>
+                  <a:spcPct val="100000"/>
+                </a:lnSpc>
+                <a:spcBef>
+                  <a:spcPts val="0"/>
+                </a:spcBef>
+                <a:spcAft>
+                  <a:spcPts val="0"/>
+                </a:spcAft>
+                <a:buClrTx/>
+                <a:buSzTx/>
+                <a:buFontTx/>
+                <a:buNone/>
+                <a:tabLst/>
+                <a:defRPr/>
+              </a:pPr>
+              <a:t>23</a:t>
+            </a:fld>
+            <a:endParaRPr kumimoji="0" lang="en-US" sz="1200" b="0" i="0" u="none" strike="noStrike" kern="1200" cap="none" spc="0" normalizeH="0" baseline="0" noProof="0">
+              <a:ln>
+                <a:noFill/>
+              </a:ln>
+              <a:solidFill>
+                <a:prstClr val="black"/>
+              </a:solidFill>
+              <a:effectLst/>
+              <a:uLnTx/>
+              <a:uFillTx/>
+              <a:latin typeface="Calibri" panose="020F0502020204030204"/>
+              <a:ea typeface="+mn-ea"/>
+              <a:cs typeface="+mn-cs"/>
+            </a:endParaRPr>
+          </a:p>
+        </p:txBody>
+      </p:sp>
+    </p:spTree>
+    <p:extLst>
+      <p:ext uri="{BB962C8B-B14F-4D97-AF65-F5344CB8AC3E}">
         <p14:creationId xmlns:p14="http://schemas.microsoft.com/office/powerpoint/2010/main" val="2390194218"/>
       </p:ext>
     </p:extLst>
@@ -7823,7 +8103,7 @@
 </p:notes>
 </file>
 
-<file path=ppt/notesSlides/notesSlide21.xml><?xml version="1.0" encoding="utf-8"?>
+<file path=ppt/notesSlides/notesSlide24.xml><?xml version="1.0" encoding="utf-8"?>
 <p:notes xmlns:a="http://schemas.openxmlformats.org/drawingml/2006/main" xmlns:r="http://schemas.openxmlformats.org/officeDocument/2006/relationships" xmlns:p="http://schemas.openxmlformats.org/presentationml/2006/main">
   <p:cSld>
     <p:spTree>
@@ -7897,7 +8177,7 @@
             <a:fld id="{2CA3AB2B-189A-4C92-A457-C6A3833631A7}" type="slidenum">
               <a:rPr lang="en-US" smtClean="0"/>
               <a:pPr/>
-              <a:t>21</a:t>
+              <a:t>24</a:t>
             </a:fld>
             <a:endParaRPr lang="en-US"/>
           </a:p>
@@ -7961,14 +8241,10 @@
           <a:lstStyle/>
           <a:p>
             <a:r>
-              <a:rPr lang="en-US" sz="1200">
-                <a:solidFill>
-                  <a:prstClr val="black"/>
-                </a:solidFill>
-              </a:rPr>
-              <a:t>© Copyright Showeet.com – Creative &amp; Free PowerPoint Templates</a:t>
+              <a:rPr lang="en-US" dirty="0" err="1"/>
+              <a:t>Sommaire</a:t>
             </a:r>
-            <a:endParaRPr lang="en-US"/>
+            <a:endParaRPr lang="en-US" dirty="0"/>
           </a:p>
         </p:txBody>
       </p:sp>
@@ -8054,14 +8330,14 @@
           <a:lstStyle/>
           <a:p>
             <a:r>
-              <a:rPr lang="en-US" sz="1200">
+              <a:rPr lang="fr-FR" sz="1200" noProof="0" dirty="0">
                 <a:solidFill>
                   <a:prstClr val="black"/>
                 </a:solidFill>
               </a:rPr>
-              <a:t>© Copyright Showeet.com – Creative &amp; Free PowerPoint Templates</a:t>
+              <a:t>Premier chapitre : Quels problèmes cherchons nous à résoudre ?</a:t>
             </a:r>
-            <a:endParaRPr lang="en-US"/>
+            <a:endParaRPr lang="fr-FR" noProof="0" dirty="0"/>
           </a:p>
         </p:txBody>
       </p:sp>
@@ -8147,14 +8423,15 @@
           <a:lstStyle/>
           <a:p>
             <a:r>
-              <a:rPr lang="en-US" sz="1200">
-                <a:solidFill>
-                  <a:prstClr val="black"/>
-                </a:solidFill>
-              </a:rPr>
-              <a:t>© Copyright Showeet.com – Creative &amp; Free PowerPoint Templates</a:t>
+              <a:rPr lang="fr-FR" dirty="0"/>
+              <a:t>Prenons Word comme exemple. La barre d’outil est équipée d’un ensemble de boutons qui permettent d’effectuer diverses opérations dans l’éditeur. On peut donc imaginer une classe Bouton qui peut être utilisée pour les boutons de la barre d’outils ou pour les boutons génériques des différentes boîtes de dialogue.</a:t>
             </a:r>
-            <a:endParaRPr lang="en-US"/>
+          </a:p>
+          <a:p>
+            <a:endParaRPr lang="fr-FR" dirty="0"/>
+          </a:p>
+          <a:p>
+            <a:endParaRPr lang="en-US" dirty="0"/>
           </a:p>
         </p:txBody>
       </p:sp>
@@ -8185,7 +8462,7 @@
     </p:spTree>
     <p:extLst>
       <p:ext uri="{BB962C8B-B14F-4D97-AF65-F5344CB8AC3E}">
-        <p14:creationId xmlns:p14="http://schemas.microsoft.com/office/powerpoint/2010/main" val="590651591"/>
+        <p14:creationId xmlns:p14="http://schemas.microsoft.com/office/powerpoint/2010/main" val="117351488"/>
       </p:ext>
     </p:extLst>
   </p:cSld>
@@ -8240,14 +8517,39 @@
           <a:lstStyle/>
           <a:p>
             <a:r>
-              <a:rPr lang="en-US" sz="1200">
+              <a:rPr lang="fr-FR" b="0" i="0" dirty="0">
                 <a:solidFill>
-                  <a:prstClr val="black"/>
+                  <a:srgbClr val="444444"/>
                 </a:solidFill>
+                <a:effectLst/>
+                <a:latin typeface="PT Sans"/>
               </a:rPr>
-              <a:t>© Copyright Showeet.com – Creative &amp; Free PowerPoint Templates</a:t>
+              <a:t>Ces boutons se ressemblent, mais ils sont censés effectuer des actions différentes. On peut imagine que le plus simple serait de créer des classes enfant qui hériteraient de la classe </a:t>
             </a:r>
-            <a:endParaRPr lang="en-US"/>
+            <a:r>
+              <a:rPr lang="fr-FR" b="0" i="0">
+                <a:solidFill>
+                  <a:srgbClr val="444444"/>
+                </a:solidFill>
+                <a:effectLst/>
+                <a:latin typeface="PT Sans"/>
+              </a:rPr>
+              <a:t>Bouton.Ces</a:t>
+            </a:r>
+            <a:r>
+              <a:rPr lang="fr-FR" b="0" i="0" dirty="0">
+                <a:solidFill>
+                  <a:srgbClr val="444444"/>
+                </a:solidFill>
+                <a:effectLst/>
+                <a:latin typeface="PT Sans"/>
+              </a:rPr>
+              <a:t> sous-classes vont contenir le code exécuté lors d’un clic sur un bouton.</a:t>
+            </a:r>
+            <a:endParaRPr lang="fr-FR" dirty="0"/>
+          </a:p>
+          <a:p>
+            <a:endParaRPr lang="en-US" dirty="0"/>
           </a:p>
         </p:txBody>
       </p:sp>
@@ -8278,7 +8580,7 @@
     </p:spTree>
     <p:extLst>
       <p:ext uri="{BB962C8B-B14F-4D97-AF65-F5344CB8AC3E}">
-        <p14:creationId xmlns:p14="http://schemas.microsoft.com/office/powerpoint/2010/main" val="852387929"/>
+        <p14:creationId xmlns:p14="http://schemas.microsoft.com/office/powerpoint/2010/main" val="1921687789"/>
       </p:ext>
     </p:extLst>
   </p:cSld>
@@ -8371,7 +8673,7 @@
     </p:spTree>
     <p:extLst>
       <p:ext uri="{BB962C8B-B14F-4D97-AF65-F5344CB8AC3E}">
-        <p14:creationId xmlns:p14="http://schemas.microsoft.com/office/powerpoint/2010/main" val="3584205330"/>
+        <p14:creationId xmlns:p14="http://schemas.microsoft.com/office/powerpoint/2010/main" val="1346694715"/>
       </p:ext>
     </p:extLst>
   </p:cSld>
@@ -8464,7 +8766,7 @@
     </p:spTree>
     <p:extLst>
       <p:ext uri="{BB962C8B-B14F-4D97-AF65-F5344CB8AC3E}">
-        <p14:creationId xmlns:p14="http://schemas.microsoft.com/office/powerpoint/2010/main" val="3552511973"/>
+        <p14:creationId xmlns:p14="http://schemas.microsoft.com/office/powerpoint/2010/main" val="590651591"/>
       </p:ext>
     </p:extLst>
   </p:cSld>
@@ -8557,7 +8859,7 @@
     </p:spTree>
     <p:extLst>
       <p:ext uri="{BB962C8B-B14F-4D97-AF65-F5344CB8AC3E}">
-        <p14:creationId xmlns:p14="http://schemas.microsoft.com/office/powerpoint/2010/main" val="372831945"/>
+        <p14:creationId xmlns:p14="http://schemas.microsoft.com/office/powerpoint/2010/main" val="852387929"/>
       </p:ext>
     </p:extLst>
   </p:cSld>
@@ -8570,14 +8872,6 @@
 <file path=ppt/slideLayouts/slideLayout1.xml><?xml version="1.0" encoding="utf-8"?>
 <p:sldLayout xmlns:a="http://schemas.openxmlformats.org/drawingml/2006/main" xmlns:r="http://schemas.openxmlformats.org/officeDocument/2006/relationships" xmlns:p="http://schemas.openxmlformats.org/presentationml/2006/main" type="title" preserve="1">
   <p:cSld name="Title Slide 1">
-    <p:bg>
-      <p:bgPr>
-        <a:solidFill>
-          <a:schemeClr val="accent1"/>
-        </a:solidFill>
-        <a:effectLst/>
-      </p:bgPr>
-    </p:bg>
     <p:spTree>
       <p:nvGrpSpPr>
         <p:cNvPr id="1" name=""/>
@@ -9568,14 +9862,6 @@
 <file path=ppt/slideLayouts/slideLayout10.xml><?xml version="1.0" encoding="utf-8"?>
 <p:sldLayout xmlns:a="http://schemas.openxmlformats.org/drawingml/2006/main" xmlns:r="http://schemas.openxmlformats.org/officeDocument/2006/relationships" xmlns:p="http://schemas.openxmlformats.org/presentationml/2006/main" preserve="1" userDrawn="1">
   <p:cSld name="2_Section Header">
-    <p:bg>
-      <p:bgPr>
-        <a:solidFill>
-          <a:schemeClr val="accent1"/>
-        </a:solidFill>
-        <a:effectLst/>
-      </p:bgPr>
-    </p:bg>
     <p:spTree>
       <p:nvGrpSpPr>
         <p:cNvPr id="1" name=""/>
@@ -10595,14 +10881,6 @@
 <file path=ppt/slideLayouts/slideLayout11.xml><?xml version="1.0" encoding="utf-8"?>
 <p:sldLayout xmlns:a="http://schemas.openxmlformats.org/drawingml/2006/main" xmlns:r="http://schemas.openxmlformats.org/officeDocument/2006/relationships" xmlns:p="http://schemas.openxmlformats.org/presentationml/2006/main" preserve="1" userDrawn="1">
   <p:cSld name="Section Header 2 w Photo">
-    <p:bg>
-      <p:bgPr>
-        <a:solidFill>
-          <a:schemeClr val="accent1"/>
-        </a:solidFill>
-        <a:effectLst/>
-      </p:bgPr>
-    </p:bg>
     <p:spTree>
       <p:nvGrpSpPr>
         <p:cNvPr id="1" name=""/>
@@ -11629,14 +11907,6 @@
 <file path=ppt/slideLayouts/slideLayout12.xml><?xml version="1.0" encoding="utf-8"?>
 <p:sldLayout xmlns:a="http://schemas.openxmlformats.org/drawingml/2006/main" xmlns:r="http://schemas.openxmlformats.org/officeDocument/2006/relationships" xmlns:p="http://schemas.openxmlformats.org/presentationml/2006/main" preserve="1" userDrawn="1">
   <p:cSld name="Section Header 2 w Photo (bis)">
-    <p:bg>
-      <p:bgPr>
-        <a:solidFill>
-          <a:schemeClr val="accent1"/>
-        </a:solidFill>
-        <a:effectLst/>
-      </p:bgPr>
-    </p:bg>
     <p:spTree>
       <p:nvGrpSpPr>
         <p:cNvPr id="1" name=""/>
@@ -12663,14 +12933,6 @@
 <file path=ppt/slideLayouts/slideLayout13.xml><?xml version="1.0" encoding="utf-8"?>
 <p:sldLayout xmlns:a="http://schemas.openxmlformats.org/drawingml/2006/main" xmlns:r="http://schemas.openxmlformats.org/officeDocument/2006/relationships" xmlns:p="http://schemas.openxmlformats.org/presentationml/2006/main" preserve="1" userDrawn="1">
   <p:cSld name="Quote">
-    <p:bg>
-      <p:bgPr>
-        <a:solidFill>
-          <a:schemeClr val="accent1"/>
-        </a:solidFill>
-        <a:effectLst/>
-      </p:bgPr>
-    </p:bg>
     <p:spTree>
       <p:nvGrpSpPr>
         <p:cNvPr id="1" name=""/>
@@ -19748,14 +20010,6 @@
 <file path=ppt/slideLayouts/slideLayout5.xml><?xml version="1.0" encoding="utf-8"?>
 <p:sldLayout xmlns:a="http://schemas.openxmlformats.org/drawingml/2006/main" xmlns:r="http://schemas.openxmlformats.org/officeDocument/2006/relationships" xmlns:p="http://schemas.openxmlformats.org/presentationml/2006/main" preserve="1" userDrawn="1">
   <p:cSld name="Title and Content w Number (Dark)">
-    <p:bg>
-      <p:bgPr>
-        <a:solidFill>
-          <a:schemeClr val="accent1"/>
-        </a:solidFill>
-        <a:effectLst/>
-      </p:bgPr>
-    </p:bg>
     <p:spTree>
       <p:nvGrpSpPr>
         <p:cNvPr id="1" name=""/>
@@ -23074,14 +23328,6 @@
 <file path=ppt/slideLayouts/slideLayout8.xml><?xml version="1.0" encoding="utf-8"?>
 <p:sldLayout xmlns:a="http://schemas.openxmlformats.org/drawingml/2006/main" xmlns:r="http://schemas.openxmlformats.org/officeDocument/2006/relationships" xmlns:p="http://schemas.openxmlformats.org/presentationml/2006/main" preserve="1" userDrawn="1">
   <p:cSld name="Section Header (Dark)">
-    <p:bg>
-      <p:bgPr>
-        <a:solidFill>
-          <a:schemeClr val="accent1"/>
-        </a:solidFill>
-        <a:effectLst/>
-      </p:bgPr>
-    </p:bg>
     <p:spTree>
       <p:nvGrpSpPr>
         <p:cNvPr id="1" name=""/>
@@ -24230,14 +24476,6 @@
 <file path=ppt/slideLayouts/slideLayout9.xml><?xml version="1.0" encoding="utf-8"?>
 <p:sldLayout xmlns:a="http://schemas.openxmlformats.org/drawingml/2006/main" xmlns:r="http://schemas.openxmlformats.org/officeDocument/2006/relationships" xmlns:p="http://schemas.openxmlformats.org/presentationml/2006/main" preserve="1" userDrawn="1">
   <p:cSld name="Section Header w Photo (Dark)">
-    <p:bg>
-      <p:bgPr>
-        <a:solidFill>
-          <a:schemeClr val="accent1"/>
-        </a:solidFill>
-        <a:effectLst/>
-      </p:bgPr>
-    </p:bg>
     <p:spTree>
       <p:nvGrpSpPr>
         <p:cNvPr id="1" name=""/>
@@ -27063,6 +27301,399 @@
       </p:grpSpPr>
       <p:sp>
         <p:nvSpPr>
+          <p:cNvPr id="2" name="Title 1"/>
+          <p:cNvSpPr>
+            <a:spLocks noGrp="1"/>
+          </p:cNvSpPr>
+          <p:nvPr>
+            <p:ph type="title"/>
+          </p:nvPr>
+        </p:nvSpPr>
+        <p:spPr/>
+        <p:txBody>
+          <a:bodyPr/>
+          <a:lstStyle/>
+          <a:p>
+            <a:r>
+              <a:rPr lang="fr-FR" dirty="0"/>
+              <a:t>Présentation d’une </a:t>
+            </a:r>
+            <a:br>
+              <a:rPr lang="fr-FR" dirty="0"/>
+            </a:br>
+            <a:r>
+              <a:rPr lang="fr-FR" dirty="0"/>
+              <a:t>petite implémentation</a:t>
+            </a:r>
+          </a:p>
+        </p:txBody>
+      </p:sp>
+      <p:sp>
+        <p:nvSpPr>
+          <p:cNvPr id="16" name="Text Placeholder 15"/>
+          <p:cNvSpPr>
+            <a:spLocks noGrp="1"/>
+          </p:cNvSpPr>
+          <p:nvPr>
+            <p:ph type="body" idx="1"/>
+          </p:nvPr>
+        </p:nvSpPr>
+        <p:spPr/>
+        <p:txBody>
+          <a:bodyPr>
+            <a:noAutofit/>
+          </a:bodyPr>
+          <a:lstStyle/>
+          <a:p>
+            <a:r>
+              <a:rPr lang="fr-FR" dirty="0"/>
+              <a:t>Microsoft Word peut trembler !</a:t>
+            </a:r>
+          </a:p>
+        </p:txBody>
+      </p:sp>
+      <p:sp>
+        <p:nvSpPr>
+          <p:cNvPr id="38" name="Date Placeholder 37">
+            <a:extLst>
+              <a:ext uri="{FF2B5EF4-FFF2-40B4-BE49-F238E27FC236}">
+                <a16:creationId xmlns:a16="http://schemas.microsoft.com/office/drawing/2014/main" id="{214893A6-5453-4772-A5C3-6E8247B9F7F7}"/>
+              </a:ext>
+            </a:extLst>
+          </p:cNvPr>
+          <p:cNvSpPr>
+            <a:spLocks noGrp="1"/>
+          </p:cNvSpPr>
+          <p:nvPr>
+            <p:ph type="dt" sz="half" idx="10"/>
+          </p:nvPr>
+        </p:nvSpPr>
+        <p:spPr/>
+        <p:txBody>
+          <a:bodyPr/>
+          <a:lstStyle/>
+          <a:p>
+            <a:r>
+              <a:rPr lang="fr-FR"/>
+              <a:t>04 février 2021</a:t>
+            </a:r>
+            <a:endParaRPr lang="en-US"/>
+          </a:p>
+        </p:txBody>
+      </p:sp>
+      <p:sp>
+        <p:nvSpPr>
+          <p:cNvPr id="39" name="Footer Placeholder 38">
+            <a:extLst>
+              <a:ext uri="{FF2B5EF4-FFF2-40B4-BE49-F238E27FC236}">
+                <a16:creationId xmlns:a16="http://schemas.microsoft.com/office/drawing/2014/main" id="{19A88EA5-E6FB-4BFB-9421-CB6C4447B890}"/>
+              </a:ext>
+            </a:extLst>
+          </p:cNvPr>
+          <p:cNvSpPr>
+            <a:spLocks noGrp="1"/>
+          </p:cNvSpPr>
+          <p:nvPr>
+            <p:ph type="ftr" sz="quarter" idx="11"/>
+          </p:nvPr>
+        </p:nvSpPr>
+        <p:spPr/>
+        <p:txBody>
+          <a:bodyPr/>
+          <a:lstStyle/>
+          <a:p>
+            <a:r>
+              <a:rPr lang="fr-FR"/>
+              <a:t>Command &amp; Memento - Aurélien BOUDIER</a:t>
+            </a:r>
+            <a:endParaRPr lang="en-US"/>
+          </a:p>
+        </p:txBody>
+      </p:sp>
+    </p:spTree>
+    <p:extLst>
+      <p:ext uri="{BB962C8B-B14F-4D97-AF65-F5344CB8AC3E}">
+        <p14:creationId xmlns:p14="http://schemas.microsoft.com/office/powerpoint/2010/main" val="2565046013"/>
+      </p:ext>
+    </p:extLst>
+  </p:cSld>
+  <p:clrMapOvr>
+    <a:masterClrMapping/>
+  </p:clrMapOvr>
+</p:sld>
+</file>
+
+<file path=ppt/slides/slide11.xml><?xml version="1.0" encoding="utf-8"?>
+<p:sld xmlns:a="http://schemas.openxmlformats.org/drawingml/2006/main" xmlns:r="http://schemas.openxmlformats.org/officeDocument/2006/relationships" xmlns:p="http://schemas.openxmlformats.org/presentationml/2006/main">
+  <p:cSld>
+    <p:spTree>
+      <p:nvGrpSpPr>
+        <p:cNvPr id="1" name=""/>
+        <p:cNvGrpSpPr/>
+        <p:nvPr/>
+      </p:nvGrpSpPr>
+      <p:grpSpPr>
+        <a:xfrm>
+          <a:off x="0" y="0"/>
+          <a:ext cx="0" cy="0"/>
+          <a:chOff x="0" y="0"/>
+          <a:chExt cx="0" cy="0"/>
+        </a:xfrm>
+      </p:grpSpPr>
+      <p:sp>
+        <p:nvSpPr>
+          <p:cNvPr id="2" name="Title 1"/>
+          <p:cNvSpPr>
+            <a:spLocks noGrp="1"/>
+          </p:cNvSpPr>
+          <p:nvPr>
+            <p:ph type="title"/>
+          </p:nvPr>
+        </p:nvSpPr>
+        <p:spPr/>
+        <p:txBody>
+          <a:bodyPr/>
+          <a:lstStyle/>
+          <a:p>
+            <a:r>
+              <a:rPr lang="fr-FR" dirty="0"/>
+              <a:t>Diagrammes génériques</a:t>
+            </a:r>
+          </a:p>
+        </p:txBody>
+      </p:sp>
+      <p:sp>
+        <p:nvSpPr>
+          <p:cNvPr id="38" name="Date Placeholder 37">
+            <a:extLst>
+              <a:ext uri="{FF2B5EF4-FFF2-40B4-BE49-F238E27FC236}">
+                <a16:creationId xmlns:a16="http://schemas.microsoft.com/office/drawing/2014/main" id="{214893A6-5453-4772-A5C3-6E8247B9F7F7}"/>
+              </a:ext>
+            </a:extLst>
+          </p:cNvPr>
+          <p:cNvSpPr>
+            <a:spLocks noGrp="1"/>
+          </p:cNvSpPr>
+          <p:nvPr>
+            <p:ph type="dt" sz="half" idx="10"/>
+          </p:nvPr>
+        </p:nvSpPr>
+        <p:spPr/>
+        <p:txBody>
+          <a:bodyPr/>
+          <a:lstStyle/>
+          <a:p>
+            <a:r>
+              <a:rPr lang="fr-FR"/>
+              <a:t>04 février 2021</a:t>
+            </a:r>
+            <a:endParaRPr lang="en-US"/>
+          </a:p>
+        </p:txBody>
+      </p:sp>
+      <p:sp>
+        <p:nvSpPr>
+          <p:cNvPr id="39" name="Footer Placeholder 38">
+            <a:extLst>
+              <a:ext uri="{FF2B5EF4-FFF2-40B4-BE49-F238E27FC236}">
+                <a16:creationId xmlns:a16="http://schemas.microsoft.com/office/drawing/2014/main" id="{19A88EA5-E6FB-4BFB-9421-CB6C4447B890}"/>
+              </a:ext>
+            </a:extLst>
+          </p:cNvPr>
+          <p:cNvSpPr>
+            <a:spLocks noGrp="1"/>
+          </p:cNvSpPr>
+          <p:nvPr>
+            <p:ph type="ftr" sz="quarter" idx="11"/>
+          </p:nvPr>
+        </p:nvSpPr>
+        <p:spPr/>
+        <p:txBody>
+          <a:bodyPr/>
+          <a:lstStyle/>
+          <a:p>
+            <a:r>
+              <a:rPr lang="fr-FR"/>
+              <a:t>Command &amp; Memento - Aurélien BOUDIER</a:t>
+            </a:r>
+            <a:endParaRPr lang="en-US"/>
+          </a:p>
+        </p:txBody>
+      </p:sp>
+    </p:spTree>
+    <p:extLst>
+      <p:ext uri="{BB962C8B-B14F-4D97-AF65-F5344CB8AC3E}">
+        <p14:creationId xmlns:p14="http://schemas.microsoft.com/office/powerpoint/2010/main" val="2376558637"/>
+      </p:ext>
+    </p:extLst>
+  </p:cSld>
+  <p:clrMapOvr>
+    <a:masterClrMapping/>
+  </p:clrMapOvr>
+</p:sld>
+</file>
+
+<file path=ppt/slides/slide12.xml><?xml version="1.0" encoding="utf-8"?>
+<p:sld xmlns:a="http://schemas.openxmlformats.org/drawingml/2006/main" xmlns:r="http://schemas.openxmlformats.org/officeDocument/2006/relationships" xmlns:p="http://schemas.openxmlformats.org/presentationml/2006/main">
+  <p:cSld>
+    <p:spTree>
+      <p:nvGrpSpPr>
+        <p:cNvPr id="1" name=""/>
+        <p:cNvGrpSpPr/>
+        <p:nvPr/>
+      </p:nvGrpSpPr>
+      <p:grpSpPr>
+        <a:xfrm>
+          <a:off x="0" y="0"/>
+          <a:ext cx="0" cy="0"/>
+          <a:chOff x="0" y="0"/>
+          <a:chExt cx="0" cy="0"/>
+        </a:xfrm>
+      </p:grpSpPr>
+      <p:sp>
+        <p:nvSpPr>
+          <p:cNvPr id="2" name="Title 1"/>
+          <p:cNvSpPr>
+            <a:spLocks noGrp="1"/>
+          </p:cNvSpPr>
+          <p:nvPr>
+            <p:ph type="title"/>
+          </p:nvPr>
+        </p:nvSpPr>
+        <p:spPr/>
+        <p:txBody>
+          <a:bodyPr/>
+          <a:lstStyle/>
+          <a:p>
+            <a:r>
+              <a:rPr lang="fr-FR" dirty="0"/>
+              <a:t>Avantages &amp; </a:t>
+            </a:r>
+            <a:br>
+              <a:rPr lang="fr-FR" dirty="0"/>
+            </a:br>
+            <a:r>
+              <a:rPr lang="fr-FR" dirty="0"/>
+              <a:t>désavantages</a:t>
+            </a:r>
+          </a:p>
+        </p:txBody>
+      </p:sp>
+      <p:sp>
+        <p:nvSpPr>
+          <p:cNvPr id="16" name="Text Placeholder 15"/>
+          <p:cNvSpPr>
+            <a:spLocks noGrp="1"/>
+          </p:cNvSpPr>
+          <p:nvPr>
+            <p:ph type="body" idx="1"/>
+          </p:nvPr>
+        </p:nvSpPr>
+        <p:spPr/>
+        <p:txBody>
+          <a:bodyPr>
+            <a:noAutofit/>
+          </a:bodyPr>
+          <a:lstStyle/>
+          <a:p>
+            <a:r>
+              <a:rPr lang="fr-FR" dirty="0"/>
+              <a:t>Tout avantage a ses inconvénients et réciproquement</a:t>
+            </a:r>
+            <a:endParaRPr lang="en-US" dirty="0"/>
+          </a:p>
+        </p:txBody>
+      </p:sp>
+      <p:sp>
+        <p:nvSpPr>
+          <p:cNvPr id="38" name="Date Placeholder 37">
+            <a:extLst>
+              <a:ext uri="{FF2B5EF4-FFF2-40B4-BE49-F238E27FC236}">
+                <a16:creationId xmlns:a16="http://schemas.microsoft.com/office/drawing/2014/main" id="{214893A6-5453-4772-A5C3-6E8247B9F7F7}"/>
+              </a:ext>
+            </a:extLst>
+          </p:cNvPr>
+          <p:cNvSpPr>
+            <a:spLocks noGrp="1"/>
+          </p:cNvSpPr>
+          <p:nvPr>
+            <p:ph type="dt" sz="half" idx="10"/>
+          </p:nvPr>
+        </p:nvSpPr>
+        <p:spPr/>
+        <p:txBody>
+          <a:bodyPr/>
+          <a:lstStyle/>
+          <a:p>
+            <a:r>
+              <a:rPr lang="fr-FR"/>
+              <a:t>04 février 2021</a:t>
+            </a:r>
+            <a:endParaRPr lang="en-US"/>
+          </a:p>
+        </p:txBody>
+      </p:sp>
+      <p:sp>
+        <p:nvSpPr>
+          <p:cNvPr id="39" name="Footer Placeholder 38">
+            <a:extLst>
+              <a:ext uri="{FF2B5EF4-FFF2-40B4-BE49-F238E27FC236}">
+                <a16:creationId xmlns:a16="http://schemas.microsoft.com/office/drawing/2014/main" id="{19A88EA5-E6FB-4BFB-9421-CB6C4447B890}"/>
+              </a:ext>
+            </a:extLst>
+          </p:cNvPr>
+          <p:cNvSpPr>
+            <a:spLocks noGrp="1"/>
+          </p:cNvSpPr>
+          <p:nvPr>
+            <p:ph type="ftr" sz="quarter" idx="11"/>
+          </p:nvPr>
+        </p:nvSpPr>
+        <p:spPr/>
+        <p:txBody>
+          <a:bodyPr/>
+          <a:lstStyle/>
+          <a:p>
+            <a:r>
+              <a:rPr lang="fr-FR"/>
+              <a:t>Command &amp; Memento - Aurélien BOUDIER</a:t>
+            </a:r>
+            <a:endParaRPr lang="en-US"/>
+          </a:p>
+        </p:txBody>
+      </p:sp>
+    </p:spTree>
+    <p:extLst>
+      <p:ext uri="{BB962C8B-B14F-4D97-AF65-F5344CB8AC3E}">
+        <p14:creationId xmlns:p14="http://schemas.microsoft.com/office/powerpoint/2010/main" val="3633152721"/>
+      </p:ext>
+    </p:extLst>
+  </p:cSld>
+  <p:clrMapOvr>
+    <a:masterClrMapping/>
+  </p:clrMapOvr>
+</p:sld>
+</file>
+
+<file path=ppt/slides/slide13.xml><?xml version="1.0" encoding="utf-8"?>
+<p:sld xmlns:a="http://schemas.openxmlformats.org/drawingml/2006/main" xmlns:r="http://schemas.openxmlformats.org/officeDocument/2006/relationships" xmlns:p="http://schemas.openxmlformats.org/presentationml/2006/main">
+  <p:cSld>
+    <p:spTree>
+      <p:nvGrpSpPr>
+        <p:cNvPr id="1" name=""/>
+        <p:cNvGrpSpPr/>
+        <p:nvPr/>
+      </p:nvGrpSpPr>
+      <p:grpSpPr>
+        <a:xfrm>
+          <a:off x="0" y="0"/>
+          <a:ext cx="0" cy="0"/>
+          <a:chOff x="0" y="0"/>
+          <a:chExt cx="0" cy="0"/>
+        </a:xfrm>
+      </p:grpSpPr>
+      <p:sp>
+        <p:nvSpPr>
           <p:cNvPr id="7" name="Title 6"/>
           <p:cNvSpPr>
             <a:spLocks noGrp="1"/>
@@ -27079,11 +27710,11 @@
           <a:lstStyle/>
           <a:p>
             <a:r>
-              <a:rPr lang="en-US"/>
+              <a:rPr lang="en-US" dirty="0"/>
               <a:t>Use a title with </a:t>
             </a:r>
             <a:r>
-              <a:rPr lang="en-US">
+              <a:rPr lang="en-US" dirty="0">
                 <a:solidFill>
                   <a:schemeClr val="accent2"/>
                 </a:solidFill>
@@ -27091,11 +27722,11 @@
               <a:t>specific</a:t>
             </a:r>
             <a:r>
-              <a:rPr lang="en-US"/>
+              <a:rPr lang="en-US" dirty="0"/>
               <a:t> &amp; </a:t>
             </a:r>
             <a:r>
-              <a:rPr lang="en-US">
+              <a:rPr lang="en-US" dirty="0">
                 <a:solidFill>
                   <a:schemeClr val="accent2"/>
                 </a:solidFill>
@@ -27103,7 +27734,7 @@
               <a:t>relevant</a:t>
             </a:r>
             <a:r>
-              <a:rPr lang="en-US"/>
+              <a:rPr lang="en-US" dirty="0"/>
               <a:t> (only) content</a:t>
             </a:r>
           </a:p>
@@ -27128,11 +27759,11 @@
           <a:p>
             <a:pPr marL="511175" indent="-511175"/>
             <a:r>
-              <a:rPr lang="en-US"/>
+              <a:rPr lang="en-US" dirty="0"/>
               <a:t>People </a:t>
             </a:r>
             <a:r>
-              <a:rPr lang="en-US" cap="all">
+              <a:rPr lang="en-US" cap="all" dirty="0">
                 <a:solidFill>
                   <a:schemeClr val="accent3"/>
                 </a:solidFill>
@@ -27140,18 +27771,18 @@
               <a:t>can’t</a:t>
             </a:r>
             <a:r>
-              <a:rPr lang="en-US"/>
+              <a:rPr lang="en-US" dirty="0"/>
               <a:t> listen while reading your slide.</a:t>
             </a:r>
           </a:p>
           <a:p>
             <a:pPr marL="511175" indent="-511175"/>
             <a:r>
-              <a:rPr lang="en-US"/>
+              <a:rPr lang="en-US" dirty="0"/>
               <a:t>Always stick to the </a:t>
             </a:r>
             <a:r>
-              <a:rPr lang="en-US">
+              <a:rPr lang="en-US" dirty="0">
                 <a:solidFill>
                   <a:schemeClr val="accent3"/>
                 </a:solidFill>
@@ -27159,18 +27790,18 @@
               <a:t>most important </a:t>
             </a:r>
             <a:r>
-              <a:rPr lang="en-US"/>
+              <a:rPr lang="en-US" dirty="0"/>
               <a:t>message.</a:t>
             </a:r>
           </a:p>
           <a:p>
             <a:pPr marL="511175" indent="-511175"/>
             <a:r>
-              <a:rPr lang="en-US"/>
+              <a:rPr lang="en-US" dirty="0"/>
               <a:t>Less is more… be </a:t>
             </a:r>
             <a:r>
-              <a:rPr lang="en-US" cap="all">
+              <a:rPr lang="en-US" cap="all" dirty="0">
                 <a:solidFill>
                   <a:schemeClr val="accent3"/>
                 </a:solidFill>
@@ -27178,18 +27809,18 @@
               <a:t>concise</a:t>
             </a:r>
             <a:r>
-              <a:rPr lang="en-US"/>
+              <a:rPr lang="en-US" dirty="0"/>
               <a:t>.</a:t>
             </a:r>
           </a:p>
           <a:p>
             <a:pPr marL="511175" indent="-511175"/>
             <a:r>
-              <a:rPr lang="en-US"/>
+              <a:rPr lang="en-US" dirty="0"/>
               <a:t>And don’t kill your presentation with too many bullet point slides. Use </a:t>
             </a:r>
             <a:r>
-              <a:rPr lang="en-US" cap="all">
+              <a:rPr lang="en-US" cap="all" dirty="0">
                 <a:solidFill>
                   <a:schemeClr val="accent3"/>
                 </a:solidFill>
@@ -27197,7 +27828,7 @@
               <a:t>visuals</a:t>
             </a:r>
             <a:r>
-              <a:rPr lang="en-US"/>
+              <a:rPr lang="en-US" dirty="0"/>
               <a:t> instead!</a:t>
             </a:r>
           </a:p>
@@ -27280,7 +27911,7 @@
     </p:spTree>
     <p:extLst>
       <p:ext uri="{BB962C8B-B14F-4D97-AF65-F5344CB8AC3E}">
-        <p14:creationId xmlns:p14="http://schemas.microsoft.com/office/powerpoint/2010/main" val="3593433705"/>
+        <p14:creationId xmlns:p14="http://schemas.microsoft.com/office/powerpoint/2010/main" val="2551747364"/>
       </p:ext>
     </p:extLst>
   </p:cSld>
@@ -27290,7 +27921,7 @@
 </p:sld>
 </file>
 
-<file path=ppt/slides/slide11.xml><?xml version="1.0" encoding="utf-8"?>
+<file path=ppt/slides/slide14.xml><?xml version="1.0" encoding="utf-8"?>
 <p:sld xmlns:a="http://schemas.openxmlformats.org/drawingml/2006/main" xmlns:r="http://schemas.openxmlformats.org/officeDocument/2006/relationships" xmlns:p="http://schemas.openxmlformats.org/presentationml/2006/main">
   <p:cSld>
     <p:spTree>
@@ -27527,7 +28158,7 @@
 </p:sld>
 </file>
 
-<file path=ppt/slides/slide12.xml><?xml version="1.0" encoding="utf-8"?>
+<file path=ppt/slides/slide15.xml><?xml version="1.0" encoding="utf-8"?>
 <p:sld xmlns:a="http://schemas.openxmlformats.org/drawingml/2006/main" xmlns:r="http://schemas.openxmlformats.org/officeDocument/2006/relationships" xmlns:p="http://schemas.openxmlformats.org/presentationml/2006/main">
   <p:cSld>
     <p:spTree>
@@ -27740,7 +28371,7 @@
 </p:sld>
 </file>
 
-<file path=ppt/slides/slide13.xml><?xml version="1.0" encoding="utf-8"?>
+<file path=ppt/slides/slide16.xml><?xml version="1.0" encoding="utf-8"?>
 <p:sld xmlns:a="http://schemas.openxmlformats.org/drawingml/2006/main" xmlns:r="http://schemas.openxmlformats.org/officeDocument/2006/relationships" xmlns:p="http://schemas.openxmlformats.org/presentationml/2006/main">
   <p:cSld>
     <p:spTree>
@@ -27873,10 +28504,10 @@
       </p:sp>
       <p:sp>
         <p:nvSpPr>
-          <p:cNvPr id="3" name="Picture Placeholder 2">
+          <p:cNvPr id="13" name="Espace réservé pour une image  12">
             <a:extLst>
               <a:ext uri="{FF2B5EF4-FFF2-40B4-BE49-F238E27FC236}">
-                <a16:creationId xmlns:a16="http://schemas.microsoft.com/office/drawing/2014/main" id="{D175E2E4-98BD-4E7E-9A6B-2A222F0B7111}"/>
+                <a16:creationId xmlns:a16="http://schemas.microsoft.com/office/drawing/2014/main" id="{B35C2CA8-FE75-4B19-A6B3-988067F60AF8}"/>
               </a:ext>
             </a:extLst>
           </p:cNvPr>
@@ -27902,7 +28533,7 @@
 </p:sld>
 </file>
 
-<file path=ppt/slides/slide14.xml><?xml version="1.0" encoding="utf-8"?>
+<file path=ppt/slides/slide17.xml><?xml version="1.0" encoding="utf-8"?>
 <p:sld xmlns:a="http://schemas.openxmlformats.org/drawingml/2006/main" xmlns:r="http://schemas.openxmlformats.org/officeDocument/2006/relationships" xmlns:p="http://schemas.openxmlformats.org/presentationml/2006/main">
   <p:cSld>
     <p:spTree>
@@ -28046,7 +28677,7 @@
 </p:sld>
 </file>
 
-<file path=ppt/slides/slide15.xml><?xml version="1.0" encoding="utf-8"?>
+<file path=ppt/slides/slide18.xml><?xml version="1.0" encoding="utf-8"?>
 <p:sld xmlns:a="http://schemas.openxmlformats.org/drawingml/2006/main" xmlns:r="http://schemas.openxmlformats.org/officeDocument/2006/relationships" xmlns:p="http://schemas.openxmlformats.org/presentationml/2006/main">
   <p:cSld>
     <p:spTree>
@@ -28200,7 +28831,7 @@
 </p:sld>
 </file>
 
-<file path=ppt/slides/slide16.xml><?xml version="1.0" encoding="utf-8"?>
+<file path=ppt/slides/slide19.xml><?xml version="1.0" encoding="utf-8"?>
 <p:sld xmlns:a="http://schemas.openxmlformats.org/drawingml/2006/main" xmlns:r="http://schemas.openxmlformats.org/officeDocument/2006/relationships" xmlns:p="http://schemas.openxmlformats.org/presentationml/2006/main">
   <p:cSld>
     <p:spTree>
@@ -31174,7 +31805,141 @@
 </p:sld>
 </file>
 
-<file path=ppt/slides/slide17.xml><?xml version="1.0" encoding="utf-8"?>
+<file path=ppt/slides/slide2.xml><?xml version="1.0" encoding="utf-8"?>
+<p:sld xmlns:a="http://schemas.openxmlformats.org/drawingml/2006/main" xmlns:r="http://schemas.openxmlformats.org/officeDocument/2006/relationships" xmlns:p="http://schemas.openxmlformats.org/presentationml/2006/main">
+  <p:cSld>
+    <p:spTree>
+      <p:nvGrpSpPr>
+        <p:cNvPr id="1" name=""/>
+        <p:cNvGrpSpPr/>
+        <p:nvPr/>
+      </p:nvGrpSpPr>
+      <p:grpSpPr>
+        <a:xfrm>
+          <a:off x="0" y="0"/>
+          <a:ext cx="0" cy="0"/>
+          <a:chOff x="0" y="0"/>
+          <a:chExt cx="0" cy="0"/>
+        </a:xfrm>
+      </p:grpSpPr>
+      <p:sp>
+        <p:nvSpPr>
+          <p:cNvPr id="2" name="Title 1"/>
+          <p:cNvSpPr>
+            <a:spLocks noGrp="1"/>
+          </p:cNvSpPr>
+          <p:nvPr>
+            <p:ph type="title"/>
+          </p:nvPr>
+        </p:nvSpPr>
+        <p:spPr/>
+        <p:txBody>
+          <a:bodyPr/>
+          <a:lstStyle/>
+          <a:p>
+            <a:r>
+              <a:rPr lang="en-US" dirty="0"/>
+              <a:t>Welcome !</a:t>
+            </a:r>
+          </a:p>
+        </p:txBody>
+      </p:sp>
+      <p:sp>
+        <p:nvSpPr>
+          <p:cNvPr id="16" name="Text Placeholder 15"/>
+          <p:cNvSpPr>
+            <a:spLocks noGrp="1"/>
+          </p:cNvSpPr>
+          <p:nvPr>
+            <p:ph type="body" idx="1"/>
+          </p:nvPr>
+        </p:nvSpPr>
+        <p:spPr/>
+        <p:txBody>
+          <a:bodyPr>
+            <a:noAutofit/>
+          </a:bodyPr>
+          <a:lstStyle/>
+          <a:p>
+            <a:r>
+              <a:rPr lang="fr-FR" dirty="0"/>
+              <a:t>Merci pour votre présence</a:t>
+            </a:r>
+          </a:p>
+        </p:txBody>
+      </p:sp>
+      <p:sp>
+        <p:nvSpPr>
+          <p:cNvPr id="38" name="Date Placeholder 37">
+            <a:extLst>
+              <a:ext uri="{FF2B5EF4-FFF2-40B4-BE49-F238E27FC236}">
+                <a16:creationId xmlns:a16="http://schemas.microsoft.com/office/drawing/2014/main" id="{214893A6-5453-4772-A5C3-6E8247B9F7F7}"/>
+              </a:ext>
+            </a:extLst>
+          </p:cNvPr>
+          <p:cNvSpPr>
+            <a:spLocks noGrp="1"/>
+          </p:cNvSpPr>
+          <p:nvPr>
+            <p:ph type="dt" sz="half" idx="10"/>
+          </p:nvPr>
+        </p:nvSpPr>
+        <p:spPr/>
+        <p:txBody>
+          <a:bodyPr/>
+          <a:lstStyle/>
+          <a:p>
+            <a:r>
+              <a:rPr lang="fr-FR"/>
+              <a:t>04 février 2021</a:t>
+            </a:r>
+            <a:endParaRPr lang="en-US"/>
+          </a:p>
+        </p:txBody>
+      </p:sp>
+      <p:sp>
+        <p:nvSpPr>
+          <p:cNvPr id="39" name="Footer Placeholder 38">
+            <a:extLst>
+              <a:ext uri="{FF2B5EF4-FFF2-40B4-BE49-F238E27FC236}">
+                <a16:creationId xmlns:a16="http://schemas.microsoft.com/office/drawing/2014/main" id="{19A88EA5-E6FB-4BFB-9421-CB6C4447B890}"/>
+              </a:ext>
+            </a:extLst>
+          </p:cNvPr>
+          <p:cNvSpPr>
+            <a:spLocks noGrp="1"/>
+          </p:cNvSpPr>
+          <p:nvPr>
+            <p:ph type="ftr" sz="quarter" idx="11"/>
+          </p:nvPr>
+        </p:nvSpPr>
+        <p:spPr/>
+        <p:txBody>
+          <a:bodyPr/>
+          <a:lstStyle/>
+          <a:p>
+            <a:r>
+              <a:rPr lang="fr-FR"/>
+              <a:t>Command &amp; Memento - Aurélien BOUDIER</a:t>
+            </a:r>
+            <a:endParaRPr lang="en-US"/>
+          </a:p>
+        </p:txBody>
+      </p:sp>
+    </p:spTree>
+    <p:extLst>
+      <p:ext uri="{BB962C8B-B14F-4D97-AF65-F5344CB8AC3E}">
+        <p14:creationId xmlns:p14="http://schemas.microsoft.com/office/powerpoint/2010/main" val="289086864"/>
+      </p:ext>
+    </p:extLst>
+  </p:cSld>
+  <p:clrMapOvr>
+    <a:masterClrMapping/>
+  </p:clrMapOvr>
+</p:sld>
+</file>
+
+<file path=ppt/slides/slide20.xml><?xml version="1.0" encoding="utf-8"?>
 <p:sld xmlns:a="http://schemas.openxmlformats.org/drawingml/2006/main" xmlns:r="http://schemas.openxmlformats.org/officeDocument/2006/relationships" xmlns:p="http://schemas.openxmlformats.org/presentationml/2006/main">
   <p:cSld>
     <p:spTree>
@@ -31349,7 +32114,7 @@
 </p:sld>
 </file>
 
-<file path=ppt/slides/slide18.xml><?xml version="1.0" encoding="utf-8"?>
+<file path=ppt/slides/slide21.xml><?xml version="1.0" encoding="utf-8"?>
 <p:sld xmlns:a="http://schemas.openxmlformats.org/drawingml/2006/main" xmlns:r="http://schemas.openxmlformats.org/officeDocument/2006/relationships" xmlns:p="http://schemas.openxmlformats.org/presentationml/2006/main">
   <p:cSld>
     <p:spTree>
@@ -31600,7 +32365,7 @@
 </p:sld>
 </file>
 
-<file path=ppt/slides/slide19.xml><?xml version="1.0" encoding="utf-8"?>
+<file path=ppt/slides/slide22.xml><?xml version="1.0" encoding="utf-8"?>
 <p:sld xmlns:a="http://schemas.openxmlformats.org/drawingml/2006/main" xmlns:r="http://schemas.openxmlformats.org/officeDocument/2006/relationships" xmlns:p="http://schemas.openxmlformats.org/presentationml/2006/main">
   <p:cSld>
     <p:spTree>
@@ -32725,141 +33490,7 @@
 </p:sld>
 </file>
 
-<file path=ppt/slides/slide2.xml><?xml version="1.0" encoding="utf-8"?>
-<p:sld xmlns:a="http://schemas.openxmlformats.org/drawingml/2006/main" xmlns:r="http://schemas.openxmlformats.org/officeDocument/2006/relationships" xmlns:p="http://schemas.openxmlformats.org/presentationml/2006/main">
-  <p:cSld>
-    <p:spTree>
-      <p:nvGrpSpPr>
-        <p:cNvPr id="1" name=""/>
-        <p:cNvGrpSpPr/>
-        <p:nvPr/>
-      </p:nvGrpSpPr>
-      <p:grpSpPr>
-        <a:xfrm>
-          <a:off x="0" y="0"/>
-          <a:ext cx="0" cy="0"/>
-          <a:chOff x="0" y="0"/>
-          <a:chExt cx="0" cy="0"/>
-        </a:xfrm>
-      </p:grpSpPr>
-      <p:sp>
-        <p:nvSpPr>
-          <p:cNvPr id="2" name="Title 1"/>
-          <p:cNvSpPr>
-            <a:spLocks noGrp="1"/>
-          </p:cNvSpPr>
-          <p:nvPr>
-            <p:ph type="title"/>
-          </p:nvPr>
-        </p:nvSpPr>
-        <p:spPr/>
-        <p:txBody>
-          <a:bodyPr/>
-          <a:lstStyle/>
-          <a:p>
-            <a:r>
-              <a:rPr lang="en-US" dirty="0"/>
-              <a:t>Welcome !</a:t>
-            </a:r>
-          </a:p>
-        </p:txBody>
-      </p:sp>
-      <p:sp>
-        <p:nvSpPr>
-          <p:cNvPr id="16" name="Text Placeholder 15"/>
-          <p:cNvSpPr>
-            <a:spLocks noGrp="1"/>
-          </p:cNvSpPr>
-          <p:nvPr>
-            <p:ph type="body" idx="1"/>
-          </p:nvPr>
-        </p:nvSpPr>
-        <p:spPr/>
-        <p:txBody>
-          <a:bodyPr>
-            <a:noAutofit/>
-          </a:bodyPr>
-          <a:lstStyle/>
-          <a:p>
-            <a:r>
-              <a:rPr lang="fr-FR" dirty="0"/>
-              <a:t>Merci pour votre présence</a:t>
-            </a:r>
-          </a:p>
-        </p:txBody>
-      </p:sp>
-      <p:sp>
-        <p:nvSpPr>
-          <p:cNvPr id="38" name="Date Placeholder 37">
-            <a:extLst>
-              <a:ext uri="{FF2B5EF4-FFF2-40B4-BE49-F238E27FC236}">
-                <a16:creationId xmlns:a16="http://schemas.microsoft.com/office/drawing/2014/main" id="{214893A6-5453-4772-A5C3-6E8247B9F7F7}"/>
-              </a:ext>
-            </a:extLst>
-          </p:cNvPr>
-          <p:cNvSpPr>
-            <a:spLocks noGrp="1"/>
-          </p:cNvSpPr>
-          <p:nvPr>
-            <p:ph type="dt" sz="half" idx="10"/>
-          </p:nvPr>
-        </p:nvSpPr>
-        <p:spPr/>
-        <p:txBody>
-          <a:bodyPr/>
-          <a:lstStyle/>
-          <a:p>
-            <a:r>
-              <a:rPr lang="fr-FR"/>
-              <a:t>04 février 2021</a:t>
-            </a:r>
-            <a:endParaRPr lang="en-US"/>
-          </a:p>
-        </p:txBody>
-      </p:sp>
-      <p:sp>
-        <p:nvSpPr>
-          <p:cNvPr id="39" name="Footer Placeholder 38">
-            <a:extLst>
-              <a:ext uri="{FF2B5EF4-FFF2-40B4-BE49-F238E27FC236}">
-                <a16:creationId xmlns:a16="http://schemas.microsoft.com/office/drawing/2014/main" id="{19A88EA5-E6FB-4BFB-9421-CB6C4447B890}"/>
-              </a:ext>
-            </a:extLst>
-          </p:cNvPr>
-          <p:cNvSpPr>
-            <a:spLocks noGrp="1"/>
-          </p:cNvSpPr>
-          <p:nvPr>
-            <p:ph type="ftr" sz="quarter" idx="11"/>
-          </p:nvPr>
-        </p:nvSpPr>
-        <p:spPr/>
-        <p:txBody>
-          <a:bodyPr/>
-          <a:lstStyle/>
-          <a:p>
-            <a:r>
-              <a:rPr lang="fr-FR"/>
-              <a:t>Command &amp; Memento - Aurélien BOUDIER</a:t>
-            </a:r>
-            <a:endParaRPr lang="en-US"/>
-          </a:p>
-        </p:txBody>
-      </p:sp>
-    </p:spTree>
-    <p:extLst>
-      <p:ext uri="{BB962C8B-B14F-4D97-AF65-F5344CB8AC3E}">
-        <p14:creationId xmlns:p14="http://schemas.microsoft.com/office/powerpoint/2010/main" val="289086864"/>
-      </p:ext>
-    </p:extLst>
-  </p:cSld>
-  <p:clrMapOvr>
-    <a:masterClrMapping/>
-  </p:clrMapOvr>
-</p:sld>
-</file>
-
-<file path=ppt/slides/slide20.xml><?xml version="1.0" encoding="utf-8"?>
+<file path=ppt/slides/slide23.xml><?xml version="1.0" encoding="utf-8"?>
 <p:sld xmlns:a="http://schemas.openxmlformats.org/drawingml/2006/main" xmlns:r="http://schemas.openxmlformats.org/officeDocument/2006/relationships" xmlns:p="http://schemas.openxmlformats.org/presentationml/2006/main">
   <p:cSld>
     <p:spTree>
@@ -37979,7 +38610,7 @@
 </p:sld>
 </file>
 
-<file path=ppt/slides/slide21.xml><?xml version="1.0" encoding="utf-8"?>
+<file path=ppt/slides/slide24.xml><?xml version="1.0" encoding="utf-8"?>
 <p:sld xmlns:a="http://schemas.openxmlformats.org/drawingml/2006/main" xmlns:r="http://schemas.openxmlformats.org/officeDocument/2006/relationships" xmlns:p="http://schemas.openxmlformats.org/presentationml/2006/main">
   <p:cSld>
     <p:spTree>
@@ -43255,11 +43886,7 @@
           <a:p>
             <a:r>
               <a:rPr lang="fr-FR" dirty="0"/>
-              <a:t>Il n’y a pas de problème, il n’y a que des </a:t>
-            </a:r>
-            <a:r>
-              <a:rPr lang="fr-FR"/>
-              <a:t>solutions !</a:t>
+              <a:t>Il n’y a pas de problème, il n’y a que des solutions !</a:t>
             </a:r>
             <a:endParaRPr lang="fr-FR" dirty="0">
               <a:solidFill>
@@ -43344,6 +43971,1403 @@
 </file>
 
 <file path=ppt/slides/slide5.xml><?xml version="1.0" encoding="utf-8"?>
+<p:sld xmlns:a="http://schemas.openxmlformats.org/drawingml/2006/main" xmlns:r="http://schemas.openxmlformats.org/officeDocument/2006/relationships" xmlns:p="http://schemas.openxmlformats.org/presentationml/2006/main">
+  <p:cSld>
+    <p:bg>
+      <p:bgPr>
+        <a:solidFill>
+          <a:srgbClr val="403551"/>
+        </a:solidFill>
+        <a:effectLst/>
+      </p:bgPr>
+    </p:bg>
+    <p:spTree>
+      <p:nvGrpSpPr>
+        <p:cNvPr id="1" name=""/>
+        <p:cNvGrpSpPr/>
+        <p:nvPr/>
+      </p:nvGrpSpPr>
+      <p:grpSpPr>
+        <a:xfrm>
+          <a:off x="0" y="0"/>
+          <a:ext cx="0" cy="0"/>
+          <a:chOff x="0" y="0"/>
+          <a:chExt cx="0" cy="0"/>
+        </a:xfrm>
+      </p:grpSpPr>
+      <p:sp>
+        <p:nvSpPr>
+          <p:cNvPr id="3" name="Date Placeholder 2"/>
+          <p:cNvSpPr>
+            <a:spLocks noGrp="1"/>
+          </p:cNvSpPr>
+          <p:nvPr>
+            <p:ph type="dt" sz="half" idx="10"/>
+          </p:nvPr>
+        </p:nvSpPr>
+        <p:spPr/>
+        <p:txBody>
+          <a:bodyPr/>
+          <a:lstStyle/>
+          <a:p>
+            <a:r>
+              <a:rPr lang="fr-FR"/>
+              <a:t>04 février 2021</a:t>
+            </a:r>
+            <a:endParaRPr lang="en-US"/>
+          </a:p>
+        </p:txBody>
+      </p:sp>
+      <p:pic>
+        <p:nvPicPr>
+          <p:cNvPr id="9" name="Image 8">
+            <a:extLst>
+              <a:ext uri="{FF2B5EF4-FFF2-40B4-BE49-F238E27FC236}">
+                <a16:creationId xmlns:a16="http://schemas.microsoft.com/office/drawing/2014/main" id="{79A96D39-353D-4A6E-8A56-7B8BFBEE319E}"/>
+              </a:ext>
+            </a:extLst>
+          </p:cNvPr>
+          <p:cNvPicPr>
+            <a:picLocks noChangeAspect="1"/>
+          </p:cNvPicPr>
+          <p:nvPr/>
+        </p:nvPicPr>
+        <p:blipFill rotWithShape="1">
+          <a:blip r:embed="rId3"/>
+          <a:srcRect l="650"/>
+          <a:stretch/>
+        </p:blipFill>
+        <p:spPr>
+          <a:xfrm>
+            <a:off x="2927648" y="620688"/>
+            <a:ext cx="7416824" cy="5621003"/>
+          </a:xfrm>
+          <a:prstGeom prst="rect">
+            <a:avLst/>
+          </a:prstGeom>
+          <a:ln w="12700" cap="sq">
+            <a:solidFill>
+              <a:schemeClr val="bg1"/>
+            </a:solidFill>
+            <a:miter lim="800000"/>
+          </a:ln>
+          <a:effectLst>
+            <a:outerShdw blurRad="57150" dist="50800" dir="2700000" algn="tl" rotWithShape="0">
+              <a:srgbClr val="000000">
+                <a:alpha val="40000"/>
+              </a:srgbClr>
+            </a:outerShdw>
+          </a:effectLst>
+        </p:spPr>
+      </p:pic>
+      <p:sp>
+        <p:nvSpPr>
+          <p:cNvPr id="4" name="Footer Placeholder 3"/>
+          <p:cNvSpPr>
+            <a:spLocks noGrp="1"/>
+          </p:cNvSpPr>
+          <p:nvPr>
+            <p:ph type="ftr" sz="quarter" idx="11"/>
+          </p:nvPr>
+        </p:nvSpPr>
+        <p:spPr/>
+        <p:txBody>
+          <a:bodyPr/>
+          <a:lstStyle/>
+          <a:p>
+            <a:r>
+              <a:rPr lang="fr-FR"/>
+              <a:t>Command &amp; Memento - Aurélien BOUDIER</a:t>
+            </a:r>
+            <a:endParaRPr lang="en-US"/>
+          </a:p>
+        </p:txBody>
+      </p:sp>
+      <p:sp>
+        <p:nvSpPr>
+          <p:cNvPr id="11" name="Text Placeholder 10">
+            <a:extLst>
+              <a:ext uri="{FF2B5EF4-FFF2-40B4-BE49-F238E27FC236}">
+                <a16:creationId xmlns:a16="http://schemas.microsoft.com/office/drawing/2014/main" id="{2A6E9779-5059-4C5A-A10E-A924E6ADE536}"/>
+              </a:ext>
+            </a:extLst>
+          </p:cNvPr>
+          <p:cNvSpPr>
+            <a:spLocks noGrp="1"/>
+          </p:cNvSpPr>
+          <p:nvPr>
+            <p:ph type="body" sz="quarter" idx="13"/>
+          </p:nvPr>
+        </p:nvSpPr>
+        <p:spPr/>
+        <p:txBody>
+          <a:bodyPr/>
+          <a:lstStyle/>
+          <a:p>
+            <a:r>
+              <a:rPr lang="en-US"/>
+              <a:t>01</a:t>
+            </a:r>
+          </a:p>
+        </p:txBody>
+      </p:sp>
+      <p:sp>
+        <p:nvSpPr>
+          <p:cNvPr id="16" name="Rectangle 15">
+            <a:extLst>
+              <a:ext uri="{FF2B5EF4-FFF2-40B4-BE49-F238E27FC236}">
+                <a16:creationId xmlns:a16="http://schemas.microsoft.com/office/drawing/2014/main" id="{02FE2F8A-5573-449E-ADF3-395AC529DC51}"/>
+              </a:ext>
+            </a:extLst>
+          </p:cNvPr>
+          <p:cNvSpPr/>
+          <p:nvPr/>
+        </p:nvSpPr>
+        <p:spPr>
+          <a:xfrm>
+            <a:off x="3359696" y="1479500"/>
+            <a:ext cx="288032" cy="288032"/>
+          </a:xfrm>
+          <a:prstGeom prst="rect">
+            <a:avLst/>
+          </a:prstGeom>
+          <a:noFill/>
+          <a:ln w="38100">
+            <a:solidFill>
+              <a:srgbClr val="FF0000"/>
+            </a:solidFill>
+          </a:ln>
+        </p:spPr>
+        <p:style>
+          <a:lnRef idx="2">
+            <a:schemeClr val="accent2">
+              <a:shade val="50000"/>
+            </a:schemeClr>
+          </a:lnRef>
+          <a:fillRef idx="1">
+            <a:schemeClr val="accent2"/>
+          </a:fillRef>
+          <a:effectRef idx="0">
+            <a:schemeClr val="accent2"/>
+          </a:effectRef>
+          <a:fontRef idx="minor">
+            <a:schemeClr val="lt1"/>
+          </a:fontRef>
+        </p:style>
+        <p:txBody>
+          <a:bodyPr rtlCol="0" anchor="ctr"/>
+          <a:lstStyle/>
+          <a:p>
+            <a:pPr algn="ctr"/>
+            <a:endParaRPr lang="fr-FR">
+              <a:ln>
+                <a:solidFill>
+                  <a:srgbClr val="FF0000"/>
+                </a:solidFill>
+              </a:ln>
+            </a:endParaRPr>
+          </a:p>
+        </p:txBody>
+      </p:sp>
+      <p:sp>
+        <p:nvSpPr>
+          <p:cNvPr id="17" name="Rectangle 16">
+            <a:extLst>
+              <a:ext uri="{FF2B5EF4-FFF2-40B4-BE49-F238E27FC236}">
+                <a16:creationId xmlns:a16="http://schemas.microsoft.com/office/drawing/2014/main" id="{F53C4020-3A74-4C81-8089-58998639B126}"/>
+              </a:ext>
+            </a:extLst>
+          </p:cNvPr>
+          <p:cNvSpPr/>
+          <p:nvPr/>
+        </p:nvSpPr>
+        <p:spPr>
+          <a:xfrm>
+            <a:off x="3719736" y="1479500"/>
+            <a:ext cx="432048" cy="288032"/>
+          </a:xfrm>
+          <a:prstGeom prst="rect">
+            <a:avLst/>
+          </a:prstGeom>
+          <a:noFill/>
+          <a:ln w="38100">
+            <a:solidFill>
+              <a:srgbClr val="FF0000"/>
+            </a:solidFill>
+          </a:ln>
+        </p:spPr>
+        <p:style>
+          <a:lnRef idx="2">
+            <a:schemeClr val="accent2">
+              <a:shade val="50000"/>
+            </a:schemeClr>
+          </a:lnRef>
+          <a:fillRef idx="1">
+            <a:schemeClr val="accent2"/>
+          </a:fillRef>
+          <a:effectRef idx="0">
+            <a:schemeClr val="accent2"/>
+          </a:effectRef>
+          <a:fontRef idx="minor">
+            <a:schemeClr val="lt1"/>
+          </a:fontRef>
+        </p:style>
+        <p:txBody>
+          <a:bodyPr rtlCol="0" anchor="ctr"/>
+          <a:lstStyle/>
+          <a:p>
+            <a:pPr algn="ctr"/>
+            <a:endParaRPr lang="fr-FR">
+              <a:ln>
+                <a:solidFill>
+                  <a:srgbClr val="FF0000"/>
+                </a:solidFill>
+              </a:ln>
+            </a:endParaRPr>
+          </a:p>
+        </p:txBody>
+      </p:sp>
+      <p:sp>
+        <p:nvSpPr>
+          <p:cNvPr id="18" name="Rectangle 17">
+            <a:extLst>
+              <a:ext uri="{FF2B5EF4-FFF2-40B4-BE49-F238E27FC236}">
+                <a16:creationId xmlns:a16="http://schemas.microsoft.com/office/drawing/2014/main" id="{3117BCBE-A714-4E77-8123-4E979288A02E}"/>
+              </a:ext>
+            </a:extLst>
+          </p:cNvPr>
+          <p:cNvSpPr/>
+          <p:nvPr/>
+        </p:nvSpPr>
+        <p:spPr>
+          <a:xfrm>
+            <a:off x="4295800" y="1479500"/>
+            <a:ext cx="432048" cy="288032"/>
+          </a:xfrm>
+          <a:prstGeom prst="rect">
+            <a:avLst/>
+          </a:prstGeom>
+          <a:noFill/>
+          <a:ln w="38100">
+            <a:solidFill>
+              <a:srgbClr val="FF0000"/>
+            </a:solidFill>
+          </a:ln>
+        </p:spPr>
+        <p:style>
+          <a:lnRef idx="2">
+            <a:schemeClr val="accent2">
+              <a:shade val="50000"/>
+            </a:schemeClr>
+          </a:lnRef>
+          <a:fillRef idx="1">
+            <a:schemeClr val="accent2"/>
+          </a:fillRef>
+          <a:effectRef idx="0">
+            <a:schemeClr val="accent2"/>
+          </a:effectRef>
+          <a:fontRef idx="minor">
+            <a:schemeClr val="lt1"/>
+          </a:fontRef>
+        </p:style>
+        <p:txBody>
+          <a:bodyPr rtlCol="0" anchor="ctr"/>
+          <a:lstStyle/>
+          <a:p>
+            <a:pPr algn="ctr"/>
+            <a:endParaRPr lang="fr-FR">
+              <a:ln>
+                <a:solidFill>
+                  <a:srgbClr val="FF0000"/>
+                </a:solidFill>
+              </a:ln>
+            </a:endParaRPr>
+          </a:p>
+        </p:txBody>
+      </p:sp>
+      <p:sp>
+        <p:nvSpPr>
+          <p:cNvPr id="19" name="Rectangle 18">
+            <a:extLst>
+              <a:ext uri="{FF2B5EF4-FFF2-40B4-BE49-F238E27FC236}">
+                <a16:creationId xmlns:a16="http://schemas.microsoft.com/office/drawing/2014/main" id="{B600A74D-3C95-4E83-8F51-00A6BEE7529F}"/>
+              </a:ext>
+            </a:extLst>
+          </p:cNvPr>
+          <p:cNvSpPr/>
+          <p:nvPr/>
+        </p:nvSpPr>
+        <p:spPr>
+          <a:xfrm>
+            <a:off x="5012138" y="1479500"/>
+            <a:ext cx="432048" cy="288032"/>
+          </a:xfrm>
+          <a:prstGeom prst="rect">
+            <a:avLst/>
+          </a:prstGeom>
+          <a:noFill/>
+          <a:ln w="38100">
+            <a:solidFill>
+              <a:srgbClr val="FF0000"/>
+            </a:solidFill>
+          </a:ln>
+        </p:spPr>
+        <p:style>
+          <a:lnRef idx="2">
+            <a:schemeClr val="accent2">
+              <a:shade val="50000"/>
+            </a:schemeClr>
+          </a:lnRef>
+          <a:fillRef idx="1">
+            <a:schemeClr val="accent2"/>
+          </a:fillRef>
+          <a:effectRef idx="0">
+            <a:schemeClr val="accent2"/>
+          </a:effectRef>
+          <a:fontRef idx="minor">
+            <a:schemeClr val="lt1"/>
+          </a:fontRef>
+        </p:style>
+        <p:txBody>
+          <a:bodyPr rtlCol="0" anchor="ctr"/>
+          <a:lstStyle/>
+          <a:p>
+            <a:pPr algn="ctr"/>
+            <a:endParaRPr lang="fr-FR">
+              <a:ln>
+                <a:solidFill>
+                  <a:srgbClr val="FF0000"/>
+                </a:solidFill>
+              </a:ln>
+            </a:endParaRPr>
+          </a:p>
+        </p:txBody>
+      </p:sp>
+      <p:sp>
+        <p:nvSpPr>
+          <p:cNvPr id="20" name="Rectangle 19">
+            <a:extLst>
+              <a:ext uri="{FF2B5EF4-FFF2-40B4-BE49-F238E27FC236}">
+                <a16:creationId xmlns:a16="http://schemas.microsoft.com/office/drawing/2014/main" id="{91D9F728-00FD-4234-A3D7-B590385CA33B}"/>
+              </a:ext>
+            </a:extLst>
+          </p:cNvPr>
+          <p:cNvSpPr/>
+          <p:nvPr/>
+        </p:nvSpPr>
+        <p:spPr>
+          <a:xfrm>
+            <a:off x="5858241" y="1479500"/>
+            <a:ext cx="250157" cy="288032"/>
+          </a:xfrm>
+          <a:prstGeom prst="rect">
+            <a:avLst/>
+          </a:prstGeom>
+          <a:noFill/>
+          <a:ln w="38100">
+            <a:solidFill>
+              <a:srgbClr val="FF0000"/>
+            </a:solidFill>
+          </a:ln>
+        </p:spPr>
+        <p:style>
+          <a:lnRef idx="2">
+            <a:schemeClr val="accent2">
+              <a:shade val="50000"/>
+            </a:schemeClr>
+          </a:lnRef>
+          <a:fillRef idx="1">
+            <a:schemeClr val="accent2"/>
+          </a:fillRef>
+          <a:effectRef idx="0">
+            <a:schemeClr val="accent2"/>
+          </a:effectRef>
+          <a:fontRef idx="minor">
+            <a:schemeClr val="lt1"/>
+          </a:fontRef>
+        </p:style>
+        <p:txBody>
+          <a:bodyPr rtlCol="0" anchor="ctr"/>
+          <a:lstStyle/>
+          <a:p>
+            <a:pPr algn="ctr"/>
+            <a:endParaRPr lang="fr-FR">
+              <a:ln>
+                <a:solidFill>
+                  <a:srgbClr val="FF0000"/>
+                </a:solidFill>
+              </a:ln>
+            </a:endParaRPr>
+          </a:p>
+        </p:txBody>
+      </p:sp>
+      <p:sp>
+        <p:nvSpPr>
+          <p:cNvPr id="21" name="Rectangle : coins arrondis 20">
+            <a:extLst>
+              <a:ext uri="{FF2B5EF4-FFF2-40B4-BE49-F238E27FC236}">
+                <a16:creationId xmlns:a16="http://schemas.microsoft.com/office/drawing/2014/main" id="{993CA520-1185-4879-AF06-8A16040D8FD0}"/>
+              </a:ext>
+            </a:extLst>
+          </p:cNvPr>
+          <p:cNvSpPr/>
+          <p:nvPr/>
+        </p:nvSpPr>
+        <p:spPr>
+          <a:xfrm>
+            <a:off x="3060852" y="3462615"/>
+            <a:ext cx="2952328" cy="2883939"/>
+          </a:xfrm>
+          <a:prstGeom prst="roundRect">
+            <a:avLst>
+              <a:gd name="adj" fmla="val 5007"/>
+            </a:avLst>
+          </a:prstGeom>
+          <a:solidFill>
+            <a:schemeClr val="bg1"/>
+          </a:solidFill>
+          <a:ln w="38100">
+            <a:solidFill>
+              <a:srgbClr val="FF0000"/>
+            </a:solidFill>
+          </a:ln>
+        </p:spPr>
+        <p:style>
+          <a:lnRef idx="2">
+            <a:schemeClr val="accent1">
+              <a:shade val="50000"/>
+            </a:schemeClr>
+          </a:lnRef>
+          <a:fillRef idx="1">
+            <a:schemeClr val="accent1"/>
+          </a:fillRef>
+          <a:effectRef idx="0">
+            <a:schemeClr val="accent1"/>
+          </a:effectRef>
+          <a:fontRef idx="minor">
+            <a:schemeClr val="lt1"/>
+          </a:fontRef>
+        </p:style>
+        <p:txBody>
+          <a:bodyPr rtlCol="0" anchor="ctr"/>
+          <a:lstStyle/>
+          <a:p>
+            <a:pPr algn="ctr"/>
+            <a:endParaRPr lang="fr-FR"/>
+          </a:p>
+        </p:txBody>
+      </p:sp>
+      <p:grpSp>
+        <p:nvGrpSpPr>
+          <p:cNvPr id="99" name="Groupe 98">
+            <a:extLst>
+              <a:ext uri="{FF2B5EF4-FFF2-40B4-BE49-F238E27FC236}">
+                <a16:creationId xmlns:a16="http://schemas.microsoft.com/office/drawing/2014/main" id="{9A7704FB-2E69-40B2-A563-649E2EA32CE3}"/>
+              </a:ext>
+            </a:extLst>
+          </p:cNvPr>
+          <p:cNvGrpSpPr/>
+          <p:nvPr/>
+        </p:nvGrpSpPr>
+        <p:grpSpPr>
+          <a:xfrm>
+            <a:off x="3060852" y="1767532"/>
+            <a:ext cx="2952328" cy="4579021"/>
+            <a:chOff x="3060852" y="1767532"/>
+            <a:chExt cx="2952328" cy="4579021"/>
+          </a:xfrm>
+        </p:grpSpPr>
+        <p:sp>
+          <p:nvSpPr>
+            <p:cNvPr id="63" name="Rectangle : coins arrondis 62">
+              <a:extLst>
+                <a:ext uri="{FF2B5EF4-FFF2-40B4-BE49-F238E27FC236}">
+                  <a16:creationId xmlns:a16="http://schemas.microsoft.com/office/drawing/2014/main" id="{84B22BC2-1B60-4153-8402-76AA53926AC8}"/>
+                </a:ext>
+              </a:extLst>
+            </p:cNvPr>
+            <p:cNvSpPr/>
+            <p:nvPr/>
+          </p:nvSpPr>
+          <p:spPr>
+            <a:xfrm>
+              <a:off x="3071664" y="3460949"/>
+              <a:ext cx="2941516" cy="653356"/>
+            </a:xfrm>
+            <a:prstGeom prst="roundRect">
+              <a:avLst>
+                <a:gd name="adj" fmla="val 16533"/>
+              </a:avLst>
+            </a:prstGeom>
+            <a:solidFill>
+              <a:srgbClr val="F9BE75"/>
+            </a:solidFill>
+            <a:ln w="38100">
+              <a:solidFill>
+                <a:srgbClr val="FF0000"/>
+              </a:solidFill>
+            </a:ln>
+          </p:spPr>
+          <p:style>
+            <a:lnRef idx="2">
+              <a:schemeClr val="accent1">
+                <a:shade val="50000"/>
+              </a:schemeClr>
+            </a:lnRef>
+            <a:fillRef idx="1">
+              <a:schemeClr val="accent1"/>
+            </a:fillRef>
+            <a:effectRef idx="0">
+              <a:schemeClr val="accent1"/>
+            </a:effectRef>
+            <a:fontRef idx="minor">
+              <a:schemeClr val="lt1"/>
+            </a:fontRef>
+          </p:style>
+          <p:txBody>
+            <a:bodyPr rtlCol="0" anchor="ctr"/>
+            <a:lstStyle/>
+            <a:p>
+              <a:pPr algn="ctr"/>
+              <a:r>
+                <a:rPr lang="fr-FR" sz="2800" b="1" dirty="0">
+                  <a:solidFill>
+                    <a:srgbClr val="FF0000"/>
+                  </a:solidFill>
+                </a:rPr>
+                <a:t>Bouton</a:t>
+              </a:r>
+              <a:endParaRPr lang="fr-FR" b="1" dirty="0">
+                <a:solidFill>
+                  <a:srgbClr val="FF0000"/>
+                </a:solidFill>
+              </a:endParaRPr>
+            </a:p>
+          </p:txBody>
+        </p:sp>
+        <p:sp>
+          <p:nvSpPr>
+            <p:cNvPr id="65" name="Rectangle : avec coins arrondis en haut 64">
+              <a:extLst>
+                <a:ext uri="{FF2B5EF4-FFF2-40B4-BE49-F238E27FC236}">
+                  <a16:creationId xmlns:a16="http://schemas.microsoft.com/office/drawing/2014/main" id="{E46113E3-61B7-4921-A146-509285FF67F1}"/>
+                </a:ext>
+              </a:extLst>
+            </p:cNvPr>
+            <p:cNvSpPr/>
+            <p:nvPr/>
+          </p:nvSpPr>
+          <p:spPr>
+            <a:xfrm rot="10800000">
+              <a:off x="3060852" y="4054676"/>
+              <a:ext cx="2941516" cy="576064"/>
+            </a:xfrm>
+            <a:prstGeom prst="round2SameRect">
+              <a:avLst/>
+            </a:prstGeom>
+            <a:solidFill>
+              <a:schemeClr val="accent3">
+                <a:lumMod val="40000"/>
+                <a:lumOff val="60000"/>
+              </a:schemeClr>
+            </a:solidFill>
+            <a:ln w="38100">
+              <a:solidFill>
+                <a:srgbClr val="FF0000"/>
+              </a:solidFill>
+            </a:ln>
+          </p:spPr>
+          <p:style>
+            <a:lnRef idx="2">
+              <a:schemeClr val="accent1">
+                <a:shade val="50000"/>
+              </a:schemeClr>
+            </a:lnRef>
+            <a:fillRef idx="1">
+              <a:schemeClr val="accent1"/>
+            </a:fillRef>
+            <a:effectRef idx="0">
+              <a:schemeClr val="accent1"/>
+            </a:effectRef>
+            <a:fontRef idx="minor">
+              <a:schemeClr val="lt1"/>
+            </a:fontRef>
+          </p:style>
+          <p:txBody>
+            <a:bodyPr rtlCol="0" anchor="t"/>
+            <a:lstStyle/>
+            <a:p>
+              <a:pPr algn="r"/>
+              <a:r>
+                <a:rPr lang="fr-FR" sz="2000" dirty="0">
+                  <a:solidFill>
+                    <a:srgbClr val="FF0000"/>
+                  </a:solidFill>
+                </a:rPr>
+                <a:t>…</a:t>
+              </a:r>
+            </a:p>
+          </p:txBody>
+        </p:sp>
+        <p:sp>
+          <p:nvSpPr>
+            <p:cNvPr id="66" name="Rectangle : avec coins arrondis en haut 65">
+              <a:extLst>
+                <a:ext uri="{FF2B5EF4-FFF2-40B4-BE49-F238E27FC236}">
+                  <a16:creationId xmlns:a16="http://schemas.microsoft.com/office/drawing/2014/main" id="{68E94ADF-E8AF-4E49-AB06-BE393FD5DBFC}"/>
+                </a:ext>
+              </a:extLst>
+            </p:cNvPr>
+            <p:cNvSpPr/>
+            <p:nvPr/>
+          </p:nvSpPr>
+          <p:spPr>
+            <a:xfrm rot="10800000">
+              <a:off x="3061613" y="4630741"/>
+              <a:ext cx="2941516" cy="576064"/>
+            </a:xfrm>
+            <a:prstGeom prst="round2SameRect">
+              <a:avLst/>
+            </a:prstGeom>
+            <a:solidFill>
+              <a:schemeClr val="accent3">
+                <a:lumMod val="40000"/>
+                <a:lumOff val="60000"/>
+              </a:schemeClr>
+            </a:solidFill>
+            <a:ln w="38100">
+              <a:solidFill>
+                <a:srgbClr val="FF0000"/>
+              </a:solidFill>
+            </a:ln>
+          </p:spPr>
+          <p:style>
+            <a:lnRef idx="2">
+              <a:schemeClr val="accent1">
+                <a:shade val="50000"/>
+              </a:schemeClr>
+            </a:lnRef>
+            <a:fillRef idx="1">
+              <a:schemeClr val="accent1"/>
+            </a:fillRef>
+            <a:effectRef idx="0">
+              <a:schemeClr val="accent1"/>
+            </a:effectRef>
+            <a:fontRef idx="minor">
+              <a:schemeClr val="lt1"/>
+            </a:fontRef>
+          </p:style>
+          <p:txBody>
+            <a:bodyPr rtlCol="0" anchor="t"/>
+            <a:lstStyle/>
+            <a:p>
+              <a:pPr algn="r"/>
+              <a:r>
+                <a:rPr lang="fr-FR" sz="2000" dirty="0">
+                  <a:solidFill>
+                    <a:srgbClr val="FF0000"/>
+                  </a:solidFill>
+                </a:rPr>
+                <a:t>…</a:t>
+              </a:r>
+            </a:p>
+          </p:txBody>
+        </p:sp>
+        <p:sp>
+          <p:nvSpPr>
+            <p:cNvPr id="68" name="Rectangle : avec coins arrondis en haut 67">
+              <a:extLst>
+                <a:ext uri="{FF2B5EF4-FFF2-40B4-BE49-F238E27FC236}">
+                  <a16:creationId xmlns:a16="http://schemas.microsoft.com/office/drawing/2014/main" id="{C571F321-4329-4398-B251-E6C7ACF769DB}"/>
+                </a:ext>
+              </a:extLst>
+            </p:cNvPr>
+            <p:cNvSpPr/>
+            <p:nvPr/>
+          </p:nvSpPr>
+          <p:spPr>
+            <a:xfrm rot="10800000">
+              <a:off x="3061244" y="5201148"/>
+              <a:ext cx="2941516" cy="576064"/>
+            </a:xfrm>
+            <a:prstGeom prst="round2SameRect">
+              <a:avLst/>
+            </a:prstGeom>
+            <a:solidFill>
+              <a:schemeClr val="accent3">
+                <a:lumMod val="40000"/>
+                <a:lumOff val="60000"/>
+              </a:schemeClr>
+            </a:solidFill>
+            <a:ln w="38100">
+              <a:solidFill>
+                <a:srgbClr val="FF0000"/>
+              </a:solidFill>
+            </a:ln>
+          </p:spPr>
+          <p:style>
+            <a:lnRef idx="2">
+              <a:schemeClr val="accent1">
+                <a:shade val="50000"/>
+              </a:schemeClr>
+            </a:lnRef>
+            <a:fillRef idx="1">
+              <a:schemeClr val="accent1"/>
+            </a:fillRef>
+            <a:effectRef idx="0">
+              <a:schemeClr val="accent1"/>
+            </a:effectRef>
+            <a:fontRef idx="minor">
+              <a:schemeClr val="lt1"/>
+            </a:fontRef>
+          </p:style>
+          <p:txBody>
+            <a:bodyPr rtlCol="0" anchor="t"/>
+            <a:lstStyle/>
+            <a:p>
+              <a:pPr algn="r"/>
+              <a:r>
+                <a:rPr lang="fr-FR" sz="2000" dirty="0">
+                  <a:solidFill>
+                    <a:srgbClr val="FF0000"/>
+                  </a:solidFill>
+                </a:rPr>
+                <a:t>…</a:t>
+              </a:r>
+            </a:p>
+          </p:txBody>
+        </p:sp>
+        <p:sp>
+          <p:nvSpPr>
+            <p:cNvPr id="69" name="Rectangle : avec coins arrondis en haut 68">
+              <a:extLst>
+                <a:ext uri="{FF2B5EF4-FFF2-40B4-BE49-F238E27FC236}">
+                  <a16:creationId xmlns:a16="http://schemas.microsoft.com/office/drawing/2014/main" id="{4BE24246-BBC6-4EBB-8CE8-146B84906F4E}"/>
+                </a:ext>
+              </a:extLst>
+            </p:cNvPr>
+            <p:cNvSpPr/>
+            <p:nvPr/>
+          </p:nvSpPr>
+          <p:spPr>
+            <a:xfrm rot="10800000">
+              <a:off x="3071664" y="5770489"/>
+              <a:ext cx="2941516" cy="576064"/>
+            </a:xfrm>
+            <a:prstGeom prst="round2SameRect">
+              <a:avLst/>
+            </a:prstGeom>
+            <a:solidFill>
+              <a:schemeClr val="accent3">
+                <a:lumMod val="40000"/>
+                <a:lumOff val="60000"/>
+              </a:schemeClr>
+            </a:solidFill>
+            <a:ln w="38100">
+              <a:solidFill>
+                <a:srgbClr val="FF0000"/>
+              </a:solidFill>
+            </a:ln>
+          </p:spPr>
+          <p:style>
+            <a:lnRef idx="2">
+              <a:schemeClr val="accent1">
+                <a:shade val="50000"/>
+              </a:schemeClr>
+            </a:lnRef>
+            <a:fillRef idx="1">
+              <a:schemeClr val="accent1"/>
+            </a:fillRef>
+            <a:effectRef idx="0">
+              <a:schemeClr val="accent1"/>
+            </a:effectRef>
+            <a:fontRef idx="minor">
+              <a:schemeClr val="lt1"/>
+            </a:fontRef>
+          </p:style>
+          <p:txBody>
+            <a:bodyPr rtlCol="0" anchor="t"/>
+            <a:lstStyle/>
+            <a:p>
+              <a:pPr algn="r"/>
+              <a:r>
+                <a:rPr lang="fr-FR" sz="2000" dirty="0">
+                  <a:solidFill>
+                    <a:srgbClr val="FF0000"/>
+                  </a:solidFill>
+                </a:rPr>
+                <a:t>…</a:t>
+              </a:r>
+            </a:p>
+          </p:txBody>
+        </p:sp>
+        <p:cxnSp>
+          <p:nvCxnSpPr>
+            <p:cNvPr id="71" name="Connecteur droit avec flèche 70">
+              <a:extLst>
+                <a:ext uri="{FF2B5EF4-FFF2-40B4-BE49-F238E27FC236}">
+                  <a16:creationId xmlns:a16="http://schemas.microsoft.com/office/drawing/2014/main" id="{E7A680E4-9119-4B8B-B050-0FE2F7941C85}"/>
+                </a:ext>
+              </a:extLst>
+            </p:cNvPr>
+            <p:cNvCxnSpPr>
+              <a:cxnSpLocks/>
+              <a:stCxn id="16" idx="2"/>
+            </p:cNvCxnSpPr>
+            <p:nvPr/>
+          </p:nvCxnSpPr>
+          <p:spPr>
+            <a:xfrm>
+              <a:off x="3503712" y="1767532"/>
+              <a:ext cx="378033" cy="1663657"/>
+            </a:xfrm>
+            <a:prstGeom prst="straightConnector1">
+              <a:avLst/>
+            </a:prstGeom>
+            <a:ln w="28575">
+              <a:solidFill>
+                <a:srgbClr val="FF0000"/>
+              </a:solidFill>
+              <a:tailEnd type="triangle"/>
+            </a:ln>
+          </p:spPr>
+          <p:style>
+            <a:lnRef idx="1">
+              <a:schemeClr val="accent1"/>
+            </a:lnRef>
+            <a:fillRef idx="0">
+              <a:schemeClr val="accent1"/>
+            </a:fillRef>
+            <a:effectRef idx="0">
+              <a:schemeClr val="accent1"/>
+            </a:effectRef>
+            <a:fontRef idx="minor">
+              <a:schemeClr val="tx1"/>
+            </a:fontRef>
+          </p:style>
+        </p:cxnSp>
+        <p:cxnSp>
+          <p:nvCxnSpPr>
+            <p:cNvPr id="73" name="Connecteur droit avec flèche 72">
+              <a:extLst>
+                <a:ext uri="{FF2B5EF4-FFF2-40B4-BE49-F238E27FC236}">
+                  <a16:creationId xmlns:a16="http://schemas.microsoft.com/office/drawing/2014/main" id="{D14E0DC2-9876-46FE-ACCA-321FC77F11B2}"/>
+                </a:ext>
+              </a:extLst>
+            </p:cNvPr>
+            <p:cNvCxnSpPr>
+              <a:cxnSpLocks/>
+              <a:stCxn id="17" idx="2"/>
+            </p:cNvCxnSpPr>
+            <p:nvPr/>
+          </p:nvCxnSpPr>
+          <p:spPr>
+            <a:xfrm>
+              <a:off x="3935760" y="1767532"/>
+              <a:ext cx="223490" cy="1667818"/>
+            </a:xfrm>
+            <a:prstGeom prst="straightConnector1">
+              <a:avLst/>
+            </a:prstGeom>
+            <a:ln w="28575">
+              <a:solidFill>
+                <a:srgbClr val="FF0000"/>
+              </a:solidFill>
+              <a:tailEnd type="triangle"/>
+            </a:ln>
+          </p:spPr>
+          <p:style>
+            <a:lnRef idx="1">
+              <a:schemeClr val="accent1"/>
+            </a:lnRef>
+            <a:fillRef idx="0">
+              <a:schemeClr val="accent1"/>
+            </a:fillRef>
+            <a:effectRef idx="0">
+              <a:schemeClr val="accent1"/>
+            </a:effectRef>
+            <a:fontRef idx="minor">
+              <a:schemeClr val="tx1"/>
+            </a:fontRef>
+          </p:style>
+        </p:cxnSp>
+        <p:cxnSp>
+          <p:nvCxnSpPr>
+            <p:cNvPr id="75" name="Connecteur droit avec flèche 74">
+              <a:extLst>
+                <a:ext uri="{FF2B5EF4-FFF2-40B4-BE49-F238E27FC236}">
+                  <a16:creationId xmlns:a16="http://schemas.microsoft.com/office/drawing/2014/main" id="{CABBFA43-C4E1-4E97-A5F8-95AA68AF34E2}"/>
+                </a:ext>
+              </a:extLst>
+            </p:cNvPr>
+            <p:cNvCxnSpPr>
+              <a:cxnSpLocks/>
+              <a:stCxn id="18" idx="2"/>
+            </p:cNvCxnSpPr>
+            <p:nvPr/>
+          </p:nvCxnSpPr>
+          <p:spPr>
+            <a:xfrm>
+              <a:off x="4511824" y="1767532"/>
+              <a:ext cx="30597" cy="1656184"/>
+            </a:xfrm>
+            <a:prstGeom prst="straightConnector1">
+              <a:avLst/>
+            </a:prstGeom>
+            <a:ln w="28575">
+              <a:solidFill>
+                <a:srgbClr val="FF0000"/>
+              </a:solidFill>
+              <a:tailEnd type="triangle"/>
+            </a:ln>
+          </p:spPr>
+          <p:style>
+            <a:lnRef idx="1">
+              <a:schemeClr val="accent1"/>
+            </a:lnRef>
+            <a:fillRef idx="0">
+              <a:schemeClr val="accent1"/>
+            </a:fillRef>
+            <a:effectRef idx="0">
+              <a:schemeClr val="accent1"/>
+            </a:effectRef>
+            <a:fontRef idx="minor">
+              <a:schemeClr val="tx1"/>
+            </a:fontRef>
+          </p:style>
+        </p:cxnSp>
+        <p:cxnSp>
+          <p:nvCxnSpPr>
+            <p:cNvPr id="77" name="Connecteur droit avec flèche 76">
+              <a:extLst>
+                <a:ext uri="{FF2B5EF4-FFF2-40B4-BE49-F238E27FC236}">
+                  <a16:creationId xmlns:a16="http://schemas.microsoft.com/office/drawing/2014/main" id="{FF06BE32-3BF2-4BBB-9D30-D5FACF6B7D45}"/>
+                </a:ext>
+              </a:extLst>
+            </p:cNvPr>
+            <p:cNvCxnSpPr>
+              <a:cxnSpLocks/>
+              <a:stCxn id="19" idx="2"/>
+            </p:cNvCxnSpPr>
+            <p:nvPr/>
+          </p:nvCxnSpPr>
+          <p:spPr>
+            <a:xfrm flipH="1">
+              <a:off x="4889857" y="1767532"/>
+              <a:ext cx="338305" cy="1656184"/>
+            </a:xfrm>
+            <a:prstGeom prst="straightConnector1">
+              <a:avLst/>
+            </a:prstGeom>
+            <a:ln w="28575">
+              <a:solidFill>
+                <a:srgbClr val="FF0000"/>
+              </a:solidFill>
+              <a:tailEnd type="triangle"/>
+            </a:ln>
+          </p:spPr>
+          <p:style>
+            <a:lnRef idx="1">
+              <a:schemeClr val="accent1"/>
+            </a:lnRef>
+            <a:fillRef idx="0">
+              <a:schemeClr val="accent1"/>
+            </a:fillRef>
+            <a:effectRef idx="0">
+              <a:schemeClr val="accent1"/>
+            </a:effectRef>
+            <a:fontRef idx="minor">
+              <a:schemeClr val="tx1"/>
+            </a:fontRef>
+          </p:style>
+        </p:cxnSp>
+        <p:cxnSp>
+          <p:nvCxnSpPr>
+            <p:cNvPr id="80" name="Connecteur droit avec flèche 79">
+              <a:extLst>
+                <a:ext uri="{FF2B5EF4-FFF2-40B4-BE49-F238E27FC236}">
+                  <a16:creationId xmlns:a16="http://schemas.microsoft.com/office/drawing/2014/main" id="{1937FE95-6BBD-4D6B-98FF-9F147A163737}"/>
+                </a:ext>
+              </a:extLst>
+            </p:cNvPr>
+            <p:cNvCxnSpPr>
+              <a:cxnSpLocks/>
+              <a:stCxn id="20" idx="2"/>
+            </p:cNvCxnSpPr>
+            <p:nvPr/>
+          </p:nvCxnSpPr>
+          <p:spPr>
+            <a:xfrm flipH="1">
+              <a:off x="5228162" y="1767532"/>
+              <a:ext cx="755158" cy="1663657"/>
+            </a:xfrm>
+            <a:prstGeom prst="straightConnector1">
+              <a:avLst/>
+            </a:prstGeom>
+            <a:ln w="28575">
+              <a:solidFill>
+                <a:srgbClr val="FF0000"/>
+              </a:solidFill>
+              <a:tailEnd type="triangle"/>
+            </a:ln>
+          </p:spPr>
+          <p:style>
+            <a:lnRef idx="1">
+              <a:schemeClr val="accent1"/>
+            </a:lnRef>
+            <a:fillRef idx="0">
+              <a:schemeClr val="accent1"/>
+            </a:fillRef>
+            <a:effectRef idx="0">
+              <a:schemeClr val="accent1"/>
+            </a:effectRef>
+            <a:fontRef idx="minor">
+              <a:schemeClr val="tx1"/>
+            </a:fontRef>
+          </p:style>
+        </p:cxnSp>
+      </p:grpSp>
+    </p:spTree>
+    <p:extLst>
+      <p:ext uri="{BB962C8B-B14F-4D97-AF65-F5344CB8AC3E}">
+        <p14:creationId xmlns:p14="http://schemas.microsoft.com/office/powerpoint/2010/main" val="3593433705"/>
+      </p:ext>
+    </p:extLst>
+  </p:cSld>
+  <p:clrMapOvr>
+    <a:masterClrMapping/>
+  </p:clrMapOvr>
+</p:sld>
+</file>
+
+<file path=ppt/slides/slide6.xml><?xml version="1.0" encoding="utf-8"?>
+<p:sld xmlns:a="http://schemas.openxmlformats.org/drawingml/2006/main" xmlns:r="http://schemas.openxmlformats.org/officeDocument/2006/relationships" xmlns:p="http://schemas.openxmlformats.org/presentationml/2006/main">
+  <p:cSld>
+    <p:bg>
+      <p:bgPr>
+        <a:solidFill>
+          <a:srgbClr val="403551"/>
+        </a:solidFill>
+        <a:effectLst/>
+      </p:bgPr>
+    </p:bg>
+    <p:spTree>
+      <p:nvGrpSpPr>
+        <p:cNvPr id="1" name=""/>
+        <p:cNvGrpSpPr/>
+        <p:nvPr/>
+      </p:nvGrpSpPr>
+      <p:grpSpPr>
+        <a:xfrm>
+          <a:off x="0" y="0"/>
+          <a:ext cx="0" cy="0"/>
+          <a:chOff x="0" y="0"/>
+          <a:chExt cx="0" cy="0"/>
+        </a:xfrm>
+      </p:grpSpPr>
+      <p:sp>
+        <p:nvSpPr>
+          <p:cNvPr id="3" name="Date Placeholder 2"/>
+          <p:cNvSpPr>
+            <a:spLocks noGrp="1"/>
+          </p:cNvSpPr>
+          <p:nvPr>
+            <p:ph type="dt" sz="half" idx="10"/>
+          </p:nvPr>
+        </p:nvSpPr>
+        <p:spPr/>
+        <p:txBody>
+          <a:bodyPr/>
+          <a:lstStyle/>
+          <a:p>
+            <a:r>
+              <a:rPr lang="fr-FR"/>
+              <a:t>04 février 2021</a:t>
+            </a:r>
+            <a:endParaRPr lang="en-US"/>
+          </a:p>
+        </p:txBody>
+      </p:sp>
+      <p:sp>
+        <p:nvSpPr>
+          <p:cNvPr id="4" name="Footer Placeholder 3"/>
+          <p:cNvSpPr>
+            <a:spLocks noGrp="1"/>
+          </p:cNvSpPr>
+          <p:nvPr>
+            <p:ph type="ftr" sz="quarter" idx="11"/>
+          </p:nvPr>
+        </p:nvSpPr>
+        <p:spPr>
+          <a:xfrm>
+            <a:off x="3359696" y="5713275"/>
+            <a:ext cx="4114800" cy="365125"/>
+          </a:xfrm>
+        </p:spPr>
+        <p:txBody>
+          <a:bodyPr/>
+          <a:lstStyle/>
+          <a:p>
+            <a:r>
+              <a:rPr lang="fr-FR"/>
+              <a:t>Command &amp; Memento - Aurélien BOUDIER</a:t>
+            </a:r>
+            <a:endParaRPr lang="en-US"/>
+          </a:p>
+        </p:txBody>
+      </p:sp>
+      <p:sp>
+        <p:nvSpPr>
+          <p:cNvPr id="11" name="Text Placeholder 10">
+            <a:extLst>
+              <a:ext uri="{FF2B5EF4-FFF2-40B4-BE49-F238E27FC236}">
+                <a16:creationId xmlns:a16="http://schemas.microsoft.com/office/drawing/2014/main" id="{2A6E9779-5059-4C5A-A10E-A924E6ADE536}"/>
+              </a:ext>
+            </a:extLst>
+          </p:cNvPr>
+          <p:cNvSpPr>
+            <a:spLocks noGrp="1"/>
+          </p:cNvSpPr>
+          <p:nvPr>
+            <p:ph type="body" sz="quarter" idx="13"/>
+          </p:nvPr>
+        </p:nvSpPr>
+        <p:spPr/>
+        <p:txBody>
+          <a:bodyPr/>
+          <a:lstStyle/>
+          <a:p>
+            <a:r>
+              <a:rPr lang="en-US"/>
+              <a:t>01</a:t>
+            </a:r>
+          </a:p>
+        </p:txBody>
+      </p:sp>
+      <p:pic>
+        <p:nvPicPr>
+          <p:cNvPr id="2050" name="Picture 2">
+            <a:extLst>
+              <a:ext uri="{FF2B5EF4-FFF2-40B4-BE49-F238E27FC236}">
+                <a16:creationId xmlns:a16="http://schemas.microsoft.com/office/drawing/2014/main" id="{4EA016E1-5AEB-4C35-85A9-2691218D44AF}"/>
+              </a:ext>
+            </a:extLst>
+          </p:cNvPr>
+          <p:cNvPicPr>
+            <a:picLocks noChangeAspect="1" noChangeArrowheads="1"/>
+          </p:cNvPicPr>
+          <p:nvPr/>
+        </p:nvPicPr>
+        <p:blipFill>
+          <a:blip r:embed="rId3">
+            <a:extLst>
+              <a:ext uri="{28A0092B-C50C-407E-A947-70E740481C1C}">
+                <a14:useLocalDpi xmlns:a14="http://schemas.microsoft.com/office/drawing/2010/main" val="0"/>
+              </a:ext>
+            </a:extLst>
+          </a:blip>
+          <a:srcRect/>
+          <a:stretch>
+            <a:fillRect/>
+          </a:stretch>
+        </p:blipFill>
+        <p:spPr bwMode="auto">
+          <a:xfrm>
+            <a:off x="2286000" y="1619250"/>
+            <a:ext cx="7620000" cy="3619500"/>
+          </a:xfrm>
+          <a:prstGeom prst="rect">
+            <a:avLst/>
+          </a:prstGeom>
+          <a:noFill/>
+          <a:extLst>
+            <a:ext uri="{909E8E84-426E-40DD-AFC4-6F175D3DCCD1}">
+              <a14:hiddenFill xmlns:a14="http://schemas.microsoft.com/office/drawing/2010/main">
+                <a:solidFill>
+                  <a:srgbClr val="FFFFFF"/>
+                </a:solidFill>
+              </a14:hiddenFill>
+            </a:ext>
+          </a:extLst>
+        </p:spPr>
+      </p:pic>
+    </p:spTree>
+    <p:extLst>
+      <p:ext uri="{BB962C8B-B14F-4D97-AF65-F5344CB8AC3E}">
+        <p14:creationId xmlns:p14="http://schemas.microsoft.com/office/powerpoint/2010/main" val="2765386768"/>
+      </p:ext>
+    </p:extLst>
+  </p:cSld>
+  <p:clrMapOvr>
+    <a:masterClrMapping/>
+  </p:clrMapOvr>
+</p:sld>
+</file>
+
+<file path=ppt/slides/slide7.xml><?xml version="1.0" encoding="utf-8"?>
+<p:sld xmlns:a="http://schemas.openxmlformats.org/drawingml/2006/main" xmlns:r="http://schemas.openxmlformats.org/officeDocument/2006/relationships" xmlns:p="http://schemas.openxmlformats.org/presentationml/2006/main">
+  <p:cSld>
+    <p:spTree>
+      <p:nvGrpSpPr>
+        <p:cNvPr id="1" name=""/>
+        <p:cNvGrpSpPr/>
+        <p:nvPr/>
+      </p:nvGrpSpPr>
+      <p:grpSpPr>
+        <a:xfrm>
+          <a:off x="0" y="0"/>
+          <a:ext cx="0" cy="0"/>
+          <a:chOff x="0" y="0"/>
+          <a:chExt cx="0" cy="0"/>
+        </a:xfrm>
+      </p:grpSpPr>
+      <p:sp>
+        <p:nvSpPr>
+          <p:cNvPr id="3" name="Date Placeholder 2"/>
+          <p:cNvSpPr>
+            <a:spLocks noGrp="1"/>
+          </p:cNvSpPr>
+          <p:nvPr>
+            <p:ph type="dt" sz="half" idx="10"/>
+          </p:nvPr>
+        </p:nvSpPr>
+        <p:spPr/>
+        <p:txBody>
+          <a:bodyPr/>
+          <a:lstStyle/>
+          <a:p>
+            <a:r>
+              <a:rPr lang="fr-FR"/>
+              <a:t>04 février 2021</a:t>
+            </a:r>
+            <a:endParaRPr lang="en-US"/>
+          </a:p>
+        </p:txBody>
+      </p:sp>
+      <p:sp>
+        <p:nvSpPr>
+          <p:cNvPr id="4" name="Footer Placeholder 3"/>
+          <p:cNvSpPr>
+            <a:spLocks noGrp="1"/>
+          </p:cNvSpPr>
+          <p:nvPr>
+            <p:ph type="ftr" sz="quarter" idx="11"/>
+          </p:nvPr>
+        </p:nvSpPr>
+        <p:spPr/>
+        <p:txBody>
+          <a:bodyPr/>
+          <a:lstStyle/>
+          <a:p>
+            <a:r>
+              <a:rPr lang="fr-FR"/>
+              <a:t>Command &amp; Memento - Aurélien BOUDIER</a:t>
+            </a:r>
+            <a:endParaRPr lang="en-US"/>
+          </a:p>
+        </p:txBody>
+      </p:sp>
+      <p:sp>
+        <p:nvSpPr>
+          <p:cNvPr id="11" name="Text Placeholder 10">
+            <a:extLst>
+              <a:ext uri="{FF2B5EF4-FFF2-40B4-BE49-F238E27FC236}">
+                <a16:creationId xmlns:a16="http://schemas.microsoft.com/office/drawing/2014/main" id="{2A6E9779-5059-4C5A-A10E-A924E6ADE536}"/>
+              </a:ext>
+            </a:extLst>
+          </p:cNvPr>
+          <p:cNvSpPr>
+            <a:spLocks noGrp="1"/>
+          </p:cNvSpPr>
+          <p:nvPr>
+            <p:ph type="body" sz="quarter" idx="13"/>
+          </p:nvPr>
+        </p:nvSpPr>
+        <p:spPr/>
+        <p:txBody>
+          <a:bodyPr/>
+          <a:lstStyle/>
+          <a:p>
+            <a:r>
+              <a:rPr lang="en-US"/>
+              <a:t>01</a:t>
+            </a:r>
+          </a:p>
+        </p:txBody>
+      </p:sp>
+      <p:pic>
+        <p:nvPicPr>
+          <p:cNvPr id="9" name="Image 8">
+            <a:extLst>
+              <a:ext uri="{FF2B5EF4-FFF2-40B4-BE49-F238E27FC236}">
+                <a16:creationId xmlns:a16="http://schemas.microsoft.com/office/drawing/2014/main" id="{79A96D39-353D-4A6E-8A56-7B8BFBEE319E}"/>
+              </a:ext>
+            </a:extLst>
+          </p:cNvPr>
+          <p:cNvPicPr>
+            <a:picLocks noChangeAspect="1"/>
+          </p:cNvPicPr>
+          <p:nvPr/>
+        </p:nvPicPr>
+        <p:blipFill rotWithShape="1">
+          <a:blip r:embed="rId3"/>
+          <a:srcRect l="5473" r="14469"/>
+          <a:stretch/>
+        </p:blipFill>
+        <p:spPr>
+          <a:xfrm>
+            <a:off x="5735960" y="491297"/>
+            <a:ext cx="5976664" cy="5621003"/>
+          </a:xfrm>
+          <a:prstGeom prst="rect">
+            <a:avLst/>
+          </a:prstGeom>
+        </p:spPr>
+      </p:pic>
+      <p:pic>
+        <p:nvPicPr>
+          <p:cNvPr id="15" name="Image 14">
+            <a:extLst>
+              <a:ext uri="{FF2B5EF4-FFF2-40B4-BE49-F238E27FC236}">
+                <a16:creationId xmlns:a16="http://schemas.microsoft.com/office/drawing/2014/main" id="{A2E02B67-370C-48FA-8942-F9580F5D0152}"/>
+              </a:ext>
+            </a:extLst>
+          </p:cNvPr>
+          <p:cNvPicPr>
+            <a:picLocks noChangeAspect="1"/>
+          </p:cNvPicPr>
+          <p:nvPr/>
+        </p:nvPicPr>
+        <p:blipFill>
+          <a:blip r:embed="rId4"/>
+          <a:stretch>
+            <a:fillRect/>
+          </a:stretch>
+        </p:blipFill>
+        <p:spPr>
+          <a:xfrm>
+            <a:off x="695400" y="1726664"/>
+            <a:ext cx="3964182" cy="4118525"/>
+          </a:xfrm>
+          <a:prstGeom prst="rect">
+            <a:avLst/>
+          </a:prstGeom>
+        </p:spPr>
+      </p:pic>
+    </p:spTree>
+    <p:extLst>
+      <p:ext uri="{BB962C8B-B14F-4D97-AF65-F5344CB8AC3E}">
+        <p14:creationId xmlns:p14="http://schemas.microsoft.com/office/powerpoint/2010/main" val="19207291"/>
+      </p:ext>
+    </p:extLst>
+  </p:cSld>
+  <p:clrMapOvr>
+    <a:masterClrMapping/>
+  </p:clrMapOvr>
+</p:sld>
+</file>
+
+<file path=ppt/slides/slide8.xml><?xml version="1.0" encoding="utf-8"?>
 <p:sld xmlns:a="http://schemas.openxmlformats.org/drawingml/2006/main" xmlns:r="http://schemas.openxmlformats.org/officeDocument/2006/relationships" xmlns:p="http://schemas.openxmlformats.org/presentationml/2006/main">
   <p:cSld>
     <p:spTree>
@@ -43484,7 +45508,7 @@
 </p:sld>
 </file>
 
-<file path=ppt/slides/slide6.xml><?xml version="1.0" encoding="utf-8"?>
+<file path=ppt/slides/slide9.xml><?xml version="1.0" encoding="utf-8"?>
 <p:sld xmlns:a="http://schemas.openxmlformats.org/drawingml/2006/main" xmlns:r="http://schemas.openxmlformats.org/officeDocument/2006/relationships" xmlns:p="http://schemas.openxmlformats.org/presentationml/2006/main">
   <p:cSld>
     <p:spTree>
@@ -43616,399 +45640,6 @@
     <p:extLst>
       <p:ext uri="{BB962C8B-B14F-4D97-AF65-F5344CB8AC3E}">
         <p14:creationId xmlns:p14="http://schemas.microsoft.com/office/powerpoint/2010/main" val="3399286523"/>
-      </p:ext>
-    </p:extLst>
-  </p:cSld>
-  <p:clrMapOvr>
-    <a:masterClrMapping/>
-  </p:clrMapOvr>
-</p:sld>
-</file>
-
-<file path=ppt/slides/slide7.xml><?xml version="1.0" encoding="utf-8"?>
-<p:sld xmlns:a="http://schemas.openxmlformats.org/drawingml/2006/main" xmlns:r="http://schemas.openxmlformats.org/officeDocument/2006/relationships" xmlns:p="http://schemas.openxmlformats.org/presentationml/2006/main">
-  <p:cSld>
-    <p:spTree>
-      <p:nvGrpSpPr>
-        <p:cNvPr id="1" name=""/>
-        <p:cNvGrpSpPr/>
-        <p:nvPr/>
-      </p:nvGrpSpPr>
-      <p:grpSpPr>
-        <a:xfrm>
-          <a:off x="0" y="0"/>
-          <a:ext cx="0" cy="0"/>
-          <a:chOff x="0" y="0"/>
-          <a:chExt cx="0" cy="0"/>
-        </a:xfrm>
-      </p:grpSpPr>
-      <p:sp>
-        <p:nvSpPr>
-          <p:cNvPr id="2" name="Title 1"/>
-          <p:cNvSpPr>
-            <a:spLocks noGrp="1"/>
-          </p:cNvSpPr>
-          <p:nvPr>
-            <p:ph type="title"/>
-          </p:nvPr>
-        </p:nvSpPr>
-        <p:spPr/>
-        <p:txBody>
-          <a:bodyPr/>
-          <a:lstStyle/>
-          <a:p>
-            <a:r>
-              <a:rPr lang="fr-FR" dirty="0"/>
-              <a:t>Présentation d’une </a:t>
-            </a:r>
-            <a:br>
-              <a:rPr lang="fr-FR" dirty="0"/>
-            </a:br>
-            <a:r>
-              <a:rPr lang="fr-FR" dirty="0"/>
-              <a:t>petite implémentation</a:t>
-            </a:r>
-          </a:p>
-        </p:txBody>
-      </p:sp>
-      <p:sp>
-        <p:nvSpPr>
-          <p:cNvPr id="16" name="Text Placeholder 15"/>
-          <p:cNvSpPr>
-            <a:spLocks noGrp="1"/>
-          </p:cNvSpPr>
-          <p:nvPr>
-            <p:ph type="body" idx="1"/>
-          </p:nvPr>
-        </p:nvSpPr>
-        <p:spPr/>
-        <p:txBody>
-          <a:bodyPr>
-            <a:noAutofit/>
-          </a:bodyPr>
-          <a:lstStyle/>
-          <a:p>
-            <a:r>
-              <a:rPr lang="fr-FR" dirty="0"/>
-              <a:t>Microsoft Word peut trembler !</a:t>
-            </a:r>
-          </a:p>
-        </p:txBody>
-      </p:sp>
-      <p:sp>
-        <p:nvSpPr>
-          <p:cNvPr id="38" name="Date Placeholder 37">
-            <a:extLst>
-              <a:ext uri="{FF2B5EF4-FFF2-40B4-BE49-F238E27FC236}">
-                <a16:creationId xmlns:a16="http://schemas.microsoft.com/office/drawing/2014/main" id="{214893A6-5453-4772-A5C3-6E8247B9F7F7}"/>
-              </a:ext>
-            </a:extLst>
-          </p:cNvPr>
-          <p:cNvSpPr>
-            <a:spLocks noGrp="1"/>
-          </p:cNvSpPr>
-          <p:nvPr>
-            <p:ph type="dt" sz="half" idx="10"/>
-          </p:nvPr>
-        </p:nvSpPr>
-        <p:spPr/>
-        <p:txBody>
-          <a:bodyPr/>
-          <a:lstStyle/>
-          <a:p>
-            <a:r>
-              <a:rPr lang="fr-FR"/>
-              <a:t>04 février 2021</a:t>
-            </a:r>
-            <a:endParaRPr lang="en-US"/>
-          </a:p>
-        </p:txBody>
-      </p:sp>
-      <p:sp>
-        <p:nvSpPr>
-          <p:cNvPr id="39" name="Footer Placeholder 38">
-            <a:extLst>
-              <a:ext uri="{FF2B5EF4-FFF2-40B4-BE49-F238E27FC236}">
-                <a16:creationId xmlns:a16="http://schemas.microsoft.com/office/drawing/2014/main" id="{19A88EA5-E6FB-4BFB-9421-CB6C4447B890}"/>
-              </a:ext>
-            </a:extLst>
-          </p:cNvPr>
-          <p:cNvSpPr>
-            <a:spLocks noGrp="1"/>
-          </p:cNvSpPr>
-          <p:nvPr>
-            <p:ph type="ftr" sz="quarter" idx="11"/>
-          </p:nvPr>
-        </p:nvSpPr>
-        <p:spPr/>
-        <p:txBody>
-          <a:bodyPr/>
-          <a:lstStyle/>
-          <a:p>
-            <a:r>
-              <a:rPr lang="fr-FR"/>
-              <a:t>Command &amp; Memento - Aurélien BOUDIER</a:t>
-            </a:r>
-            <a:endParaRPr lang="en-US"/>
-          </a:p>
-        </p:txBody>
-      </p:sp>
-    </p:spTree>
-    <p:extLst>
-      <p:ext uri="{BB962C8B-B14F-4D97-AF65-F5344CB8AC3E}">
-        <p14:creationId xmlns:p14="http://schemas.microsoft.com/office/powerpoint/2010/main" val="2565046013"/>
-      </p:ext>
-    </p:extLst>
-  </p:cSld>
-  <p:clrMapOvr>
-    <a:masterClrMapping/>
-  </p:clrMapOvr>
-</p:sld>
-</file>
-
-<file path=ppt/slides/slide8.xml><?xml version="1.0" encoding="utf-8"?>
-<p:sld xmlns:a="http://schemas.openxmlformats.org/drawingml/2006/main" xmlns:r="http://schemas.openxmlformats.org/officeDocument/2006/relationships" xmlns:p="http://schemas.openxmlformats.org/presentationml/2006/main">
-  <p:cSld>
-    <p:spTree>
-      <p:nvGrpSpPr>
-        <p:cNvPr id="1" name=""/>
-        <p:cNvGrpSpPr/>
-        <p:nvPr/>
-      </p:nvGrpSpPr>
-      <p:grpSpPr>
-        <a:xfrm>
-          <a:off x="0" y="0"/>
-          <a:ext cx="0" cy="0"/>
-          <a:chOff x="0" y="0"/>
-          <a:chExt cx="0" cy="0"/>
-        </a:xfrm>
-      </p:grpSpPr>
-      <p:sp>
-        <p:nvSpPr>
-          <p:cNvPr id="2" name="Title 1"/>
-          <p:cNvSpPr>
-            <a:spLocks noGrp="1"/>
-          </p:cNvSpPr>
-          <p:nvPr>
-            <p:ph type="title"/>
-          </p:nvPr>
-        </p:nvSpPr>
-        <p:spPr/>
-        <p:txBody>
-          <a:bodyPr/>
-          <a:lstStyle/>
-          <a:p>
-            <a:r>
-              <a:rPr lang="fr-FR" dirty="0"/>
-              <a:t>Diagrammes génériques</a:t>
-            </a:r>
-          </a:p>
-        </p:txBody>
-      </p:sp>
-      <p:sp>
-        <p:nvSpPr>
-          <p:cNvPr id="38" name="Date Placeholder 37">
-            <a:extLst>
-              <a:ext uri="{FF2B5EF4-FFF2-40B4-BE49-F238E27FC236}">
-                <a16:creationId xmlns:a16="http://schemas.microsoft.com/office/drawing/2014/main" id="{214893A6-5453-4772-A5C3-6E8247B9F7F7}"/>
-              </a:ext>
-            </a:extLst>
-          </p:cNvPr>
-          <p:cNvSpPr>
-            <a:spLocks noGrp="1"/>
-          </p:cNvSpPr>
-          <p:nvPr>
-            <p:ph type="dt" sz="half" idx="10"/>
-          </p:nvPr>
-        </p:nvSpPr>
-        <p:spPr/>
-        <p:txBody>
-          <a:bodyPr/>
-          <a:lstStyle/>
-          <a:p>
-            <a:r>
-              <a:rPr lang="fr-FR"/>
-              <a:t>04 février 2021</a:t>
-            </a:r>
-            <a:endParaRPr lang="en-US"/>
-          </a:p>
-        </p:txBody>
-      </p:sp>
-      <p:sp>
-        <p:nvSpPr>
-          <p:cNvPr id="39" name="Footer Placeholder 38">
-            <a:extLst>
-              <a:ext uri="{FF2B5EF4-FFF2-40B4-BE49-F238E27FC236}">
-                <a16:creationId xmlns:a16="http://schemas.microsoft.com/office/drawing/2014/main" id="{19A88EA5-E6FB-4BFB-9421-CB6C4447B890}"/>
-              </a:ext>
-            </a:extLst>
-          </p:cNvPr>
-          <p:cNvSpPr>
-            <a:spLocks noGrp="1"/>
-          </p:cNvSpPr>
-          <p:nvPr>
-            <p:ph type="ftr" sz="quarter" idx="11"/>
-          </p:nvPr>
-        </p:nvSpPr>
-        <p:spPr/>
-        <p:txBody>
-          <a:bodyPr/>
-          <a:lstStyle/>
-          <a:p>
-            <a:r>
-              <a:rPr lang="fr-FR"/>
-              <a:t>Command &amp; Memento - Aurélien BOUDIER</a:t>
-            </a:r>
-            <a:endParaRPr lang="en-US"/>
-          </a:p>
-        </p:txBody>
-      </p:sp>
-    </p:spTree>
-    <p:extLst>
-      <p:ext uri="{BB962C8B-B14F-4D97-AF65-F5344CB8AC3E}">
-        <p14:creationId xmlns:p14="http://schemas.microsoft.com/office/powerpoint/2010/main" val="2376558637"/>
-      </p:ext>
-    </p:extLst>
-  </p:cSld>
-  <p:clrMapOvr>
-    <a:masterClrMapping/>
-  </p:clrMapOvr>
-</p:sld>
-</file>
-
-<file path=ppt/slides/slide9.xml><?xml version="1.0" encoding="utf-8"?>
-<p:sld xmlns:a="http://schemas.openxmlformats.org/drawingml/2006/main" xmlns:r="http://schemas.openxmlformats.org/officeDocument/2006/relationships" xmlns:p="http://schemas.openxmlformats.org/presentationml/2006/main">
-  <p:cSld>
-    <p:spTree>
-      <p:nvGrpSpPr>
-        <p:cNvPr id="1" name=""/>
-        <p:cNvGrpSpPr/>
-        <p:nvPr/>
-      </p:nvGrpSpPr>
-      <p:grpSpPr>
-        <a:xfrm>
-          <a:off x="0" y="0"/>
-          <a:ext cx="0" cy="0"/>
-          <a:chOff x="0" y="0"/>
-          <a:chExt cx="0" cy="0"/>
-        </a:xfrm>
-      </p:grpSpPr>
-      <p:sp>
-        <p:nvSpPr>
-          <p:cNvPr id="2" name="Title 1"/>
-          <p:cNvSpPr>
-            <a:spLocks noGrp="1"/>
-          </p:cNvSpPr>
-          <p:nvPr>
-            <p:ph type="title"/>
-          </p:nvPr>
-        </p:nvSpPr>
-        <p:spPr/>
-        <p:txBody>
-          <a:bodyPr/>
-          <a:lstStyle/>
-          <a:p>
-            <a:r>
-              <a:rPr lang="fr-FR" dirty="0"/>
-              <a:t>Avantages &amp; </a:t>
-            </a:r>
-            <a:br>
-              <a:rPr lang="fr-FR" dirty="0"/>
-            </a:br>
-            <a:r>
-              <a:rPr lang="fr-FR" dirty="0"/>
-              <a:t>désavantages</a:t>
-            </a:r>
-          </a:p>
-        </p:txBody>
-      </p:sp>
-      <p:sp>
-        <p:nvSpPr>
-          <p:cNvPr id="16" name="Text Placeholder 15"/>
-          <p:cNvSpPr>
-            <a:spLocks noGrp="1"/>
-          </p:cNvSpPr>
-          <p:nvPr>
-            <p:ph type="body" idx="1"/>
-          </p:nvPr>
-        </p:nvSpPr>
-        <p:spPr/>
-        <p:txBody>
-          <a:bodyPr>
-            <a:noAutofit/>
-          </a:bodyPr>
-          <a:lstStyle/>
-          <a:p>
-            <a:r>
-              <a:rPr lang="fr-FR" dirty="0"/>
-              <a:t>Tout avantage a ses inconvénients et réciproquement</a:t>
-            </a:r>
-            <a:endParaRPr lang="en-US" dirty="0"/>
-          </a:p>
-        </p:txBody>
-      </p:sp>
-      <p:sp>
-        <p:nvSpPr>
-          <p:cNvPr id="38" name="Date Placeholder 37">
-            <a:extLst>
-              <a:ext uri="{FF2B5EF4-FFF2-40B4-BE49-F238E27FC236}">
-                <a16:creationId xmlns:a16="http://schemas.microsoft.com/office/drawing/2014/main" id="{214893A6-5453-4772-A5C3-6E8247B9F7F7}"/>
-              </a:ext>
-            </a:extLst>
-          </p:cNvPr>
-          <p:cNvSpPr>
-            <a:spLocks noGrp="1"/>
-          </p:cNvSpPr>
-          <p:nvPr>
-            <p:ph type="dt" sz="half" idx="10"/>
-          </p:nvPr>
-        </p:nvSpPr>
-        <p:spPr/>
-        <p:txBody>
-          <a:bodyPr/>
-          <a:lstStyle/>
-          <a:p>
-            <a:r>
-              <a:rPr lang="fr-FR"/>
-              <a:t>04 février 2021</a:t>
-            </a:r>
-            <a:endParaRPr lang="en-US"/>
-          </a:p>
-        </p:txBody>
-      </p:sp>
-      <p:sp>
-        <p:nvSpPr>
-          <p:cNvPr id="39" name="Footer Placeholder 38">
-            <a:extLst>
-              <a:ext uri="{FF2B5EF4-FFF2-40B4-BE49-F238E27FC236}">
-                <a16:creationId xmlns:a16="http://schemas.microsoft.com/office/drawing/2014/main" id="{19A88EA5-E6FB-4BFB-9421-CB6C4447B890}"/>
-              </a:ext>
-            </a:extLst>
-          </p:cNvPr>
-          <p:cNvSpPr>
-            <a:spLocks noGrp="1"/>
-          </p:cNvSpPr>
-          <p:nvPr>
-            <p:ph type="ftr" sz="quarter" idx="11"/>
-          </p:nvPr>
-        </p:nvSpPr>
-        <p:spPr/>
-        <p:txBody>
-          <a:bodyPr/>
-          <a:lstStyle/>
-          <a:p>
-            <a:r>
-              <a:rPr lang="fr-FR"/>
-              <a:t>Command &amp; Memento - Aurélien BOUDIER</a:t>
-            </a:r>
-            <a:endParaRPr lang="en-US"/>
-          </a:p>
-        </p:txBody>
-      </p:sp>
-    </p:spTree>
-    <p:extLst>
-      <p:ext uri="{BB962C8B-B14F-4D97-AF65-F5344CB8AC3E}">
-        <p14:creationId xmlns:p14="http://schemas.microsoft.com/office/powerpoint/2010/main" val="3633152721"/>
       </p:ext>
     </p:extLst>
   </p:cSld>

</xml_diff>

<commit_message>
Commnand pattern / ppt in progress
</commit_message>
<xml_diff>
--- a/01-Powerpoint-presentation/PowerpointPresentation.pptx
+++ b/01-Powerpoint-presentation/PowerpointPresentation.pptx
@@ -7,10 +7,10 @@
     <p:sldMasterId id="2147483753" r:id="rId3"/>
   </p:sldMasterIdLst>
   <p:notesMasterIdLst>
-    <p:notesMasterId r:id="rId28"/>
+    <p:notesMasterId r:id="rId30"/>
   </p:notesMasterIdLst>
   <p:handoutMasterIdLst>
-    <p:handoutMasterId r:id="rId29"/>
+    <p:handoutMasterId r:id="rId31"/>
   </p:handoutMasterIdLst>
   <p:sldIdLst>
     <p:sldId id="866" r:id="rId4"/>
@@ -20,23 +20,25 @@
     <p:sldId id="811" r:id="rId8"/>
     <p:sldId id="901" r:id="rId9"/>
     <p:sldId id="900" r:id="rId10"/>
-    <p:sldId id="892" r:id="rId11"/>
-    <p:sldId id="895" r:id="rId12"/>
-    <p:sldId id="896" r:id="rId13"/>
-    <p:sldId id="897" r:id="rId14"/>
-    <p:sldId id="898" r:id="rId15"/>
-    <p:sldId id="899" r:id="rId16"/>
-    <p:sldId id="877" r:id="rId17"/>
-    <p:sldId id="879" r:id="rId18"/>
-    <p:sldId id="881" r:id="rId19"/>
-    <p:sldId id="882" r:id="rId20"/>
-    <p:sldId id="883" r:id="rId21"/>
-    <p:sldId id="884" r:id="rId22"/>
-    <p:sldId id="885" r:id="rId23"/>
-    <p:sldId id="886" r:id="rId24"/>
-    <p:sldId id="887" r:id="rId25"/>
-    <p:sldId id="889" r:id="rId26"/>
-    <p:sldId id="894" r:id="rId27"/>
+    <p:sldId id="902" r:id="rId11"/>
+    <p:sldId id="903" r:id="rId12"/>
+    <p:sldId id="892" r:id="rId13"/>
+    <p:sldId id="895" r:id="rId14"/>
+    <p:sldId id="896" r:id="rId15"/>
+    <p:sldId id="897" r:id="rId16"/>
+    <p:sldId id="898" r:id="rId17"/>
+    <p:sldId id="899" r:id="rId18"/>
+    <p:sldId id="877" r:id="rId19"/>
+    <p:sldId id="879" r:id="rId20"/>
+    <p:sldId id="881" r:id="rId21"/>
+    <p:sldId id="882" r:id="rId22"/>
+    <p:sldId id="883" r:id="rId23"/>
+    <p:sldId id="884" r:id="rId24"/>
+    <p:sldId id="885" r:id="rId25"/>
+    <p:sldId id="886" r:id="rId26"/>
+    <p:sldId id="887" r:id="rId27"/>
+    <p:sldId id="889" r:id="rId28"/>
+    <p:sldId id="894" r:id="rId29"/>
   </p:sldIdLst>
   <p:sldSz cx="12192000" cy="6858000"/>
   <p:notesSz cx="6858000" cy="9144000"/>
@@ -147,6 +149,8 @@
             <p14:sldId id="811"/>
             <p14:sldId id="901"/>
             <p14:sldId id="900"/>
+            <p14:sldId id="902"/>
+            <p14:sldId id="903"/>
             <p14:sldId id="892"/>
             <p14:sldId id="895"/>
             <p14:sldId id="896"/>
@@ -5866,7 +5870,7 @@
             <a:fld id="{EA33B4B9-AFB0-43EB-82AF-ED70AC262E4F}" type="datetimeFigureOut">
               <a:rPr lang="en-US" smtClean="0"/>
               <a:pPr/>
-              <a:t>2/3/2021</a:t>
+              <a:t>2/6/2021</a:t>
             </a:fld>
             <a:endParaRPr lang="en-US"/>
           </a:p>
@@ -6034,7 +6038,7 @@
             <a:fld id="{3D31E77A-DD07-4A76-801D-B4BF4990C412}" type="datetimeFigureOut">
               <a:rPr lang="en-US" smtClean="0"/>
               <a:pPr/>
-              <a:t>2/3/2021</a:t>
+              <a:t>2/6/2021</a:t>
             </a:fld>
             <a:endParaRPr lang="en-US"/>
           </a:p>
@@ -6475,7 +6479,7 @@
     </p:spTree>
     <p:extLst>
       <p:ext uri="{BB962C8B-B14F-4D97-AF65-F5344CB8AC3E}">
-        <p14:creationId xmlns:p14="http://schemas.microsoft.com/office/powerpoint/2010/main" val="3584205330"/>
+        <p14:creationId xmlns:p14="http://schemas.microsoft.com/office/powerpoint/2010/main" val="590651591"/>
       </p:ext>
     </p:extLst>
   </p:cSld>
@@ -6568,7 +6572,7 @@
     </p:spTree>
     <p:extLst>
       <p:ext uri="{BB962C8B-B14F-4D97-AF65-F5344CB8AC3E}">
-        <p14:creationId xmlns:p14="http://schemas.microsoft.com/office/powerpoint/2010/main" val="3552511973"/>
+        <p14:creationId xmlns:p14="http://schemas.microsoft.com/office/powerpoint/2010/main" val="852387929"/>
       </p:ext>
     </p:extLst>
   </p:cSld>
@@ -6623,14 +6627,14 @@
           <a:lstStyle/>
           <a:p>
             <a:r>
-              <a:rPr lang="en-US" sz="1200">
+              <a:rPr lang="en-US" sz="1200" dirty="0">
                 <a:solidFill>
                   <a:prstClr val="black"/>
                 </a:solidFill>
               </a:rPr>
               <a:t>© Copyright Showeet.com – Creative &amp; Free PowerPoint Templates</a:t>
             </a:r>
-            <a:endParaRPr lang="en-US"/>
+            <a:endParaRPr lang="en-US" dirty="0"/>
           </a:p>
         </p:txBody>
       </p:sp>
@@ -6661,7 +6665,7 @@
     </p:spTree>
     <p:extLst>
       <p:ext uri="{BB962C8B-B14F-4D97-AF65-F5344CB8AC3E}">
-        <p14:creationId xmlns:p14="http://schemas.microsoft.com/office/powerpoint/2010/main" val="372831945"/>
+        <p14:creationId xmlns:p14="http://schemas.microsoft.com/office/powerpoint/2010/main" val="3584205330"/>
       </p:ext>
     </p:extLst>
   </p:cSld>
@@ -6754,7 +6758,7 @@
     </p:spTree>
     <p:extLst>
       <p:ext uri="{BB962C8B-B14F-4D97-AF65-F5344CB8AC3E}">
-        <p14:creationId xmlns:p14="http://schemas.microsoft.com/office/powerpoint/2010/main" val="324157143"/>
+        <p14:creationId xmlns:p14="http://schemas.microsoft.com/office/powerpoint/2010/main" val="3552511973"/>
       </p:ext>
     </p:extLst>
   </p:cSld>
@@ -6808,23 +6812,6 @@
           <a:bodyPr/>
           <a:lstStyle/>
           <a:p>
-            <a:pPr marL="0" marR="0" lvl="0" indent="0" algn="l" defTabSz="914354" rtl="0" eaLnBrk="1" fontAlgn="auto" latinLnBrk="0" hangingPunct="1">
-              <a:lnSpc>
-                <a:spcPct val="100000"/>
-              </a:lnSpc>
-              <a:spcBef>
-                <a:spcPts val="0"/>
-              </a:spcBef>
-              <a:spcAft>
-                <a:spcPts val="0"/>
-              </a:spcAft>
-              <a:buClrTx/>
-              <a:buSzTx/>
-              <a:buFontTx/>
-              <a:buNone/>
-              <a:tabLst/>
-              <a:defRPr/>
-            </a:pPr>
             <a:r>
               <a:rPr lang="en-US" sz="1200">
                 <a:solidFill>
@@ -6833,6 +6820,7 @@
               </a:rPr>
               <a:t>© Copyright Showeet.com – Creative &amp; Free PowerPoint Templates</a:t>
             </a:r>
+            <a:endParaRPr lang="en-US"/>
           </a:p>
         </p:txBody>
       </p:sp>
@@ -6863,7 +6851,7 @@
     </p:spTree>
     <p:extLst>
       <p:ext uri="{BB962C8B-B14F-4D97-AF65-F5344CB8AC3E}">
-        <p14:creationId xmlns:p14="http://schemas.microsoft.com/office/powerpoint/2010/main" val="3712232617"/>
+        <p14:creationId xmlns:p14="http://schemas.microsoft.com/office/powerpoint/2010/main" val="372831945"/>
       </p:ext>
     </p:extLst>
   </p:cSld>
@@ -6956,7 +6944,7 @@
     </p:spTree>
     <p:extLst>
       <p:ext uri="{BB962C8B-B14F-4D97-AF65-F5344CB8AC3E}">
-        <p14:creationId xmlns:p14="http://schemas.microsoft.com/office/powerpoint/2010/main" val="768886820"/>
+        <p14:creationId xmlns:p14="http://schemas.microsoft.com/office/powerpoint/2010/main" val="324157143"/>
       </p:ext>
     </p:extLst>
   </p:cSld>
@@ -7010,6 +6998,23 @@
           <a:bodyPr/>
           <a:lstStyle/>
           <a:p>
+            <a:pPr marL="0" marR="0" lvl="0" indent="0" algn="l" defTabSz="914354" rtl="0" eaLnBrk="1" fontAlgn="auto" latinLnBrk="0" hangingPunct="1">
+              <a:lnSpc>
+                <a:spcPct val="100000"/>
+              </a:lnSpc>
+              <a:spcBef>
+                <a:spcPts val="0"/>
+              </a:spcBef>
+              <a:spcAft>
+                <a:spcPts val="0"/>
+              </a:spcAft>
+              <a:buClrTx/>
+              <a:buSzTx/>
+              <a:buFontTx/>
+              <a:buNone/>
+              <a:tabLst/>
+              <a:defRPr/>
+            </a:pPr>
             <a:r>
               <a:rPr lang="en-US" sz="1200">
                 <a:solidFill>
@@ -7018,7 +7023,6 @@
               </a:rPr>
               <a:t>© Copyright Showeet.com – Creative &amp; Free PowerPoint Templates</a:t>
             </a:r>
-            <a:endParaRPr lang="en-US"/>
           </a:p>
         </p:txBody>
       </p:sp>
@@ -7049,7 +7053,7 @@
     </p:spTree>
     <p:extLst>
       <p:ext uri="{BB962C8B-B14F-4D97-AF65-F5344CB8AC3E}">
-        <p14:creationId xmlns:p14="http://schemas.microsoft.com/office/powerpoint/2010/main" val="3574797035"/>
+        <p14:creationId xmlns:p14="http://schemas.microsoft.com/office/powerpoint/2010/main" val="3712232617"/>
       </p:ext>
     </p:extLst>
   </p:cSld>
@@ -7142,7 +7146,7 @@
     </p:spTree>
     <p:extLst>
       <p:ext uri="{BB962C8B-B14F-4D97-AF65-F5344CB8AC3E}">
-        <p14:creationId xmlns:p14="http://schemas.microsoft.com/office/powerpoint/2010/main" val="2069290823"/>
+        <p14:creationId xmlns:p14="http://schemas.microsoft.com/office/powerpoint/2010/main" val="768886820"/>
       </p:ext>
     </p:extLst>
   </p:cSld>
@@ -7235,7 +7239,7 @@
     </p:spTree>
     <p:extLst>
       <p:ext uri="{BB962C8B-B14F-4D97-AF65-F5344CB8AC3E}">
-        <p14:creationId xmlns:p14="http://schemas.microsoft.com/office/powerpoint/2010/main" val="3206035147"/>
+        <p14:creationId xmlns:p14="http://schemas.microsoft.com/office/powerpoint/2010/main" val="3574797035"/>
       </p:ext>
     </p:extLst>
   </p:cSld>
@@ -7328,7 +7332,7 @@
     </p:spTree>
     <p:extLst>
       <p:ext uri="{BB962C8B-B14F-4D97-AF65-F5344CB8AC3E}">
-        <p14:creationId xmlns:p14="http://schemas.microsoft.com/office/powerpoint/2010/main" val="3828291125"/>
+        <p14:creationId xmlns:p14="http://schemas.microsoft.com/office/powerpoint/2010/main" val="2069290823"/>
       </p:ext>
     </p:extLst>
   </p:cSld>
@@ -7475,23 +7479,6 @@
           <a:bodyPr/>
           <a:lstStyle/>
           <a:p>
-            <a:pPr marL="0" marR="0" lvl="0" indent="0" algn="l" defTabSz="914400" rtl="0" eaLnBrk="1" fontAlgn="auto" latinLnBrk="0" hangingPunct="1">
-              <a:lnSpc>
-                <a:spcPct val="100000"/>
-              </a:lnSpc>
-              <a:spcBef>
-                <a:spcPts val="0"/>
-              </a:spcBef>
-              <a:spcAft>
-                <a:spcPts val="0"/>
-              </a:spcAft>
-              <a:buClrTx/>
-              <a:buSzTx/>
-              <a:buFontTx/>
-              <a:buNone/>
-              <a:tabLst/>
-              <a:defRPr/>
-            </a:pPr>
             <a:r>
               <a:rPr lang="en-US" sz="1200">
                 <a:solidFill>
@@ -7500,6 +7487,7 @@
               </a:rPr>
               <a:t>© Copyright Showeet.com – Creative &amp; Free PowerPoint Templates</a:t>
             </a:r>
+            <a:endParaRPr lang="en-US"/>
           </a:p>
         </p:txBody>
       </p:sp>
@@ -7518,78 +7506,19 @@
           <a:bodyPr/>
           <a:lstStyle/>
           <a:p>
-            <a:pPr marL="0" marR="0" lvl="0" indent="0" algn="r" defTabSz="914400" rtl="0" eaLnBrk="1" fontAlgn="auto" latinLnBrk="0" hangingPunct="1">
-              <a:lnSpc>
-                <a:spcPct val="100000"/>
-              </a:lnSpc>
-              <a:spcBef>
-                <a:spcPts val="0"/>
-              </a:spcBef>
-              <a:spcAft>
-                <a:spcPts val="0"/>
-              </a:spcAft>
-              <a:buClrTx/>
-              <a:buSzTx/>
-              <a:buFontTx/>
-              <a:buNone/>
-              <a:tabLst/>
-              <a:defRPr/>
-            </a:pPr>
-            <a:fld id="{06BEB3AE-8E34-4534-922B-E380FB565A43}" type="slidenum">
-              <a:rPr kumimoji="0" lang="en-US" sz="1200" b="0" i="0" u="none" strike="noStrike" kern="1200" cap="none" spc="0" normalizeH="0" baseline="0" noProof="0" smtClean="0">
-                <a:ln>
-                  <a:noFill/>
-                </a:ln>
-                <a:solidFill>
-                  <a:prstClr val="black"/>
-                </a:solidFill>
-                <a:effectLst/>
-                <a:uLnTx/>
-                <a:uFillTx/>
-                <a:latin typeface="Calibri" panose="020F0502020204030204"/>
-                <a:ea typeface="+mn-ea"/>
-                <a:cs typeface="+mn-cs"/>
-              </a:rPr>
-              <a:pPr marL="0" marR="0" lvl="0" indent="0" algn="r" defTabSz="914400" rtl="0" eaLnBrk="1" fontAlgn="auto" latinLnBrk="0" hangingPunct="1">
-                <a:lnSpc>
-                  <a:spcPct val="100000"/>
-                </a:lnSpc>
-                <a:spcBef>
-                  <a:spcPts val="0"/>
-                </a:spcBef>
-                <a:spcAft>
-                  <a:spcPts val="0"/>
-                </a:spcAft>
-                <a:buClrTx/>
-                <a:buSzTx/>
-                <a:buFontTx/>
-                <a:buNone/>
-                <a:tabLst/>
-                <a:defRPr/>
-              </a:pPr>
+            <a:fld id="{2CA3AB2B-189A-4C92-A457-C6A3833631A7}" type="slidenum">
+              <a:rPr lang="en-US" smtClean="0"/>
+              <a:pPr/>
               <a:t>20</a:t>
             </a:fld>
-            <a:endParaRPr kumimoji="0" lang="en-US" sz="1200" b="0" i="0" u="none" strike="noStrike" kern="1200" cap="none" spc="0" normalizeH="0" baseline="0" noProof="0">
-              <a:ln>
-                <a:noFill/>
-              </a:ln>
-              <a:solidFill>
-                <a:prstClr val="black"/>
-              </a:solidFill>
-              <a:effectLst/>
-              <a:uLnTx/>
-              <a:uFillTx/>
-              <a:latin typeface="Calibri" panose="020F0502020204030204"/>
-              <a:ea typeface="+mn-ea"/>
-              <a:cs typeface="+mn-cs"/>
-            </a:endParaRPr>
+            <a:endParaRPr lang="en-US"/>
           </a:p>
         </p:txBody>
       </p:sp>
     </p:spTree>
     <p:extLst>
       <p:ext uri="{BB962C8B-B14F-4D97-AF65-F5344CB8AC3E}">
-        <p14:creationId xmlns:p14="http://schemas.microsoft.com/office/powerpoint/2010/main" val="3325128512"/>
+        <p14:creationId xmlns:p14="http://schemas.microsoft.com/office/powerpoint/2010/main" val="3206035147"/>
       </p:ext>
     </p:extLst>
   </p:cSld>
@@ -7643,23 +7572,6 @@
           <a:bodyPr/>
           <a:lstStyle/>
           <a:p>
-            <a:pPr marL="0" marR="0" lvl="0" indent="0" algn="l" defTabSz="914400" rtl="0" eaLnBrk="1" fontAlgn="auto" latinLnBrk="0" hangingPunct="1">
-              <a:lnSpc>
-                <a:spcPct val="100000"/>
-              </a:lnSpc>
-              <a:spcBef>
-                <a:spcPts val="0"/>
-              </a:spcBef>
-              <a:spcAft>
-                <a:spcPts val="0"/>
-              </a:spcAft>
-              <a:buClrTx/>
-              <a:buSzTx/>
-              <a:buFontTx/>
-              <a:buNone/>
-              <a:tabLst/>
-              <a:defRPr/>
-            </a:pPr>
             <a:r>
               <a:rPr lang="en-US" sz="1200">
                 <a:solidFill>
@@ -7668,6 +7580,7 @@
               </a:rPr>
               <a:t>© Copyright Showeet.com – Creative &amp; Free PowerPoint Templates</a:t>
             </a:r>
+            <a:endParaRPr lang="en-US"/>
           </a:p>
         </p:txBody>
       </p:sp>
@@ -7686,78 +7599,19 @@
           <a:bodyPr/>
           <a:lstStyle/>
           <a:p>
-            <a:pPr marL="0" marR="0" lvl="0" indent="0" algn="r" defTabSz="914400" rtl="0" eaLnBrk="1" fontAlgn="auto" latinLnBrk="0" hangingPunct="1">
-              <a:lnSpc>
-                <a:spcPct val="100000"/>
-              </a:lnSpc>
-              <a:spcBef>
-                <a:spcPts val="0"/>
-              </a:spcBef>
-              <a:spcAft>
-                <a:spcPts val="0"/>
-              </a:spcAft>
-              <a:buClrTx/>
-              <a:buSzTx/>
-              <a:buFontTx/>
-              <a:buNone/>
-              <a:tabLst/>
-              <a:defRPr/>
-            </a:pPr>
-            <a:fld id="{06BEB3AE-8E34-4534-922B-E380FB565A43}" type="slidenum">
-              <a:rPr kumimoji="0" lang="en-US" sz="1200" b="0" i="0" u="none" strike="noStrike" kern="1200" cap="none" spc="0" normalizeH="0" baseline="0" noProof="0" smtClean="0">
-                <a:ln>
-                  <a:noFill/>
-                </a:ln>
-                <a:solidFill>
-                  <a:prstClr val="black"/>
-                </a:solidFill>
-                <a:effectLst/>
-                <a:uLnTx/>
-                <a:uFillTx/>
-                <a:latin typeface="Calibri" panose="020F0502020204030204"/>
-                <a:ea typeface="+mn-ea"/>
-                <a:cs typeface="+mn-cs"/>
-              </a:rPr>
-              <a:pPr marL="0" marR="0" lvl="0" indent="0" algn="r" defTabSz="914400" rtl="0" eaLnBrk="1" fontAlgn="auto" latinLnBrk="0" hangingPunct="1">
-                <a:lnSpc>
-                  <a:spcPct val="100000"/>
-                </a:lnSpc>
-                <a:spcBef>
-                  <a:spcPts val="0"/>
-                </a:spcBef>
-                <a:spcAft>
-                  <a:spcPts val="0"/>
-                </a:spcAft>
-                <a:buClrTx/>
-                <a:buSzTx/>
-                <a:buFontTx/>
-                <a:buNone/>
-                <a:tabLst/>
-                <a:defRPr/>
-              </a:pPr>
+            <a:fld id="{2CA3AB2B-189A-4C92-A457-C6A3833631A7}" type="slidenum">
+              <a:rPr lang="en-US" smtClean="0"/>
+              <a:pPr/>
               <a:t>21</a:t>
             </a:fld>
-            <a:endParaRPr kumimoji="0" lang="en-US" sz="1200" b="0" i="0" u="none" strike="noStrike" kern="1200" cap="none" spc="0" normalizeH="0" baseline="0" noProof="0">
-              <a:ln>
-                <a:noFill/>
-              </a:ln>
-              <a:solidFill>
-                <a:prstClr val="black"/>
-              </a:solidFill>
-              <a:effectLst/>
-              <a:uLnTx/>
-              <a:uFillTx/>
-              <a:latin typeface="Calibri" panose="020F0502020204030204"/>
-              <a:ea typeface="+mn-ea"/>
-              <a:cs typeface="+mn-cs"/>
-            </a:endParaRPr>
+            <a:endParaRPr lang="en-US"/>
           </a:p>
         </p:txBody>
       </p:sp>
     </p:spTree>
     <p:extLst>
       <p:ext uri="{BB962C8B-B14F-4D97-AF65-F5344CB8AC3E}">
-        <p14:creationId xmlns:p14="http://schemas.microsoft.com/office/powerpoint/2010/main" val="1862392583"/>
+        <p14:creationId xmlns:p14="http://schemas.microsoft.com/office/powerpoint/2010/main" val="3828291125"/>
       </p:ext>
     </p:extLst>
   </p:cSld>
@@ -7925,7 +7779,7 @@
     </p:spTree>
     <p:extLst>
       <p:ext uri="{BB962C8B-B14F-4D97-AF65-F5344CB8AC3E}">
-        <p14:creationId xmlns:p14="http://schemas.microsoft.com/office/powerpoint/2010/main" val="1457261396"/>
+        <p14:creationId xmlns:p14="http://schemas.microsoft.com/office/powerpoint/2010/main" val="3325128512"/>
       </p:ext>
     </p:extLst>
   </p:cSld>
@@ -8093,6 +7947,342 @@
     </p:spTree>
     <p:extLst>
       <p:ext uri="{BB962C8B-B14F-4D97-AF65-F5344CB8AC3E}">
+        <p14:creationId xmlns:p14="http://schemas.microsoft.com/office/powerpoint/2010/main" val="1862392583"/>
+      </p:ext>
+    </p:extLst>
+  </p:cSld>
+  <p:clrMapOvr>
+    <a:masterClrMapping/>
+  </p:clrMapOvr>
+</p:notes>
+</file>
+
+<file path=ppt/notesSlides/notesSlide24.xml><?xml version="1.0" encoding="utf-8"?>
+<p:notes xmlns:a="http://schemas.openxmlformats.org/drawingml/2006/main" xmlns:r="http://schemas.openxmlformats.org/officeDocument/2006/relationships" xmlns:p="http://schemas.openxmlformats.org/presentationml/2006/main">
+  <p:cSld>
+    <p:spTree>
+      <p:nvGrpSpPr>
+        <p:cNvPr id="1" name=""/>
+        <p:cNvGrpSpPr/>
+        <p:nvPr/>
+      </p:nvGrpSpPr>
+      <p:grpSpPr>
+        <a:xfrm>
+          <a:off x="0" y="0"/>
+          <a:ext cx="0" cy="0"/>
+          <a:chOff x="0" y="0"/>
+          <a:chExt cx="0" cy="0"/>
+        </a:xfrm>
+      </p:grpSpPr>
+      <p:sp>
+        <p:nvSpPr>
+          <p:cNvPr id="2" name="Slide Image Placeholder 1"/>
+          <p:cNvSpPr>
+            <a:spLocks noGrp="1" noRot="1" noChangeAspect="1"/>
+          </p:cNvSpPr>
+          <p:nvPr>
+            <p:ph type="sldImg"/>
+          </p:nvPr>
+        </p:nvSpPr>
+        <p:spPr/>
+      </p:sp>
+      <p:sp>
+        <p:nvSpPr>
+          <p:cNvPr id="3" name="Notes Placeholder 2"/>
+          <p:cNvSpPr>
+            <a:spLocks noGrp="1"/>
+          </p:cNvSpPr>
+          <p:nvPr>
+            <p:ph type="body" idx="1"/>
+          </p:nvPr>
+        </p:nvSpPr>
+        <p:spPr/>
+        <p:txBody>
+          <a:bodyPr/>
+          <a:lstStyle/>
+          <a:p>
+            <a:pPr marL="0" marR="0" lvl="0" indent="0" algn="l" defTabSz="914400" rtl="0" eaLnBrk="1" fontAlgn="auto" latinLnBrk="0" hangingPunct="1">
+              <a:lnSpc>
+                <a:spcPct val="100000"/>
+              </a:lnSpc>
+              <a:spcBef>
+                <a:spcPts val="0"/>
+              </a:spcBef>
+              <a:spcAft>
+                <a:spcPts val="0"/>
+              </a:spcAft>
+              <a:buClrTx/>
+              <a:buSzTx/>
+              <a:buFontTx/>
+              <a:buNone/>
+              <a:tabLst/>
+              <a:defRPr/>
+            </a:pPr>
+            <a:r>
+              <a:rPr lang="en-US" sz="1200">
+                <a:solidFill>
+                  <a:prstClr val="black"/>
+                </a:solidFill>
+              </a:rPr>
+              <a:t>© Copyright Showeet.com – Creative &amp; Free PowerPoint Templates</a:t>
+            </a:r>
+          </a:p>
+        </p:txBody>
+      </p:sp>
+      <p:sp>
+        <p:nvSpPr>
+          <p:cNvPr id="4" name="Slide Number Placeholder 3"/>
+          <p:cNvSpPr>
+            <a:spLocks noGrp="1"/>
+          </p:cNvSpPr>
+          <p:nvPr>
+            <p:ph type="sldNum" sz="quarter" idx="10"/>
+          </p:nvPr>
+        </p:nvSpPr>
+        <p:spPr/>
+        <p:txBody>
+          <a:bodyPr/>
+          <a:lstStyle/>
+          <a:p>
+            <a:pPr marL="0" marR="0" lvl="0" indent="0" algn="r" defTabSz="914400" rtl="0" eaLnBrk="1" fontAlgn="auto" latinLnBrk="0" hangingPunct="1">
+              <a:lnSpc>
+                <a:spcPct val="100000"/>
+              </a:lnSpc>
+              <a:spcBef>
+                <a:spcPts val="0"/>
+              </a:spcBef>
+              <a:spcAft>
+                <a:spcPts val="0"/>
+              </a:spcAft>
+              <a:buClrTx/>
+              <a:buSzTx/>
+              <a:buFontTx/>
+              <a:buNone/>
+              <a:tabLst/>
+              <a:defRPr/>
+            </a:pPr>
+            <a:fld id="{06BEB3AE-8E34-4534-922B-E380FB565A43}" type="slidenum">
+              <a:rPr kumimoji="0" lang="en-US" sz="1200" b="0" i="0" u="none" strike="noStrike" kern="1200" cap="none" spc="0" normalizeH="0" baseline="0" noProof="0" smtClean="0">
+                <a:ln>
+                  <a:noFill/>
+                </a:ln>
+                <a:solidFill>
+                  <a:prstClr val="black"/>
+                </a:solidFill>
+                <a:effectLst/>
+                <a:uLnTx/>
+                <a:uFillTx/>
+                <a:latin typeface="Calibri" panose="020F0502020204030204"/>
+                <a:ea typeface="+mn-ea"/>
+                <a:cs typeface="+mn-cs"/>
+              </a:rPr>
+              <a:pPr marL="0" marR="0" lvl="0" indent="0" algn="r" defTabSz="914400" rtl="0" eaLnBrk="1" fontAlgn="auto" latinLnBrk="0" hangingPunct="1">
+                <a:lnSpc>
+                  <a:spcPct val="100000"/>
+                </a:lnSpc>
+                <a:spcBef>
+                  <a:spcPts val="0"/>
+                </a:spcBef>
+                <a:spcAft>
+                  <a:spcPts val="0"/>
+                </a:spcAft>
+                <a:buClrTx/>
+                <a:buSzTx/>
+                <a:buFontTx/>
+                <a:buNone/>
+                <a:tabLst/>
+                <a:defRPr/>
+              </a:pPr>
+              <a:t>24</a:t>
+            </a:fld>
+            <a:endParaRPr kumimoji="0" lang="en-US" sz="1200" b="0" i="0" u="none" strike="noStrike" kern="1200" cap="none" spc="0" normalizeH="0" baseline="0" noProof="0">
+              <a:ln>
+                <a:noFill/>
+              </a:ln>
+              <a:solidFill>
+                <a:prstClr val="black"/>
+              </a:solidFill>
+              <a:effectLst/>
+              <a:uLnTx/>
+              <a:uFillTx/>
+              <a:latin typeface="Calibri" panose="020F0502020204030204"/>
+              <a:ea typeface="+mn-ea"/>
+              <a:cs typeface="+mn-cs"/>
+            </a:endParaRPr>
+          </a:p>
+        </p:txBody>
+      </p:sp>
+    </p:spTree>
+    <p:extLst>
+      <p:ext uri="{BB962C8B-B14F-4D97-AF65-F5344CB8AC3E}">
+        <p14:creationId xmlns:p14="http://schemas.microsoft.com/office/powerpoint/2010/main" val="1457261396"/>
+      </p:ext>
+    </p:extLst>
+  </p:cSld>
+  <p:clrMapOvr>
+    <a:masterClrMapping/>
+  </p:clrMapOvr>
+</p:notes>
+</file>
+
+<file path=ppt/notesSlides/notesSlide25.xml><?xml version="1.0" encoding="utf-8"?>
+<p:notes xmlns:a="http://schemas.openxmlformats.org/drawingml/2006/main" xmlns:r="http://schemas.openxmlformats.org/officeDocument/2006/relationships" xmlns:p="http://schemas.openxmlformats.org/presentationml/2006/main">
+  <p:cSld>
+    <p:spTree>
+      <p:nvGrpSpPr>
+        <p:cNvPr id="1" name=""/>
+        <p:cNvGrpSpPr/>
+        <p:nvPr/>
+      </p:nvGrpSpPr>
+      <p:grpSpPr>
+        <a:xfrm>
+          <a:off x="0" y="0"/>
+          <a:ext cx="0" cy="0"/>
+          <a:chOff x="0" y="0"/>
+          <a:chExt cx="0" cy="0"/>
+        </a:xfrm>
+      </p:grpSpPr>
+      <p:sp>
+        <p:nvSpPr>
+          <p:cNvPr id="2" name="Slide Image Placeholder 1"/>
+          <p:cNvSpPr>
+            <a:spLocks noGrp="1" noRot="1" noChangeAspect="1"/>
+          </p:cNvSpPr>
+          <p:nvPr>
+            <p:ph type="sldImg"/>
+          </p:nvPr>
+        </p:nvSpPr>
+        <p:spPr/>
+      </p:sp>
+      <p:sp>
+        <p:nvSpPr>
+          <p:cNvPr id="3" name="Notes Placeholder 2"/>
+          <p:cNvSpPr>
+            <a:spLocks noGrp="1"/>
+          </p:cNvSpPr>
+          <p:nvPr>
+            <p:ph type="body" idx="1"/>
+          </p:nvPr>
+        </p:nvSpPr>
+        <p:spPr/>
+        <p:txBody>
+          <a:bodyPr/>
+          <a:lstStyle/>
+          <a:p>
+            <a:pPr marL="0" marR="0" lvl="0" indent="0" algn="l" defTabSz="914400" rtl="0" eaLnBrk="1" fontAlgn="auto" latinLnBrk="0" hangingPunct="1">
+              <a:lnSpc>
+                <a:spcPct val="100000"/>
+              </a:lnSpc>
+              <a:spcBef>
+                <a:spcPts val="0"/>
+              </a:spcBef>
+              <a:spcAft>
+                <a:spcPts val="0"/>
+              </a:spcAft>
+              <a:buClrTx/>
+              <a:buSzTx/>
+              <a:buFontTx/>
+              <a:buNone/>
+              <a:tabLst/>
+              <a:defRPr/>
+            </a:pPr>
+            <a:r>
+              <a:rPr lang="en-US" sz="1200">
+                <a:solidFill>
+                  <a:prstClr val="black"/>
+                </a:solidFill>
+              </a:rPr>
+              <a:t>© Copyright Showeet.com – Creative &amp; Free PowerPoint Templates</a:t>
+            </a:r>
+          </a:p>
+        </p:txBody>
+      </p:sp>
+      <p:sp>
+        <p:nvSpPr>
+          <p:cNvPr id="4" name="Slide Number Placeholder 3"/>
+          <p:cNvSpPr>
+            <a:spLocks noGrp="1"/>
+          </p:cNvSpPr>
+          <p:nvPr>
+            <p:ph type="sldNum" sz="quarter" idx="10"/>
+          </p:nvPr>
+        </p:nvSpPr>
+        <p:spPr/>
+        <p:txBody>
+          <a:bodyPr/>
+          <a:lstStyle/>
+          <a:p>
+            <a:pPr marL="0" marR="0" lvl="0" indent="0" algn="r" defTabSz="914400" rtl="0" eaLnBrk="1" fontAlgn="auto" latinLnBrk="0" hangingPunct="1">
+              <a:lnSpc>
+                <a:spcPct val="100000"/>
+              </a:lnSpc>
+              <a:spcBef>
+                <a:spcPts val="0"/>
+              </a:spcBef>
+              <a:spcAft>
+                <a:spcPts val="0"/>
+              </a:spcAft>
+              <a:buClrTx/>
+              <a:buSzTx/>
+              <a:buFontTx/>
+              <a:buNone/>
+              <a:tabLst/>
+              <a:defRPr/>
+            </a:pPr>
+            <a:fld id="{06BEB3AE-8E34-4534-922B-E380FB565A43}" type="slidenum">
+              <a:rPr kumimoji="0" lang="en-US" sz="1200" b="0" i="0" u="none" strike="noStrike" kern="1200" cap="none" spc="0" normalizeH="0" baseline="0" noProof="0" smtClean="0">
+                <a:ln>
+                  <a:noFill/>
+                </a:ln>
+                <a:solidFill>
+                  <a:prstClr val="black"/>
+                </a:solidFill>
+                <a:effectLst/>
+                <a:uLnTx/>
+                <a:uFillTx/>
+                <a:latin typeface="Calibri" panose="020F0502020204030204"/>
+                <a:ea typeface="+mn-ea"/>
+                <a:cs typeface="+mn-cs"/>
+              </a:rPr>
+              <a:pPr marL="0" marR="0" lvl="0" indent="0" algn="r" defTabSz="914400" rtl="0" eaLnBrk="1" fontAlgn="auto" latinLnBrk="0" hangingPunct="1">
+                <a:lnSpc>
+                  <a:spcPct val="100000"/>
+                </a:lnSpc>
+                <a:spcBef>
+                  <a:spcPts val="0"/>
+                </a:spcBef>
+                <a:spcAft>
+                  <a:spcPts val="0"/>
+                </a:spcAft>
+                <a:buClrTx/>
+                <a:buSzTx/>
+                <a:buFontTx/>
+                <a:buNone/>
+                <a:tabLst/>
+                <a:defRPr/>
+              </a:pPr>
+              <a:t>25</a:t>
+            </a:fld>
+            <a:endParaRPr kumimoji="0" lang="en-US" sz="1200" b="0" i="0" u="none" strike="noStrike" kern="1200" cap="none" spc="0" normalizeH="0" baseline="0" noProof="0">
+              <a:ln>
+                <a:noFill/>
+              </a:ln>
+              <a:solidFill>
+                <a:prstClr val="black"/>
+              </a:solidFill>
+              <a:effectLst/>
+              <a:uLnTx/>
+              <a:uFillTx/>
+              <a:latin typeface="Calibri" panose="020F0502020204030204"/>
+              <a:ea typeface="+mn-ea"/>
+              <a:cs typeface="+mn-cs"/>
+            </a:endParaRPr>
+          </a:p>
+        </p:txBody>
+      </p:sp>
+    </p:spTree>
+    <p:extLst>
+      <p:ext uri="{BB962C8B-B14F-4D97-AF65-F5344CB8AC3E}">
         <p14:creationId xmlns:p14="http://schemas.microsoft.com/office/powerpoint/2010/main" val="2390194218"/>
       </p:ext>
     </p:extLst>
@@ -8103,7 +8293,7 @@
 </p:notes>
 </file>
 
-<file path=ppt/notesSlides/notesSlide24.xml><?xml version="1.0" encoding="utf-8"?>
+<file path=ppt/notesSlides/notesSlide26.xml><?xml version="1.0" encoding="utf-8"?>
 <p:notes xmlns:a="http://schemas.openxmlformats.org/drawingml/2006/main" xmlns:r="http://schemas.openxmlformats.org/officeDocument/2006/relationships" xmlns:p="http://schemas.openxmlformats.org/presentationml/2006/main">
   <p:cSld>
     <p:spTree>
@@ -8177,7 +8367,7 @@
             <a:fld id="{2CA3AB2B-189A-4C92-A457-C6A3833631A7}" type="slidenum">
               <a:rPr lang="en-US" smtClean="0"/>
               <a:pPr/>
-              <a:t>24</a:t>
+              <a:t>26</a:t>
             </a:fld>
             <a:endParaRPr lang="en-US"/>
           </a:p>
@@ -8524,31 +8714,32 @@
                 <a:effectLst/>
                 <a:latin typeface="PT Sans"/>
               </a:rPr>
-              <a:t>Ces boutons se ressemblent, mais ils sont censés effectuer des actions différentes. On peut imagine que le plus simple serait de créer des classes enfant qui hériteraient de la classe </a:t>
+              <a:t>Ces boutons se ressemblent, mais ils sont censés effectuer des actions différentes. On peut imaginer que le plus simple serait de créer des classes enfants qui hériteraient de la classe Bouton. Ces classes enfants vont contenir le code exécuté lors d’un clic sur un bouton.</a:t>
             </a:r>
-            <a:r>
-              <a:rPr lang="fr-FR" b="0" i="0">
-                <a:solidFill>
-                  <a:srgbClr val="444444"/>
-                </a:solidFill>
-                <a:effectLst/>
-                <a:latin typeface="PT Sans"/>
-              </a:rPr>
-              <a:t>Bouton.Ces</a:t>
-            </a:r>
-            <a:r>
-              <a:rPr lang="fr-FR" b="0" i="0" dirty="0">
-                <a:solidFill>
-                  <a:srgbClr val="444444"/>
-                </a:solidFill>
-                <a:effectLst/>
-                <a:latin typeface="PT Sans"/>
-              </a:rPr>
-              <a:t> sous-classes vont contenir le code exécuté lors d’un clic sur un bouton.</a:t>
-            </a:r>
+          </a:p>
+          <a:p>
             <a:endParaRPr lang="fr-FR" dirty="0"/>
           </a:p>
           <a:p>
+            <a:r>
+              <a:rPr lang="fr-FR" dirty="0"/>
+              <a:t>On peut remarquer que cette approche comporte pas mal de défauts! </a:t>
+            </a:r>
+          </a:p>
+          <a:p>
+            <a:r>
+              <a:rPr lang="fr-FR" dirty="0"/>
+              <a:t>D’abord, on crée énormément de classes filles. A chaque modification de la classe Bouton, on augmente les risques de créer des effets de bords non désirés sur les classes qui en héritent. </a:t>
+            </a:r>
+          </a:p>
+          <a:p>
+            <a:endParaRPr lang="fr-FR" dirty="0"/>
+          </a:p>
+          <a:p>
+            <a:r>
+              <a:rPr lang="fr-FR" dirty="0"/>
+              <a:t>Du coup, notre interface graphique devient un peu trop dépendante du code volatile de la logique métier.</a:t>
+            </a:r>
             <a:endParaRPr lang="en-US" dirty="0"/>
           </a:p>
         </p:txBody>
@@ -8635,14 +8826,34 @@
           <a:lstStyle/>
           <a:p>
             <a:r>
-              <a:rPr lang="en-US" sz="1200">
+              <a:rPr lang="fr-FR" sz="1200" dirty="0">
                 <a:solidFill>
                   <a:prstClr val="black"/>
                 </a:solidFill>
               </a:rPr>
-              <a:t>© Copyright Showeet.com – Creative &amp; Free PowerPoint Templates</a:t>
+              <a:t>Second défaut majeur, certaines opérations doivent être appelées depuis différents endroits. Par exemple, pour mettre en gras du texte.</a:t>
             </a:r>
-            <a:endParaRPr lang="en-US"/>
+          </a:p>
+          <a:p>
+            <a:r>
+              <a:rPr lang="fr-FR" sz="1200" dirty="0">
+                <a:solidFill>
+                  <a:prstClr val="black"/>
+                </a:solidFill>
+              </a:rPr>
+              <a:t>Si nous n’avions qu’une barre d’outils, il n’y aurait aucun problème à implémenter les différentes actions dans les classes filles du bouton correspondantes. </a:t>
+            </a:r>
+          </a:p>
+          <a:p>
+            <a:r>
+              <a:rPr lang="fr-FR" sz="1200" dirty="0">
+                <a:solidFill>
+                  <a:prstClr val="black"/>
+                </a:solidFill>
+              </a:rPr>
+              <a:t>Mais ici, on peut voir que pour mettre du texte en gras, on peut utiliser 4 biais différents (au minimum) On devrait donc dupliquer le code de ces actions dans plusieurs classes ou rendre les menus dépendants des boutons, ce qui serait encore pire !</a:t>
+            </a:r>
+            <a:endParaRPr lang="en-US" dirty="0"/>
           </a:p>
         </p:txBody>
       </p:sp>
@@ -8728,14 +8939,9 @@
           <a:lstStyle/>
           <a:p>
             <a:r>
-              <a:rPr lang="en-US" sz="1200">
-                <a:solidFill>
-                  <a:prstClr val="black"/>
-                </a:solidFill>
-              </a:rPr>
-              <a:t>© Copyright Showeet.com – Creative &amp; Free PowerPoint Templates</a:t>
+              <a:rPr lang="fr-FR" noProof="0" dirty="0"/>
+              <a:t>Nous allons donc aborder les solutions plus tard dans la présentation !</a:t>
             </a:r>
-            <a:endParaRPr lang="en-US"/>
           </a:p>
         </p:txBody>
       </p:sp>
@@ -8766,7 +8972,7 @@
     </p:spTree>
     <p:extLst>
       <p:ext uri="{BB962C8B-B14F-4D97-AF65-F5344CB8AC3E}">
-        <p14:creationId xmlns:p14="http://schemas.microsoft.com/office/powerpoint/2010/main" val="590651591"/>
+        <p14:creationId xmlns:p14="http://schemas.microsoft.com/office/powerpoint/2010/main" val="1294863691"/>
       </p:ext>
     </p:extLst>
   </p:cSld>
@@ -8821,14 +9027,17 @@
           <a:lstStyle/>
           <a:p>
             <a:r>
-              <a:rPr lang="en-US" sz="1200">
-                <a:solidFill>
-                  <a:prstClr val="black"/>
-                </a:solidFill>
-              </a:rPr>
-              <a:t>© Copyright Showeet.com – Creative &amp; Free PowerPoint Templates</a:t>
+              <a:rPr lang="fr-FR" dirty="0"/>
+              <a:t>On repart </a:t>
             </a:r>
-            <a:endParaRPr lang="en-US"/>
+            <a:r>
+              <a:rPr lang="fr-FR"/>
+              <a:t>sur Word !</a:t>
+            </a:r>
+            <a:endParaRPr lang="fr-FR" dirty="0"/>
+          </a:p>
+          <a:p>
+            <a:endParaRPr lang="en-US" dirty="0"/>
           </a:p>
         </p:txBody>
       </p:sp>
@@ -8859,7 +9068,7 @@
     </p:spTree>
     <p:extLst>
       <p:ext uri="{BB962C8B-B14F-4D97-AF65-F5344CB8AC3E}">
-        <p14:creationId xmlns:p14="http://schemas.microsoft.com/office/powerpoint/2010/main" val="852387929"/>
+        <p14:creationId xmlns:p14="http://schemas.microsoft.com/office/powerpoint/2010/main" val="1429421734"/>
       </p:ext>
     </p:extLst>
   </p:cSld>
@@ -27285,6 +27494,304 @@
 <file path=ppt/slides/slide10.xml><?xml version="1.0" encoding="utf-8"?>
 <p:sld xmlns:a="http://schemas.openxmlformats.org/drawingml/2006/main" xmlns:r="http://schemas.openxmlformats.org/officeDocument/2006/relationships" xmlns:p="http://schemas.openxmlformats.org/presentationml/2006/main">
   <p:cSld>
+    <p:bg>
+      <p:bgPr>
+        <a:solidFill>
+          <a:srgbClr val="403551"/>
+        </a:solidFill>
+        <a:effectLst/>
+      </p:bgPr>
+    </p:bg>
+    <p:spTree>
+      <p:nvGrpSpPr>
+        <p:cNvPr id="1" name=""/>
+        <p:cNvGrpSpPr/>
+        <p:nvPr/>
+      </p:nvGrpSpPr>
+      <p:grpSpPr>
+        <a:xfrm>
+          <a:off x="0" y="0"/>
+          <a:ext cx="0" cy="0"/>
+          <a:chOff x="0" y="0"/>
+          <a:chExt cx="0" cy="0"/>
+        </a:xfrm>
+      </p:grpSpPr>
+      <p:sp>
+        <p:nvSpPr>
+          <p:cNvPr id="2" name="Title 1"/>
+          <p:cNvSpPr>
+            <a:spLocks noGrp="1"/>
+          </p:cNvSpPr>
+          <p:nvPr>
+            <p:ph type="title"/>
+          </p:nvPr>
+        </p:nvSpPr>
+        <p:spPr/>
+        <p:txBody>
+          <a:bodyPr/>
+          <a:lstStyle/>
+          <a:p>
+            <a:r>
+              <a:rPr lang="fr-FR" dirty="0"/>
+              <a:t>Présentation du </a:t>
+            </a:r>
+            <a:br>
+              <a:rPr lang="fr-FR" dirty="0"/>
+            </a:br>
+            <a:r>
+              <a:rPr lang="fr-FR" dirty="0"/>
+              <a:t>pattern command</a:t>
+            </a:r>
+          </a:p>
+        </p:txBody>
+      </p:sp>
+      <p:sp>
+        <p:nvSpPr>
+          <p:cNvPr id="16" name="Text Placeholder 15"/>
+          <p:cNvSpPr>
+            <a:spLocks noGrp="1"/>
+          </p:cNvSpPr>
+          <p:nvPr>
+            <p:ph type="body" idx="1"/>
+          </p:nvPr>
+        </p:nvSpPr>
+        <p:spPr/>
+        <p:txBody>
+          <a:bodyPr>
+            <a:noAutofit/>
+          </a:bodyPr>
+          <a:lstStyle/>
+          <a:p>
+            <a:r>
+              <a:rPr lang="fr-FR" dirty="0"/>
+              <a:t>« Cuisine, une sauvegarde pour la 4 s’il vous plait ! »</a:t>
+            </a:r>
+          </a:p>
+        </p:txBody>
+      </p:sp>
+      <p:sp>
+        <p:nvSpPr>
+          <p:cNvPr id="38" name="Date Placeholder 37">
+            <a:extLst>
+              <a:ext uri="{FF2B5EF4-FFF2-40B4-BE49-F238E27FC236}">
+                <a16:creationId xmlns:a16="http://schemas.microsoft.com/office/drawing/2014/main" id="{214893A6-5453-4772-A5C3-6E8247B9F7F7}"/>
+              </a:ext>
+            </a:extLst>
+          </p:cNvPr>
+          <p:cNvSpPr>
+            <a:spLocks noGrp="1"/>
+          </p:cNvSpPr>
+          <p:nvPr>
+            <p:ph type="dt" sz="half" idx="10"/>
+          </p:nvPr>
+        </p:nvSpPr>
+        <p:spPr/>
+        <p:txBody>
+          <a:bodyPr/>
+          <a:lstStyle/>
+          <a:p>
+            <a:r>
+              <a:rPr lang="fr-FR"/>
+              <a:t>04 février 2021</a:t>
+            </a:r>
+            <a:endParaRPr lang="en-US"/>
+          </a:p>
+        </p:txBody>
+      </p:sp>
+      <p:sp>
+        <p:nvSpPr>
+          <p:cNvPr id="39" name="Footer Placeholder 38">
+            <a:extLst>
+              <a:ext uri="{FF2B5EF4-FFF2-40B4-BE49-F238E27FC236}">
+                <a16:creationId xmlns:a16="http://schemas.microsoft.com/office/drawing/2014/main" id="{19A88EA5-E6FB-4BFB-9421-CB6C4447B890}"/>
+              </a:ext>
+            </a:extLst>
+          </p:cNvPr>
+          <p:cNvSpPr>
+            <a:spLocks noGrp="1"/>
+          </p:cNvSpPr>
+          <p:nvPr>
+            <p:ph type="ftr" sz="quarter" idx="11"/>
+          </p:nvPr>
+        </p:nvSpPr>
+        <p:spPr/>
+        <p:txBody>
+          <a:bodyPr/>
+          <a:lstStyle/>
+          <a:p>
+            <a:r>
+              <a:rPr lang="fr-FR"/>
+              <a:t>Command &amp; Memento - Aurélien BOUDIER</a:t>
+            </a:r>
+            <a:endParaRPr lang="en-US"/>
+          </a:p>
+        </p:txBody>
+      </p:sp>
+    </p:spTree>
+    <p:extLst>
+      <p:ext uri="{BB962C8B-B14F-4D97-AF65-F5344CB8AC3E}">
+        <p14:creationId xmlns:p14="http://schemas.microsoft.com/office/powerpoint/2010/main" val="2194463738"/>
+      </p:ext>
+    </p:extLst>
+  </p:cSld>
+  <p:clrMapOvr>
+    <a:masterClrMapping/>
+  </p:clrMapOvr>
+</p:sld>
+</file>
+
+<file path=ppt/slides/slide11.xml><?xml version="1.0" encoding="utf-8"?>
+<p:sld xmlns:a="http://schemas.openxmlformats.org/drawingml/2006/main" xmlns:r="http://schemas.openxmlformats.org/officeDocument/2006/relationships" xmlns:p="http://schemas.openxmlformats.org/presentationml/2006/main">
+  <p:cSld>
+    <p:spTree>
+      <p:nvGrpSpPr>
+        <p:cNvPr id="1" name=""/>
+        <p:cNvGrpSpPr/>
+        <p:nvPr/>
+      </p:nvGrpSpPr>
+      <p:grpSpPr>
+        <a:xfrm>
+          <a:off x="0" y="0"/>
+          <a:ext cx="0" cy="0"/>
+          <a:chOff x="0" y="0"/>
+          <a:chExt cx="0" cy="0"/>
+        </a:xfrm>
+      </p:grpSpPr>
+      <p:sp>
+        <p:nvSpPr>
+          <p:cNvPr id="2" name="Title 1"/>
+          <p:cNvSpPr>
+            <a:spLocks noGrp="1"/>
+          </p:cNvSpPr>
+          <p:nvPr>
+            <p:ph type="title"/>
+          </p:nvPr>
+        </p:nvSpPr>
+        <p:spPr/>
+        <p:txBody>
+          <a:bodyPr/>
+          <a:lstStyle/>
+          <a:p>
+            <a:r>
+              <a:rPr lang="fr-FR" dirty="0"/>
+              <a:t>Présentation du </a:t>
+            </a:r>
+            <a:br>
+              <a:rPr lang="fr-FR" dirty="0"/>
+            </a:br>
+            <a:r>
+              <a:rPr lang="fr-FR" dirty="0"/>
+              <a:t>pattern memento</a:t>
+            </a:r>
+          </a:p>
+        </p:txBody>
+      </p:sp>
+      <p:sp>
+        <p:nvSpPr>
+          <p:cNvPr id="16" name="Text Placeholder 15"/>
+          <p:cNvSpPr>
+            <a:spLocks noGrp="1"/>
+          </p:cNvSpPr>
+          <p:nvPr>
+            <p:ph type="body" idx="1"/>
+          </p:nvPr>
+        </p:nvSpPr>
+        <p:spPr/>
+        <p:txBody>
+          <a:bodyPr>
+            <a:noAutofit/>
+          </a:bodyPr>
+          <a:lstStyle/>
+          <a:p>
+            <a:r>
+              <a:rPr lang="fr-FR" dirty="0"/>
+              <a:t>La mémoire est mère de la sagesse !</a:t>
+            </a:r>
+          </a:p>
+        </p:txBody>
+      </p:sp>
+      <p:sp>
+        <p:nvSpPr>
+          <p:cNvPr id="38" name="Date Placeholder 37">
+            <a:extLst>
+              <a:ext uri="{FF2B5EF4-FFF2-40B4-BE49-F238E27FC236}">
+                <a16:creationId xmlns:a16="http://schemas.microsoft.com/office/drawing/2014/main" id="{214893A6-5453-4772-A5C3-6E8247B9F7F7}"/>
+              </a:ext>
+            </a:extLst>
+          </p:cNvPr>
+          <p:cNvSpPr>
+            <a:spLocks noGrp="1"/>
+          </p:cNvSpPr>
+          <p:nvPr>
+            <p:ph type="dt" sz="half" idx="10"/>
+          </p:nvPr>
+        </p:nvSpPr>
+        <p:spPr/>
+        <p:txBody>
+          <a:bodyPr/>
+          <a:lstStyle/>
+          <a:p>
+            <a:r>
+              <a:rPr lang="fr-FR"/>
+              <a:t>04 février 2021</a:t>
+            </a:r>
+            <a:endParaRPr lang="en-US"/>
+          </a:p>
+        </p:txBody>
+      </p:sp>
+      <p:sp>
+        <p:nvSpPr>
+          <p:cNvPr id="39" name="Footer Placeholder 38">
+            <a:extLst>
+              <a:ext uri="{FF2B5EF4-FFF2-40B4-BE49-F238E27FC236}">
+                <a16:creationId xmlns:a16="http://schemas.microsoft.com/office/drawing/2014/main" id="{19A88EA5-E6FB-4BFB-9421-CB6C4447B890}"/>
+              </a:ext>
+            </a:extLst>
+          </p:cNvPr>
+          <p:cNvSpPr>
+            <a:spLocks noGrp="1"/>
+          </p:cNvSpPr>
+          <p:nvPr>
+            <p:ph type="ftr" sz="quarter" idx="11"/>
+          </p:nvPr>
+        </p:nvSpPr>
+        <p:spPr/>
+        <p:txBody>
+          <a:bodyPr/>
+          <a:lstStyle/>
+          <a:p>
+            <a:r>
+              <a:rPr lang="fr-FR"/>
+              <a:t>Command &amp; Memento - Aurélien BOUDIER</a:t>
+            </a:r>
+            <a:endParaRPr lang="en-US"/>
+          </a:p>
+        </p:txBody>
+      </p:sp>
+    </p:spTree>
+    <p:extLst>
+      <p:ext uri="{BB962C8B-B14F-4D97-AF65-F5344CB8AC3E}">
+        <p14:creationId xmlns:p14="http://schemas.microsoft.com/office/powerpoint/2010/main" val="3399286523"/>
+      </p:ext>
+    </p:extLst>
+  </p:cSld>
+  <p:clrMapOvr>
+    <a:masterClrMapping/>
+  </p:clrMapOvr>
+</p:sld>
+</file>
+
+<file path=ppt/slides/slide12.xml><?xml version="1.0" encoding="utf-8"?>
+<p:sld xmlns:a="http://schemas.openxmlformats.org/drawingml/2006/main" xmlns:r="http://schemas.openxmlformats.org/officeDocument/2006/relationships" xmlns:p="http://schemas.openxmlformats.org/presentationml/2006/main">
+  <p:cSld>
+    <p:bg>
+      <p:bgPr>
+        <a:solidFill>
+          <a:srgbClr val="403551"/>
+        </a:solidFill>
+        <a:effectLst/>
+      </p:bgPr>
+    </p:bg>
     <p:spTree>
       <p:nvGrpSpPr>
         <p:cNvPr id="1" name=""/>
@@ -27423,7 +27930,7 @@
 </p:sld>
 </file>
 
-<file path=ppt/slides/slide11.xml><?xml version="1.0" encoding="utf-8"?>
+<file path=ppt/slides/slide13.xml><?xml version="1.0" encoding="utf-8"?>
 <p:sld xmlns:a="http://schemas.openxmlformats.org/drawingml/2006/main" xmlns:r="http://schemas.openxmlformats.org/officeDocument/2006/relationships" xmlns:p="http://schemas.openxmlformats.org/presentationml/2006/main">
   <p:cSld>
     <p:spTree>
@@ -27533,7 +28040,7 @@
 </p:sld>
 </file>
 
-<file path=ppt/slides/slide12.xml><?xml version="1.0" encoding="utf-8"?>
+<file path=ppt/slides/slide14.xml><?xml version="1.0" encoding="utf-8"?>
 <p:sld xmlns:a="http://schemas.openxmlformats.org/drawingml/2006/main" xmlns:r="http://schemas.openxmlformats.org/officeDocument/2006/relationships" xmlns:p="http://schemas.openxmlformats.org/presentationml/2006/main">
   <p:cSld>
     <p:spTree>
@@ -27675,7 +28182,7 @@
 </p:sld>
 </file>
 
-<file path=ppt/slides/slide13.xml><?xml version="1.0" encoding="utf-8"?>
+<file path=ppt/slides/slide15.xml><?xml version="1.0" encoding="utf-8"?>
 <p:sld xmlns:a="http://schemas.openxmlformats.org/drawingml/2006/main" xmlns:r="http://schemas.openxmlformats.org/officeDocument/2006/relationships" xmlns:p="http://schemas.openxmlformats.org/presentationml/2006/main">
   <p:cSld>
     <p:spTree>
@@ -27921,7 +28428,7 @@
 </p:sld>
 </file>
 
-<file path=ppt/slides/slide14.xml><?xml version="1.0" encoding="utf-8"?>
+<file path=ppt/slides/slide16.xml><?xml version="1.0" encoding="utf-8"?>
 <p:sld xmlns:a="http://schemas.openxmlformats.org/drawingml/2006/main" xmlns:r="http://schemas.openxmlformats.org/officeDocument/2006/relationships" xmlns:p="http://schemas.openxmlformats.org/presentationml/2006/main">
   <p:cSld>
     <p:spTree>
@@ -28158,7 +28665,7 @@
 </p:sld>
 </file>
 
-<file path=ppt/slides/slide15.xml><?xml version="1.0" encoding="utf-8"?>
+<file path=ppt/slides/slide17.xml><?xml version="1.0" encoding="utf-8"?>
 <p:sld xmlns:a="http://schemas.openxmlformats.org/drawingml/2006/main" xmlns:r="http://schemas.openxmlformats.org/officeDocument/2006/relationships" xmlns:p="http://schemas.openxmlformats.org/presentationml/2006/main">
   <p:cSld>
     <p:spTree>
@@ -28371,7 +28878,7 @@
 </p:sld>
 </file>
 
-<file path=ppt/slides/slide16.xml><?xml version="1.0" encoding="utf-8"?>
+<file path=ppt/slides/slide18.xml><?xml version="1.0" encoding="utf-8"?>
 <p:sld xmlns:a="http://schemas.openxmlformats.org/drawingml/2006/main" xmlns:r="http://schemas.openxmlformats.org/officeDocument/2006/relationships" xmlns:p="http://schemas.openxmlformats.org/presentationml/2006/main">
   <p:cSld>
     <p:spTree>
@@ -28533,7 +29040,7 @@
 </p:sld>
 </file>
 
-<file path=ppt/slides/slide17.xml><?xml version="1.0" encoding="utf-8"?>
+<file path=ppt/slides/slide19.xml><?xml version="1.0" encoding="utf-8"?>
 <p:sld xmlns:a="http://schemas.openxmlformats.org/drawingml/2006/main" xmlns:r="http://schemas.openxmlformats.org/officeDocument/2006/relationships" xmlns:p="http://schemas.openxmlformats.org/presentationml/2006/main">
   <p:cSld>
     <p:spTree>
@@ -28677,7 +29184,141 @@
 </p:sld>
 </file>
 
-<file path=ppt/slides/slide18.xml><?xml version="1.0" encoding="utf-8"?>
+<file path=ppt/slides/slide2.xml><?xml version="1.0" encoding="utf-8"?>
+<p:sld xmlns:a="http://schemas.openxmlformats.org/drawingml/2006/main" xmlns:r="http://schemas.openxmlformats.org/officeDocument/2006/relationships" xmlns:p="http://schemas.openxmlformats.org/presentationml/2006/main">
+  <p:cSld>
+    <p:spTree>
+      <p:nvGrpSpPr>
+        <p:cNvPr id="1" name=""/>
+        <p:cNvGrpSpPr/>
+        <p:nvPr/>
+      </p:nvGrpSpPr>
+      <p:grpSpPr>
+        <a:xfrm>
+          <a:off x="0" y="0"/>
+          <a:ext cx="0" cy="0"/>
+          <a:chOff x="0" y="0"/>
+          <a:chExt cx="0" cy="0"/>
+        </a:xfrm>
+      </p:grpSpPr>
+      <p:sp>
+        <p:nvSpPr>
+          <p:cNvPr id="2" name="Title 1"/>
+          <p:cNvSpPr>
+            <a:spLocks noGrp="1"/>
+          </p:cNvSpPr>
+          <p:nvPr>
+            <p:ph type="title"/>
+          </p:nvPr>
+        </p:nvSpPr>
+        <p:spPr/>
+        <p:txBody>
+          <a:bodyPr/>
+          <a:lstStyle/>
+          <a:p>
+            <a:r>
+              <a:rPr lang="en-US" dirty="0"/>
+              <a:t>Welcome !</a:t>
+            </a:r>
+          </a:p>
+        </p:txBody>
+      </p:sp>
+      <p:sp>
+        <p:nvSpPr>
+          <p:cNvPr id="16" name="Text Placeholder 15"/>
+          <p:cNvSpPr>
+            <a:spLocks noGrp="1"/>
+          </p:cNvSpPr>
+          <p:nvPr>
+            <p:ph type="body" idx="1"/>
+          </p:nvPr>
+        </p:nvSpPr>
+        <p:spPr/>
+        <p:txBody>
+          <a:bodyPr>
+            <a:noAutofit/>
+          </a:bodyPr>
+          <a:lstStyle/>
+          <a:p>
+            <a:r>
+              <a:rPr lang="fr-FR" dirty="0"/>
+              <a:t>Merci pour votre présence</a:t>
+            </a:r>
+          </a:p>
+        </p:txBody>
+      </p:sp>
+      <p:sp>
+        <p:nvSpPr>
+          <p:cNvPr id="38" name="Date Placeholder 37">
+            <a:extLst>
+              <a:ext uri="{FF2B5EF4-FFF2-40B4-BE49-F238E27FC236}">
+                <a16:creationId xmlns:a16="http://schemas.microsoft.com/office/drawing/2014/main" id="{214893A6-5453-4772-A5C3-6E8247B9F7F7}"/>
+              </a:ext>
+            </a:extLst>
+          </p:cNvPr>
+          <p:cNvSpPr>
+            <a:spLocks noGrp="1"/>
+          </p:cNvSpPr>
+          <p:nvPr>
+            <p:ph type="dt" sz="half" idx="10"/>
+          </p:nvPr>
+        </p:nvSpPr>
+        <p:spPr/>
+        <p:txBody>
+          <a:bodyPr/>
+          <a:lstStyle/>
+          <a:p>
+            <a:r>
+              <a:rPr lang="fr-FR"/>
+              <a:t>04 février 2021</a:t>
+            </a:r>
+            <a:endParaRPr lang="en-US"/>
+          </a:p>
+        </p:txBody>
+      </p:sp>
+      <p:sp>
+        <p:nvSpPr>
+          <p:cNvPr id="39" name="Footer Placeholder 38">
+            <a:extLst>
+              <a:ext uri="{FF2B5EF4-FFF2-40B4-BE49-F238E27FC236}">
+                <a16:creationId xmlns:a16="http://schemas.microsoft.com/office/drawing/2014/main" id="{19A88EA5-E6FB-4BFB-9421-CB6C4447B890}"/>
+              </a:ext>
+            </a:extLst>
+          </p:cNvPr>
+          <p:cNvSpPr>
+            <a:spLocks noGrp="1"/>
+          </p:cNvSpPr>
+          <p:nvPr>
+            <p:ph type="ftr" sz="quarter" idx="11"/>
+          </p:nvPr>
+        </p:nvSpPr>
+        <p:spPr/>
+        <p:txBody>
+          <a:bodyPr/>
+          <a:lstStyle/>
+          <a:p>
+            <a:r>
+              <a:rPr lang="fr-FR"/>
+              <a:t>Command &amp; Memento - Aurélien BOUDIER</a:t>
+            </a:r>
+            <a:endParaRPr lang="en-US"/>
+          </a:p>
+        </p:txBody>
+      </p:sp>
+    </p:spTree>
+    <p:extLst>
+      <p:ext uri="{BB962C8B-B14F-4D97-AF65-F5344CB8AC3E}">
+        <p14:creationId xmlns:p14="http://schemas.microsoft.com/office/powerpoint/2010/main" val="289086864"/>
+      </p:ext>
+    </p:extLst>
+  </p:cSld>
+  <p:clrMapOvr>
+    <a:masterClrMapping/>
+  </p:clrMapOvr>
+</p:sld>
+</file>
+
+<file path=ppt/slides/slide20.xml><?xml version="1.0" encoding="utf-8"?>
 <p:sld xmlns:a="http://schemas.openxmlformats.org/drawingml/2006/main" xmlns:r="http://schemas.openxmlformats.org/officeDocument/2006/relationships" xmlns:p="http://schemas.openxmlformats.org/presentationml/2006/main">
   <p:cSld>
     <p:spTree>
@@ -28831,7 +29472,7 @@
 </p:sld>
 </file>
 
-<file path=ppt/slides/slide19.xml><?xml version="1.0" encoding="utf-8"?>
+<file path=ppt/slides/slide21.xml><?xml version="1.0" encoding="utf-8"?>
 <p:sld xmlns:a="http://schemas.openxmlformats.org/drawingml/2006/main" xmlns:r="http://schemas.openxmlformats.org/officeDocument/2006/relationships" xmlns:p="http://schemas.openxmlformats.org/presentationml/2006/main">
   <p:cSld>
     <p:spTree>
@@ -31805,141 +32446,7 @@
 </p:sld>
 </file>
 
-<file path=ppt/slides/slide2.xml><?xml version="1.0" encoding="utf-8"?>
-<p:sld xmlns:a="http://schemas.openxmlformats.org/drawingml/2006/main" xmlns:r="http://schemas.openxmlformats.org/officeDocument/2006/relationships" xmlns:p="http://schemas.openxmlformats.org/presentationml/2006/main">
-  <p:cSld>
-    <p:spTree>
-      <p:nvGrpSpPr>
-        <p:cNvPr id="1" name=""/>
-        <p:cNvGrpSpPr/>
-        <p:nvPr/>
-      </p:nvGrpSpPr>
-      <p:grpSpPr>
-        <a:xfrm>
-          <a:off x="0" y="0"/>
-          <a:ext cx="0" cy="0"/>
-          <a:chOff x="0" y="0"/>
-          <a:chExt cx="0" cy="0"/>
-        </a:xfrm>
-      </p:grpSpPr>
-      <p:sp>
-        <p:nvSpPr>
-          <p:cNvPr id="2" name="Title 1"/>
-          <p:cNvSpPr>
-            <a:spLocks noGrp="1"/>
-          </p:cNvSpPr>
-          <p:nvPr>
-            <p:ph type="title"/>
-          </p:nvPr>
-        </p:nvSpPr>
-        <p:spPr/>
-        <p:txBody>
-          <a:bodyPr/>
-          <a:lstStyle/>
-          <a:p>
-            <a:r>
-              <a:rPr lang="en-US" dirty="0"/>
-              <a:t>Welcome !</a:t>
-            </a:r>
-          </a:p>
-        </p:txBody>
-      </p:sp>
-      <p:sp>
-        <p:nvSpPr>
-          <p:cNvPr id="16" name="Text Placeholder 15"/>
-          <p:cNvSpPr>
-            <a:spLocks noGrp="1"/>
-          </p:cNvSpPr>
-          <p:nvPr>
-            <p:ph type="body" idx="1"/>
-          </p:nvPr>
-        </p:nvSpPr>
-        <p:spPr/>
-        <p:txBody>
-          <a:bodyPr>
-            <a:noAutofit/>
-          </a:bodyPr>
-          <a:lstStyle/>
-          <a:p>
-            <a:r>
-              <a:rPr lang="fr-FR" dirty="0"/>
-              <a:t>Merci pour votre présence</a:t>
-            </a:r>
-          </a:p>
-        </p:txBody>
-      </p:sp>
-      <p:sp>
-        <p:nvSpPr>
-          <p:cNvPr id="38" name="Date Placeholder 37">
-            <a:extLst>
-              <a:ext uri="{FF2B5EF4-FFF2-40B4-BE49-F238E27FC236}">
-                <a16:creationId xmlns:a16="http://schemas.microsoft.com/office/drawing/2014/main" id="{214893A6-5453-4772-A5C3-6E8247B9F7F7}"/>
-              </a:ext>
-            </a:extLst>
-          </p:cNvPr>
-          <p:cNvSpPr>
-            <a:spLocks noGrp="1"/>
-          </p:cNvSpPr>
-          <p:nvPr>
-            <p:ph type="dt" sz="half" idx="10"/>
-          </p:nvPr>
-        </p:nvSpPr>
-        <p:spPr/>
-        <p:txBody>
-          <a:bodyPr/>
-          <a:lstStyle/>
-          <a:p>
-            <a:r>
-              <a:rPr lang="fr-FR"/>
-              <a:t>04 février 2021</a:t>
-            </a:r>
-            <a:endParaRPr lang="en-US"/>
-          </a:p>
-        </p:txBody>
-      </p:sp>
-      <p:sp>
-        <p:nvSpPr>
-          <p:cNvPr id="39" name="Footer Placeholder 38">
-            <a:extLst>
-              <a:ext uri="{FF2B5EF4-FFF2-40B4-BE49-F238E27FC236}">
-                <a16:creationId xmlns:a16="http://schemas.microsoft.com/office/drawing/2014/main" id="{19A88EA5-E6FB-4BFB-9421-CB6C4447B890}"/>
-              </a:ext>
-            </a:extLst>
-          </p:cNvPr>
-          <p:cNvSpPr>
-            <a:spLocks noGrp="1"/>
-          </p:cNvSpPr>
-          <p:nvPr>
-            <p:ph type="ftr" sz="quarter" idx="11"/>
-          </p:nvPr>
-        </p:nvSpPr>
-        <p:spPr/>
-        <p:txBody>
-          <a:bodyPr/>
-          <a:lstStyle/>
-          <a:p>
-            <a:r>
-              <a:rPr lang="fr-FR"/>
-              <a:t>Command &amp; Memento - Aurélien BOUDIER</a:t>
-            </a:r>
-            <a:endParaRPr lang="en-US"/>
-          </a:p>
-        </p:txBody>
-      </p:sp>
-    </p:spTree>
-    <p:extLst>
-      <p:ext uri="{BB962C8B-B14F-4D97-AF65-F5344CB8AC3E}">
-        <p14:creationId xmlns:p14="http://schemas.microsoft.com/office/powerpoint/2010/main" val="289086864"/>
-      </p:ext>
-    </p:extLst>
-  </p:cSld>
-  <p:clrMapOvr>
-    <a:masterClrMapping/>
-  </p:clrMapOvr>
-</p:sld>
-</file>
-
-<file path=ppt/slides/slide20.xml><?xml version="1.0" encoding="utf-8"?>
+<file path=ppt/slides/slide22.xml><?xml version="1.0" encoding="utf-8"?>
 <p:sld xmlns:a="http://schemas.openxmlformats.org/drawingml/2006/main" xmlns:r="http://schemas.openxmlformats.org/officeDocument/2006/relationships" xmlns:p="http://schemas.openxmlformats.org/presentationml/2006/main">
   <p:cSld>
     <p:spTree>
@@ -32114,7 +32621,7 @@
 </p:sld>
 </file>
 
-<file path=ppt/slides/slide21.xml><?xml version="1.0" encoding="utf-8"?>
+<file path=ppt/slides/slide23.xml><?xml version="1.0" encoding="utf-8"?>
 <p:sld xmlns:a="http://schemas.openxmlformats.org/drawingml/2006/main" xmlns:r="http://schemas.openxmlformats.org/officeDocument/2006/relationships" xmlns:p="http://schemas.openxmlformats.org/presentationml/2006/main">
   <p:cSld>
     <p:spTree>
@@ -32365,7 +32872,7 @@
 </p:sld>
 </file>
 
-<file path=ppt/slides/slide22.xml><?xml version="1.0" encoding="utf-8"?>
+<file path=ppt/slides/slide24.xml><?xml version="1.0" encoding="utf-8"?>
 <p:sld xmlns:a="http://schemas.openxmlformats.org/drawingml/2006/main" xmlns:r="http://schemas.openxmlformats.org/officeDocument/2006/relationships" xmlns:p="http://schemas.openxmlformats.org/presentationml/2006/main">
   <p:cSld>
     <p:spTree>
@@ -33490,7 +33997,7 @@
 </p:sld>
 </file>
 
-<file path=ppt/slides/slide23.xml><?xml version="1.0" encoding="utf-8"?>
+<file path=ppt/slides/slide25.xml><?xml version="1.0" encoding="utf-8"?>
 <p:sld xmlns:a="http://schemas.openxmlformats.org/drawingml/2006/main" xmlns:r="http://schemas.openxmlformats.org/officeDocument/2006/relationships" xmlns:p="http://schemas.openxmlformats.org/presentationml/2006/main">
   <p:cSld>
     <p:spTree>
@@ -38610,7 +39117,7 @@
 </p:sld>
 </file>
 
-<file path=ppt/slides/slide24.xml><?xml version="1.0" encoding="utf-8"?>
+<file path=ppt/slides/slide26.xml><?xml version="1.0" encoding="utf-8"?>
 <p:sld xmlns:a="http://schemas.openxmlformats.org/drawingml/2006/main" xmlns:r="http://schemas.openxmlformats.org/officeDocument/2006/relationships" xmlns:p="http://schemas.openxmlformats.org/presentationml/2006/main">
   <p:cSld>
     <p:spTree>
@@ -45100,7 +45607,7 @@
         </p:nvSpPr>
         <p:spPr>
           <a:xfrm>
-            <a:off x="3359696" y="5713275"/>
+            <a:off x="4038600" y="6325181"/>
             <a:ext cx="4114800" cy="365125"/>
           </a:xfrm>
         </p:spPr>
@@ -45109,10 +45616,10 @@
           <a:lstStyle/>
           <a:p>
             <a:r>
-              <a:rPr lang="fr-FR"/>
+              <a:rPr lang="fr-FR" dirty="0"/>
               <a:t>Command &amp; Memento - Aurélien BOUDIER</a:t>
             </a:r>
-            <a:endParaRPr lang="en-US"/>
+            <a:endParaRPr lang="en-US" dirty="0"/>
           </a:p>
         </p:txBody>
       </p:sp>
@@ -45207,6 +45714,14 @@
 <file path=ppt/slides/slide7.xml><?xml version="1.0" encoding="utf-8"?>
 <p:sld xmlns:a="http://schemas.openxmlformats.org/drawingml/2006/main" xmlns:r="http://schemas.openxmlformats.org/officeDocument/2006/relationships" xmlns:p="http://schemas.openxmlformats.org/presentationml/2006/main">
   <p:cSld>
+    <p:bg>
+      <p:bgPr>
+        <a:solidFill>
+          <a:srgbClr val="403551"/>
+        </a:solidFill>
+        <a:effectLst/>
+      </p:bgPr>
+    </p:bg>
     <p:spTree>
       <p:nvGrpSpPr>
         <p:cNvPr id="1" name=""/>
@@ -45289,7 +45804,7 @@
           <a:lstStyle/>
           <a:p>
             <a:r>
-              <a:rPr lang="en-US"/>
+              <a:rPr lang="en-US" dirty="0"/>
               <a:t>01</a:t>
             </a:r>
           </a:p>
@@ -45316,7 +45831,7 @@
         </p:blipFill>
         <p:spPr>
           <a:xfrm>
-            <a:off x="5735960" y="491297"/>
+            <a:off x="5705328" y="436329"/>
             <a:ext cx="5976664" cy="5621003"/>
           </a:xfrm>
           <a:prstGeom prst="rect">
@@ -45354,6 +45869,466 @@
           </a:prstGeom>
         </p:spPr>
       </p:pic>
+      <p:sp>
+        <p:nvSpPr>
+          <p:cNvPr id="2" name="Rectangle : coins arrondis 1">
+            <a:extLst>
+              <a:ext uri="{FF2B5EF4-FFF2-40B4-BE49-F238E27FC236}">
+                <a16:creationId xmlns:a16="http://schemas.microsoft.com/office/drawing/2014/main" id="{B72CC936-1148-413C-B59C-BDF4C7015559}"/>
+              </a:ext>
+            </a:extLst>
+          </p:cNvPr>
+          <p:cNvSpPr/>
+          <p:nvPr/>
+        </p:nvSpPr>
+        <p:spPr>
+          <a:xfrm>
+            <a:off x="5735960" y="1052736"/>
+            <a:ext cx="1512168" cy="673928"/>
+          </a:xfrm>
+          <a:prstGeom prst="roundRect">
+            <a:avLst/>
+          </a:prstGeom>
+          <a:noFill/>
+          <a:ln w="38100">
+            <a:solidFill>
+              <a:srgbClr val="FF0000"/>
+            </a:solidFill>
+          </a:ln>
+        </p:spPr>
+        <p:style>
+          <a:lnRef idx="2">
+            <a:schemeClr val="accent1">
+              <a:shade val="50000"/>
+            </a:schemeClr>
+          </a:lnRef>
+          <a:fillRef idx="1">
+            <a:schemeClr val="accent1"/>
+          </a:fillRef>
+          <a:effectRef idx="0">
+            <a:schemeClr val="accent1"/>
+          </a:effectRef>
+          <a:fontRef idx="minor">
+            <a:schemeClr val="lt1"/>
+          </a:fontRef>
+        </p:style>
+        <p:txBody>
+          <a:bodyPr rtlCol="0" anchor="ctr"/>
+          <a:lstStyle/>
+          <a:p>
+            <a:pPr algn="ctr"/>
+            <a:endParaRPr lang="fr-FR" dirty="0"/>
+          </a:p>
+        </p:txBody>
+      </p:sp>
+      <p:sp>
+        <p:nvSpPr>
+          <p:cNvPr id="8" name="Rectangle : coins arrondis 7">
+            <a:extLst>
+              <a:ext uri="{FF2B5EF4-FFF2-40B4-BE49-F238E27FC236}">
+                <a16:creationId xmlns:a16="http://schemas.microsoft.com/office/drawing/2014/main" id="{0785B333-0DF0-4D90-8569-4017CEE0F11C}"/>
+              </a:ext>
+            </a:extLst>
+          </p:cNvPr>
+          <p:cNvSpPr/>
+          <p:nvPr/>
+        </p:nvSpPr>
+        <p:spPr>
+          <a:xfrm>
+            <a:off x="772202" y="2420888"/>
+            <a:ext cx="3739622" cy="1296144"/>
+          </a:xfrm>
+          <a:prstGeom prst="roundRect">
+            <a:avLst/>
+          </a:prstGeom>
+          <a:noFill/>
+          <a:ln w="38100">
+            <a:solidFill>
+              <a:srgbClr val="FF0000"/>
+            </a:solidFill>
+          </a:ln>
+        </p:spPr>
+        <p:style>
+          <a:lnRef idx="2">
+            <a:schemeClr val="accent1">
+              <a:shade val="50000"/>
+            </a:schemeClr>
+          </a:lnRef>
+          <a:fillRef idx="1">
+            <a:schemeClr val="accent1"/>
+          </a:fillRef>
+          <a:effectRef idx="0">
+            <a:schemeClr val="accent1"/>
+          </a:effectRef>
+          <a:fontRef idx="minor">
+            <a:schemeClr val="lt1"/>
+          </a:fontRef>
+        </p:style>
+        <p:txBody>
+          <a:bodyPr rtlCol="0" anchor="ctr"/>
+          <a:lstStyle/>
+          <a:p>
+            <a:pPr algn="ctr"/>
+            <a:endParaRPr lang="fr-FR"/>
+          </a:p>
+        </p:txBody>
+      </p:sp>
+      <p:sp>
+        <p:nvSpPr>
+          <p:cNvPr id="10" name="Rectangle : coins arrondis 9">
+            <a:extLst>
+              <a:ext uri="{FF2B5EF4-FFF2-40B4-BE49-F238E27FC236}">
+                <a16:creationId xmlns:a16="http://schemas.microsoft.com/office/drawing/2014/main" id="{DF25033E-A87D-492B-99FD-15DA54BFCC9F}"/>
+              </a:ext>
+            </a:extLst>
+          </p:cNvPr>
+          <p:cNvSpPr/>
+          <p:nvPr/>
+        </p:nvSpPr>
+        <p:spPr>
+          <a:xfrm>
+            <a:off x="9552384" y="2204864"/>
+            <a:ext cx="1512168" cy="673928"/>
+          </a:xfrm>
+          <a:prstGeom prst="roundRect">
+            <a:avLst/>
+          </a:prstGeom>
+          <a:noFill/>
+          <a:ln w="38100">
+            <a:solidFill>
+              <a:srgbClr val="FF0000"/>
+            </a:solidFill>
+          </a:ln>
+        </p:spPr>
+        <p:style>
+          <a:lnRef idx="2">
+            <a:schemeClr val="accent1">
+              <a:shade val="50000"/>
+            </a:schemeClr>
+          </a:lnRef>
+          <a:fillRef idx="1">
+            <a:schemeClr val="accent1"/>
+          </a:fillRef>
+          <a:effectRef idx="0">
+            <a:schemeClr val="accent1"/>
+          </a:effectRef>
+          <a:fontRef idx="minor">
+            <a:schemeClr val="lt1"/>
+          </a:fontRef>
+        </p:style>
+        <p:txBody>
+          <a:bodyPr rtlCol="0" anchor="ctr"/>
+          <a:lstStyle/>
+          <a:p>
+            <a:pPr algn="ctr"/>
+            <a:endParaRPr lang="fr-FR"/>
+          </a:p>
+        </p:txBody>
+      </p:sp>
+      <p:sp>
+        <p:nvSpPr>
+          <p:cNvPr id="12" name="Rectangle : coins arrondis 11">
+            <a:extLst>
+              <a:ext uri="{FF2B5EF4-FFF2-40B4-BE49-F238E27FC236}">
+                <a16:creationId xmlns:a16="http://schemas.microsoft.com/office/drawing/2014/main" id="{205CFFCA-1C27-47C5-8812-4DAC9615E4C7}"/>
+              </a:ext>
+            </a:extLst>
+          </p:cNvPr>
+          <p:cNvSpPr/>
+          <p:nvPr/>
+        </p:nvSpPr>
+        <p:spPr>
+          <a:xfrm>
+            <a:off x="5886174" y="5059263"/>
+            <a:ext cx="1211738" cy="673928"/>
+          </a:xfrm>
+          <a:prstGeom prst="roundRect">
+            <a:avLst/>
+          </a:prstGeom>
+          <a:noFill/>
+          <a:ln w="38100">
+            <a:solidFill>
+              <a:srgbClr val="FF0000"/>
+            </a:solidFill>
+          </a:ln>
+        </p:spPr>
+        <p:style>
+          <a:lnRef idx="2">
+            <a:schemeClr val="accent1">
+              <a:shade val="50000"/>
+            </a:schemeClr>
+          </a:lnRef>
+          <a:fillRef idx="1">
+            <a:schemeClr val="accent1"/>
+          </a:fillRef>
+          <a:effectRef idx="0">
+            <a:schemeClr val="accent1"/>
+          </a:effectRef>
+          <a:fontRef idx="minor">
+            <a:schemeClr val="lt1"/>
+          </a:fontRef>
+        </p:style>
+        <p:txBody>
+          <a:bodyPr rtlCol="0" anchor="ctr"/>
+          <a:lstStyle/>
+          <a:p>
+            <a:pPr algn="ctr"/>
+            <a:r>
+              <a:rPr lang="fr-FR" b="1" dirty="0">
+                <a:solidFill>
+                  <a:srgbClr val="FF0000"/>
+                </a:solidFill>
+              </a:rPr>
+              <a:t>CTRL + G</a:t>
+            </a:r>
+          </a:p>
+        </p:txBody>
+      </p:sp>
+      <p:sp>
+        <p:nvSpPr>
+          <p:cNvPr id="13" name="Rectangle : coins arrondis 12">
+            <a:extLst>
+              <a:ext uri="{FF2B5EF4-FFF2-40B4-BE49-F238E27FC236}">
+                <a16:creationId xmlns:a16="http://schemas.microsoft.com/office/drawing/2014/main" id="{0C57D33F-A4D6-4B44-B06D-0D136AAF90AD}"/>
+              </a:ext>
+            </a:extLst>
+          </p:cNvPr>
+          <p:cNvSpPr/>
+          <p:nvPr/>
+        </p:nvSpPr>
+        <p:spPr>
+          <a:xfrm>
+            <a:off x="5415167" y="3092036"/>
+            <a:ext cx="2153753" cy="673928"/>
+          </a:xfrm>
+          <a:prstGeom prst="roundRect">
+            <a:avLst/>
+          </a:prstGeom>
+          <a:solidFill>
+            <a:schemeClr val="bg1"/>
+          </a:solidFill>
+          <a:ln w="38100">
+            <a:solidFill>
+              <a:srgbClr val="FF0000"/>
+            </a:solidFill>
+          </a:ln>
+        </p:spPr>
+        <p:style>
+          <a:lnRef idx="2">
+            <a:schemeClr val="accent1">
+              <a:shade val="50000"/>
+            </a:schemeClr>
+          </a:lnRef>
+          <a:fillRef idx="1">
+            <a:schemeClr val="accent1"/>
+          </a:fillRef>
+          <a:effectRef idx="0">
+            <a:schemeClr val="accent1"/>
+          </a:effectRef>
+          <a:fontRef idx="minor">
+            <a:schemeClr val="lt1"/>
+          </a:fontRef>
+        </p:style>
+        <p:txBody>
+          <a:bodyPr rtlCol="0" anchor="ctr"/>
+          <a:lstStyle/>
+          <a:p>
+            <a:pPr algn="ctr"/>
+            <a:r>
+              <a:rPr lang="fr-FR" b="1" dirty="0">
+                <a:solidFill>
+                  <a:schemeClr val="tx1"/>
+                </a:solidFill>
+              </a:rPr>
+              <a:t>Mettre en gras</a:t>
+            </a:r>
+          </a:p>
+        </p:txBody>
+      </p:sp>
+      <p:cxnSp>
+        <p:nvCxnSpPr>
+          <p:cNvPr id="6" name="Connecteur droit avec flèche 5">
+            <a:extLst>
+              <a:ext uri="{FF2B5EF4-FFF2-40B4-BE49-F238E27FC236}">
+                <a16:creationId xmlns:a16="http://schemas.microsoft.com/office/drawing/2014/main" id="{B6F05A2C-7745-404B-A576-D250D6844570}"/>
+              </a:ext>
+            </a:extLst>
+          </p:cNvPr>
+          <p:cNvCxnSpPr>
+            <a:cxnSpLocks/>
+            <a:stCxn id="13" idx="0"/>
+            <a:endCxn id="2" idx="2"/>
+          </p:cNvCxnSpPr>
+          <p:nvPr/>
+        </p:nvCxnSpPr>
+        <p:spPr>
+          <a:xfrm flipV="1">
+            <a:off x="6492044" y="1726664"/>
+            <a:ext cx="0" cy="1365372"/>
+          </a:xfrm>
+          <a:prstGeom prst="straightConnector1">
+            <a:avLst/>
+          </a:prstGeom>
+          <a:ln w="28575">
+            <a:solidFill>
+              <a:srgbClr val="FF0000"/>
+            </a:solidFill>
+            <a:tailEnd type="triangle"/>
+          </a:ln>
+        </p:spPr>
+        <p:style>
+          <a:lnRef idx="1">
+            <a:schemeClr val="accent1"/>
+          </a:lnRef>
+          <a:fillRef idx="0">
+            <a:schemeClr val="accent1"/>
+          </a:fillRef>
+          <a:effectRef idx="0">
+            <a:schemeClr val="accent1"/>
+          </a:effectRef>
+          <a:fontRef idx="minor">
+            <a:schemeClr val="tx1"/>
+          </a:fontRef>
+        </p:style>
+      </p:cxnSp>
+      <p:cxnSp>
+        <p:nvCxnSpPr>
+          <p:cNvPr id="16" name="Connecteur droit avec flèche 15">
+            <a:extLst>
+              <a:ext uri="{FF2B5EF4-FFF2-40B4-BE49-F238E27FC236}">
+                <a16:creationId xmlns:a16="http://schemas.microsoft.com/office/drawing/2014/main" id="{5842EE7A-7B14-4FFA-957F-C293B3A474DB}"/>
+              </a:ext>
+            </a:extLst>
+          </p:cNvPr>
+          <p:cNvCxnSpPr>
+            <a:cxnSpLocks/>
+            <a:stCxn id="13" idx="2"/>
+            <a:endCxn id="12" idx="0"/>
+          </p:cNvCxnSpPr>
+          <p:nvPr/>
+        </p:nvCxnSpPr>
+        <p:spPr>
+          <a:xfrm flipH="1">
+            <a:off x="6492043" y="3765964"/>
+            <a:ext cx="1" cy="1293299"/>
+          </a:xfrm>
+          <a:prstGeom prst="straightConnector1">
+            <a:avLst/>
+          </a:prstGeom>
+          <a:ln w="28575">
+            <a:solidFill>
+              <a:srgbClr val="FF0000"/>
+            </a:solidFill>
+            <a:tailEnd type="triangle"/>
+          </a:ln>
+        </p:spPr>
+        <p:style>
+          <a:lnRef idx="1">
+            <a:schemeClr val="accent1"/>
+          </a:lnRef>
+          <a:fillRef idx="0">
+            <a:schemeClr val="accent1"/>
+          </a:fillRef>
+          <a:effectRef idx="0">
+            <a:schemeClr val="accent1"/>
+          </a:effectRef>
+          <a:fontRef idx="minor">
+            <a:schemeClr val="tx1"/>
+          </a:fontRef>
+        </p:style>
+      </p:cxnSp>
+      <p:cxnSp>
+        <p:nvCxnSpPr>
+          <p:cNvPr id="17" name="Connecteur droit avec flèche 16">
+            <a:extLst>
+              <a:ext uri="{FF2B5EF4-FFF2-40B4-BE49-F238E27FC236}">
+                <a16:creationId xmlns:a16="http://schemas.microsoft.com/office/drawing/2014/main" id="{189ECF8A-8CD9-4A8B-AB53-0CAC9C7E2018}"/>
+              </a:ext>
+            </a:extLst>
+          </p:cNvPr>
+          <p:cNvCxnSpPr>
+            <a:cxnSpLocks/>
+            <a:stCxn id="13" idx="3"/>
+            <a:endCxn id="10" idx="1"/>
+          </p:cNvCxnSpPr>
+          <p:nvPr/>
+        </p:nvCxnSpPr>
+        <p:spPr>
+          <a:xfrm flipV="1">
+            <a:off x="7568920" y="2541828"/>
+            <a:ext cx="1983464" cy="887172"/>
+          </a:xfrm>
+          <a:prstGeom prst="straightConnector1">
+            <a:avLst/>
+          </a:prstGeom>
+          <a:ln w="28575">
+            <a:solidFill>
+              <a:srgbClr val="FF0000"/>
+            </a:solidFill>
+            <a:tailEnd type="triangle"/>
+          </a:ln>
+        </p:spPr>
+        <p:style>
+          <a:lnRef idx="1">
+            <a:schemeClr val="accent1"/>
+          </a:lnRef>
+          <a:fillRef idx="0">
+            <a:schemeClr val="accent1"/>
+          </a:fillRef>
+          <a:effectRef idx="0">
+            <a:schemeClr val="accent1"/>
+          </a:effectRef>
+          <a:fontRef idx="minor">
+            <a:schemeClr val="tx1"/>
+          </a:fontRef>
+        </p:style>
+      </p:cxnSp>
+      <p:cxnSp>
+        <p:nvCxnSpPr>
+          <p:cNvPr id="14" name="Connecteur droit avec flèche 13">
+            <a:extLst>
+              <a:ext uri="{FF2B5EF4-FFF2-40B4-BE49-F238E27FC236}">
+                <a16:creationId xmlns:a16="http://schemas.microsoft.com/office/drawing/2014/main" id="{37ABCFC5-6AA1-4FD6-94EC-055208FE793A}"/>
+              </a:ext>
+            </a:extLst>
+          </p:cNvPr>
+          <p:cNvCxnSpPr>
+            <a:cxnSpLocks/>
+            <a:stCxn id="13" idx="1"/>
+            <a:endCxn id="8" idx="3"/>
+          </p:cNvCxnSpPr>
+          <p:nvPr/>
+        </p:nvCxnSpPr>
+        <p:spPr>
+          <a:xfrm flipH="1" flipV="1">
+            <a:off x="4511824" y="3068960"/>
+            <a:ext cx="903343" cy="360040"/>
+          </a:xfrm>
+          <a:prstGeom prst="straightConnector1">
+            <a:avLst/>
+          </a:prstGeom>
+          <a:ln w="28575">
+            <a:solidFill>
+              <a:srgbClr val="FF0000"/>
+            </a:solidFill>
+            <a:tailEnd type="triangle"/>
+          </a:ln>
+        </p:spPr>
+        <p:style>
+          <a:lnRef idx="1">
+            <a:schemeClr val="accent1"/>
+          </a:lnRef>
+          <a:fillRef idx="0">
+            <a:schemeClr val="accent1"/>
+          </a:fillRef>
+          <a:effectRef idx="0">
+            <a:schemeClr val="accent1"/>
+          </a:effectRef>
+          <a:fontRef idx="minor">
+            <a:schemeClr val="tx1"/>
+          </a:fontRef>
+        </p:style>
+      </p:cxnSp>
     </p:spTree>
     <p:extLst>
       <p:ext uri="{BB962C8B-B14F-4D97-AF65-F5344CB8AC3E}">
@@ -45370,6 +46345,14 @@
 <file path=ppt/slides/slide8.xml><?xml version="1.0" encoding="utf-8"?>
 <p:sld xmlns:a="http://schemas.openxmlformats.org/drawingml/2006/main" xmlns:r="http://schemas.openxmlformats.org/officeDocument/2006/relationships" xmlns:p="http://schemas.openxmlformats.org/presentationml/2006/main">
   <p:cSld>
+    <p:bg>
+      <p:bgPr>
+        <a:solidFill>
+          <a:srgbClr val="403551"/>
+        </a:solidFill>
+        <a:effectLst/>
+      </p:bgPr>
+    </p:bg>
     <p:spTree>
       <p:nvGrpSpPr>
         <p:cNvPr id="1" name=""/>
@@ -45386,63 +46369,43 @@
       </p:grpSpPr>
       <p:sp>
         <p:nvSpPr>
-          <p:cNvPr id="2" name="Title 1"/>
+          <p:cNvPr id="8" name="Text Placeholder 7">
+            <a:extLst>
+              <a:ext uri="{FF2B5EF4-FFF2-40B4-BE49-F238E27FC236}">
+                <a16:creationId xmlns:a16="http://schemas.microsoft.com/office/drawing/2014/main" id="{07704995-E660-48D5-8798-BD60B286721C}"/>
+              </a:ext>
+            </a:extLst>
+          </p:cNvPr>
           <p:cNvSpPr>
             <a:spLocks noGrp="1"/>
           </p:cNvSpPr>
           <p:nvPr>
-            <p:ph type="title"/>
+            <p:ph type="body" sz="quarter" idx="13"/>
           </p:nvPr>
         </p:nvSpPr>
-        <p:spPr/>
+        <p:spPr>
+          <a:xfrm>
+            <a:off x="659456" y="2008910"/>
+            <a:ext cx="10153129" cy="3699442"/>
+          </a:xfrm>
+        </p:spPr>
         <p:txBody>
           <a:bodyPr/>
           <a:lstStyle/>
           <a:p>
             <a:r>
-              <a:rPr lang="fr-FR" dirty="0"/>
-              <a:t>Présentation du </a:t>
-            </a:r>
-            <a:br>
-              <a:rPr lang="fr-FR" dirty="0"/>
-            </a:br>
-            <a:r>
-              <a:rPr lang="fr-FR" dirty="0"/>
-              <a:t>pattern command</a:t>
+              <a:rPr lang="fr-FR" b="1" dirty="0"/>
+              <a:t>Pas de panique, le pattern Command règle ces 2 problématiques !</a:t>
             </a:r>
           </a:p>
         </p:txBody>
       </p:sp>
       <p:sp>
         <p:nvSpPr>
-          <p:cNvPr id="16" name="Text Placeholder 15"/>
-          <p:cNvSpPr>
-            <a:spLocks noGrp="1"/>
-          </p:cNvSpPr>
-          <p:nvPr>
-            <p:ph type="body" idx="1"/>
-          </p:nvPr>
-        </p:nvSpPr>
-        <p:spPr/>
-        <p:txBody>
-          <a:bodyPr>
-            <a:noAutofit/>
-          </a:bodyPr>
-          <a:lstStyle/>
-          <a:p>
-            <a:r>
-              <a:rPr lang="fr-FR" dirty="0"/>
-              <a:t>« Cuisine, une sauvegarde pour la 4 s’il vous plait ! »</a:t>
-            </a:r>
-          </a:p>
-        </p:txBody>
-      </p:sp>
-      <p:sp>
-        <p:nvSpPr>
-          <p:cNvPr id="38" name="Date Placeholder 37">
+          <p:cNvPr id="12" name="Date Placeholder 11">
             <a:extLst>
               <a:ext uri="{FF2B5EF4-FFF2-40B4-BE49-F238E27FC236}">
-                <a16:creationId xmlns:a16="http://schemas.microsoft.com/office/drawing/2014/main" id="{214893A6-5453-4772-A5C3-6E8247B9F7F7}"/>
+                <a16:creationId xmlns:a16="http://schemas.microsoft.com/office/drawing/2014/main" id="{ECD35940-9A65-430A-B252-2AA11B671BC5}"/>
               </a:ext>
             </a:extLst>
           </p:cNvPr>
@@ -45453,25 +46416,30 @@
             <p:ph type="dt" sz="half" idx="10"/>
           </p:nvPr>
         </p:nvSpPr>
-        <p:spPr/>
+        <p:spPr>
+          <a:xfrm>
+            <a:off x="911424" y="6356350"/>
+            <a:ext cx="2669976" cy="365125"/>
+          </a:xfrm>
+        </p:spPr>
         <p:txBody>
           <a:bodyPr/>
           <a:lstStyle/>
           <a:p>
             <a:r>
-              <a:rPr lang="fr-FR"/>
+              <a:rPr lang="fr-FR" dirty="0"/>
               <a:t>04 février 2021</a:t>
             </a:r>
-            <a:endParaRPr lang="en-US"/>
+            <a:endParaRPr lang="en-US" dirty="0"/>
           </a:p>
         </p:txBody>
       </p:sp>
       <p:sp>
         <p:nvSpPr>
-          <p:cNvPr id="39" name="Footer Placeholder 38">
+          <p:cNvPr id="13" name="Footer Placeholder 12">
             <a:extLst>
               <a:ext uri="{FF2B5EF4-FFF2-40B4-BE49-F238E27FC236}">
-                <a16:creationId xmlns:a16="http://schemas.microsoft.com/office/drawing/2014/main" id="{19A88EA5-E6FB-4BFB-9421-CB6C4447B890}"/>
+                <a16:creationId xmlns:a16="http://schemas.microsoft.com/office/drawing/2014/main" id="{38793FD4-AB63-44F6-A614-0B1CC3F737B5}"/>
               </a:ext>
             </a:extLst>
           </p:cNvPr>
@@ -45498,7 +46466,7 @@
     </p:spTree>
     <p:extLst>
       <p:ext uri="{BB962C8B-B14F-4D97-AF65-F5344CB8AC3E}">
-        <p14:creationId xmlns:p14="http://schemas.microsoft.com/office/powerpoint/2010/main" val="2194463738"/>
+        <p14:creationId xmlns:p14="http://schemas.microsoft.com/office/powerpoint/2010/main" val="1369663812"/>
       </p:ext>
     </p:extLst>
   </p:cSld>
@@ -45511,6 +46479,14 @@
 <file path=ppt/slides/slide9.xml><?xml version="1.0" encoding="utf-8"?>
 <p:sld xmlns:a="http://schemas.openxmlformats.org/drawingml/2006/main" xmlns:r="http://schemas.openxmlformats.org/officeDocument/2006/relationships" xmlns:p="http://schemas.openxmlformats.org/presentationml/2006/main">
   <p:cSld>
+    <p:bg>
+      <p:bgPr>
+        <a:solidFill>
+          <a:srgbClr val="403551"/>
+        </a:solidFill>
+        <a:effectLst/>
+      </p:bgPr>
+    </p:bg>
     <p:spTree>
       <p:nvGrpSpPr>
         <p:cNvPr id="1" name=""/>
@@ -45527,66 +46503,7 @@
       </p:grpSpPr>
       <p:sp>
         <p:nvSpPr>
-          <p:cNvPr id="2" name="Title 1"/>
-          <p:cNvSpPr>
-            <a:spLocks noGrp="1"/>
-          </p:cNvSpPr>
-          <p:nvPr>
-            <p:ph type="title"/>
-          </p:nvPr>
-        </p:nvSpPr>
-        <p:spPr/>
-        <p:txBody>
-          <a:bodyPr/>
-          <a:lstStyle/>
-          <a:p>
-            <a:r>
-              <a:rPr lang="fr-FR" dirty="0"/>
-              <a:t>Présentation du </a:t>
-            </a:r>
-            <a:br>
-              <a:rPr lang="fr-FR" dirty="0"/>
-            </a:br>
-            <a:r>
-              <a:rPr lang="fr-FR" dirty="0"/>
-              <a:t>pattern memento</a:t>
-            </a:r>
-          </a:p>
-        </p:txBody>
-      </p:sp>
-      <p:sp>
-        <p:nvSpPr>
-          <p:cNvPr id="16" name="Text Placeholder 15"/>
-          <p:cNvSpPr>
-            <a:spLocks noGrp="1"/>
-          </p:cNvSpPr>
-          <p:nvPr>
-            <p:ph type="body" idx="1"/>
-          </p:nvPr>
-        </p:nvSpPr>
-        <p:spPr/>
-        <p:txBody>
-          <a:bodyPr>
-            <a:noAutofit/>
-          </a:bodyPr>
-          <a:lstStyle/>
-          <a:p>
-            <a:r>
-              <a:rPr lang="fr-FR" dirty="0"/>
-              <a:t>La mémoire est mère de la sagesse !</a:t>
-            </a:r>
-          </a:p>
-        </p:txBody>
-      </p:sp>
-      <p:sp>
-        <p:nvSpPr>
-          <p:cNvPr id="38" name="Date Placeholder 37">
-            <a:extLst>
-              <a:ext uri="{FF2B5EF4-FFF2-40B4-BE49-F238E27FC236}">
-                <a16:creationId xmlns:a16="http://schemas.microsoft.com/office/drawing/2014/main" id="{214893A6-5453-4772-A5C3-6E8247B9F7F7}"/>
-              </a:ext>
-            </a:extLst>
-          </p:cNvPr>
+          <p:cNvPr id="3" name="Date Placeholder 2"/>
           <p:cNvSpPr>
             <a:spLocks noGrp="1"/>
           </p:cNvSpPr>
@@ -45607,15 +46524,51 @@
           </a:p>
         </p:txBody>
       </p:sp>
-      <p:sp>
-        <p:nvSpPr>
-          <p:cNvPr id="39" name="Footer Placeholder 38">
+      <p:pic>
+        <p:nvPicPr>
+          <p:cNvPr id="9" name="Image 8">
             <a:extLst>
               <a:ext uri="{FF2B5EF4-FFF2-40B4-BE49-F238E27FC236}">
-                <a16:creationId xmlns:a16="http://schemas.microsoft.com/office/drawing/2014/main" id="{19A88EA5-E6FB-4BFB-9421-CB6C4447B890}"/>
+                <a16:creationId xmlns:a16="http://schemas.microsoft.com/office/drawing/2014/main" id="{79A96D39-353D-4A6E-8A56-7B8BFBEE319E}"/>
               </a:ext>
             </a:extLst>
           </p:cNvPr>
+          <p:cNvPicPr>
+            <a:picLocks noChangeAspect="1"/>
+          </p:cNvPicPr>
+          <p:nvPr/>
+        </p:nvPicPr>
+        <p:blipFill rotWithShape="1">
+          <a:blip r:embed="rId3"/>
+          <a:srcRect l="650"/>
+          <a:stretch/>
+        </p:blipFill>
+        <p:spPr>
+          <a:xfrm>
+            <a:off x="2927648" y="620688"/>
+            <a:ext cx="7416824" cy="5621003"/>
+          </a:xfrm>
+          <a:prstGeom prst="rect">
+            <a:avLst/>
+          </a:prstGeom>
+          <a:ln w="12700" cap="sq">
+            <a:solidFill>
+              <a:schemeClr val="bg1"/>
+            </a:solidFill>
+            <a:miter lim="800000"/>
+          </a:ln>
+          <a:effectLst>
+            <a:outerShdw blurRad="57150" dist="50800" dir="2700000" algn="tl" rotWithShape="0">
+              <a:srgbClr val="000000">
+                <a:alpha val="40000"/>
+              </a:srgbClr>
+            </a:outerShdw>
+          </a:effectLst>
+        </p:spPr>
+      </p:pic>
+      <p:sp>
+        <p:nvSpPr>
+          <p:cNvPr id="4" name="Footer Placeholder 3"/>
           <p:cNvSpPr>
             <a:spLocks noGrp="1"/>
           </p:cNvSpPr>
@@ -45636,10 +46589,38 @@
           </a:p>
         </p:txBody>
       </p:sp>
+      <p:sp>
+        <p:nvSpPr>
+          <p:cNvPr id="11" name="Text Placeholder 10">
+            <a:extLst>
+              <a:ext uri="{FF2B5EF4-FFF2-40B4-BE49-F238E27FC236}">
+                <a16:creationId xmlns:a16="http://schemas.microsoft.com/office/drawing/2014/main" id="{2A6E9779-5059-4C5A-A10E-A924E6ADE536}"/>
+              </a:ext>
+            </a:extLst>
+          </p:cNvPr>
+          <p:cNvSpPr>
+            <a:spLocks noGrp="1"/>
+          </p:cNvSpPr>
+          <p:nvPr>
+            <p:ph type="body" sz="quarter" idx="13"/>
+          </p:nvPr>
+        </p:nvSpPr>
+        <p:spPr/>
+        <p:txBody>
+          <a:bodyPr/>
+          <a:lstStyle/>
+          <a:p>
+            <a:r>
+              <a:rPr lang="en-US"/>
+              <a:t>01</a:t>
+            </a:r>
+          </a:p>
+        </p:txBody>
+      </p:sp>
     </p:spTree>
     <p:extLst>
       <p:ext uri="{BB962C8B-B14F-4D97-AF65-F5344CB8AC3E}">
-        <p14:creationId xmlns:p14="http://schemas.microsoft.com/office/powerpoint/2010/main" val="3399286523"/>
+        <p14:creationId xmlns:p14="http://schemas.microsoft.com/office/powerpoint/2010/main" val="1379733653"/>
       </p:ext>
     </p:extLst>
   </p:cSld>

</xml_diff>